<commit_message>
Create stencil cam files
</commit_message>
<xml_diff>
--- a/labs/Sensing-And-Filtering/Sensing-And-Filtering.pptx
+++ b/labs/Sensing-And-Filtering/Sensing-And-Filtering.pptx
@@ -13,48 +13,44 @@
     <p:sldId id="341" r:id="rId7"/>
     <p:sldId id="362" r:id="rId8"/>
     <p:sldId id="342" r:id="rId9"/>
-    <p:sldId id="345" r:id="rId10"/>
-    <p:sldId id="346" r:id="rId11"/>
-    <p:sldId id="352" r:id="rId12"/>
-    <p:sldId id="359" r:id="rId13"/>
-    <p:sldId id="348" r:id="rId14"/>
-    <p:sldId id="349" r:id="rId15"/>
-    <p:sldId id="353" r:id="rId16"/>
-    <p:sldId id="355" r:id="rId17"/>
-    <p:sldId id="356" r:id="rId18"/>
-    <p:sldId id="357" r:id="rId19"/>
-    <p:sldId id="363" r:id="rId20"/>
-    <p:sldId id="358" r:id="rId21"/>
-    <p:sldId id="354" r:id="rId22"/>
-    <p:sldId id="350" r:id="rId23"/>
-    <p:sldId id="351" r:id="rId24"/>
-    <p:sldId id="343" r:id="rId25"/>
-    <p:sldId id="347" r:id="rId26"/>
-    <p:sldId id="344" r:id="rId27"/>
-    <p:sldId id="360" r:id="rId28"/>
-    <p:sldId id="361" r:id="rId29"/>
-    <p:sldId id="258" r:id="rId30"/>
-    <p:sldId id="266" r:id="rId31"/>
-    <p:sldId id="262" r:id="rId32"/>
-    <p:sldId id="267" r:id="rId33"/>
-    <p:sldId id="268" r:id="rId34"/>
-    <p:sldId id="269" r:id="rId35"/>
-    <p:sldId id="270" r:id="rId36"/>
-    <p:sldId id="271" r:id="rId37"/>
-    <p:sldId id="272" r:id="rId38"/>
-    <p:sldId id="273" r:id="rId39"/>
-    <p:sldId id="274" r:id="rId40"/>
-    <p:sldId id="260" r:id="rId41"/>
-    <p:sldId id="282" r:id="rId42"/>
-    <p:sldId id="338" r:id="rId43"/>
-    <p:sldId id="339" r:id="rId44"/>
-    <p:sldId id="264" r:id="rId45"/>
-    <p:sldId id="263" r:id="rId46"/>
-    <p:sldId id="283" r:id="rId47"/>
-    <p:sldId id="278" r:id="rId48"/>
-    <p:sldId id="279" r:id="rId49"/>
-    <p:sldId id="280" r:id="rId50"/>
-    <p:sldId id="284" r:id="rId51"/>
+    <p:sldId id="352" r:id="rId10"/>
+    <p:sldId id="348" r:id="rId11"/>
+    <p:sldId id="354" r:id="rId12"/>
+    <p:sldId id="353" r:id="rId13"/>
+    <p:sldId id="355" r:id="rId14"/>
+    <p:sldId id="356" r:id="rId15"/>
+    <p:sldId id="357" r:id="rId16"/>
+    <p:sldId id="363" r:id="rId17"/>
+    <p:sldId id="358" r:id="rId18"/>
+    <p:sldId id="350" r:id="rId19"/>
+    <p:sldId id="351" r:id="rId20"/>
+    <p:sldId id="343" r:id="rId21"/>
+    <p:sldId id="347" r:id="rId22"/>
+    <p:sldId id="344" r:id="rId23"/>
+    <p:sldId id="360" r:id="rId24"/>
+    <p:sldId id="361" r:id="rId25"/>
+    <p:sldId id="258" r:id="rId26"/>
+    <p:sldId id="266" r:id="rId27"/>
+    <p:sldId id="262" r:id="rId28"/>
+    <p:sldId id="267" r:id="rId29"/>
+    <p:sldId id="268" r:id="rId30"/>
+    <p:sldId id="269" r:id="rId31"/>
+    <p:sldId id="270" r:id="rId32"/>
+    <p:sldId id="271" r:id="rId33"/>
+    <p:sldId id="272" r:id="rId34"/>
+    <p:sldId id="273" r:id="rId35"/>
+    <p:sldId id="274" r:id="rId36"/>
+    <p:sldId id="260" r:id="rId37"/>
+    <p:sldId id="282" r:id="rId38"/>
+    <p:sldId id="338" r:id="rId39"/>
+    <p:sldId id="339" r:id="rId40"/>
+    <p:sldId id="264" r:id="rId41"/>
+    <p:sldId id="263" r:id="rId42"/>
+    <p:sldId id="283" r:id="rId43"/>
+    <p:sldId id="278" r:id="rId44"/>
+    <p:sldId id="279" r:id="rId45"/>
+    <p:sldId id="280" r:id="rId46"/>
+    <p:sldId id="284" r:id="rId47"/>
   </p:sldIdLst>
   <p:sldSz cx="12192000" cy="6858000"/>
   <p:notesSz cx="6858000" cy="9144000"/>
@@ -153,6 +149,11 @@
       </a:defRPr>
     </a:lvl9pPr>
   </p:defaultTextStyle>
+  <p:extLst>
+    <p:ext uri="{EFAFB233-063F-42B5-8137-9DF3F51BA10A}">
+      <p15:sldGuideLst xmlns:p15="http://schemas.microsoft.com/office/powerpoint/2012/main"/>
+    </p:ext>
+  </p:extLst>
 </p:presentation>
 </file>
 
@@ -303,7 +304,7 @@
           <a:p>
             <a:fld id="{48000354-592C-D644-9B2B-8FBA8F24B574}" type="datetimeFigureOut">
               <a:rPr lang="en-US" smtClean="0"/>
-              <a:t>2/28/19</a:t>
+              <a:t>3/10/19</a:t>
             </a:fld>
             <a:endParaRPr lang="en-US"/>
           </a:p>
@@ -501,7 +502,7 @@
           <a:p>
             <a:fld id="{48000354-592C-D644-9B2B-8FBA8F24B574}" type="datetimeFigureOut">
               <a:rPr lang="en-US" smtClean="0"/>
-              <a:t>2/28/19</a:t>
+              <a:t>3/10/19</a:t>
             </a:fld>
             <a:endParaRPr lang="en-US"/>
           </a:p>
@@ -709,7 +710,7 @@
           <a:p>
             <a:fld id="{48000354-592C-D644-9B2B-8FBA8F24B574}" type="datetimeFigureOut">
               <a:rPr lang="en-US" smtClean="0"/>
-              <a:t>2/28/19</a:t>
+              <a:t>3/10/19</a:t>
             </a:fld>
             <a:endParaRPr lang="en-US"/>
           </a:p>
@@ -907,7 +908,7 @@
           <a:p>
             <a:fld id="{48000354-592C-D644-9B2B-8FBA8F24B574}" type="datetimeFigureOut">
               <a:rPr lang="en-US" smtClean="0"/>
-              <a:t>2/28/19</a:t>
+              <a:t>3/10/19</a:t>
             </a:fld>
             <a:endParaRPr lang="en-US"/>
           </a:p>
@@ -1182,7 +1183,7 @@
           <a:p>
             <a:fld id="{48000354-592C-D644-9B2B-8FBA8F24B574}" type="datetimeFigureOut">
               <a:rPr lang="en-US" smtClean="0"/>
-              <a:t>2/28/19</a:t>
+              <a:t>3/10/19</a:t>
             </a:fld>
             <a:endParaRPr lang="en-US"/>
           </a:p>
@@ -1447,7 +1448,7 @@
           <a:p>
             <a:fld id="{48000354-592C-D644-9B2B-8FBA8F24B574}" type="datetimeFigureOut">
               <a:rPr lang="en-US" smtClean="0"/>
-              <a:t>2/28/19</a:t>
+              <a:t>3/10/19</a:t>
             </a:fld>
             <a:endParaRPr lang="en-US"/>
           </a:p>
@@ -1859,7 +1860,7 @@
           <a:p>
             <a:fld id="{48000354-592C-D644-9B2B-8FBA8F24B574}" type="datetimeFigureOut">
               <a:rPr lang="en-US" smtClean="0"/>
-              <a:t>2/28/19</a:t>
+              <a:t>3/10/19</a:t>
             </a:fld>
             <a:endParaRPr lang="en-US"/>
           </a:p>
@@ -2000,7 +2001,7 @@
           <a:p>
             <a:fld id="{48000354-592C-D644-9B2B-8FBA8F24B574}" type="datetimeFigureOut">
               <a:rPr lang="en-US" smtClean="0"/>
-              <a:t>2/28/19</a:t>
+              <a:t>3/10/19</a:t>
             </a:fld>
             <a:endParaRPr lang="en-US"/>
           </a:p>
@@ -2113,7 +2114,7 @@
           <a:p>
             <a:fld id="{48000354-592C-D644-9B2B-8FBA8F24B574}" type="datetimeFigureOut">
               <a:rPr lang="en-US" smtClean="0"/>
-              <a:t>2/28/19</a:t>
+              <a:t>3/10/19</a:t>
             </a:fld>
             <a:endParaRPr lang="en-US"/>
           </a:p>
@@ -2424,7 +2425,7 @@
           <a:p>
             <a:fld id="{48000354-592C-D644-9B2B-8FBA8F24B574}" type="datetimeFigureOut">
               <a:rPr lang="en-US" smtClean="0"/>
-              <a:t>2/28/19</a:t>
+              <a:t>3/10/19</a:t>
             </a:fld>
             <a:endParaRPr lang="en-US"/>
           </a:p>
@@ -2712,7 +2713,7 @@
           <a:p>
             <a:fld id="{48000354-592C-D644-9B2B-8FBA8F24B574}" type="datetimeFigureOut">
               <a:rPr lang="en-US" smtClean="0"/>
-              <a:t>2/28/19</a:t>
+              <a:t>3/10/19</a:t>
             </a:fld>
             <a:endParaRPr lang="en-US"/>
           </a:p>
@@ -2953,7 +2954,7 @@
           <a:p>
             <a:fld id="{48000354-592C-D644-9B2B-8FBA8F24B574}" type="datetimeFigureOut">
               <a:rPr lang="en-US" smtClean="0"/>
-              <a:t>2/28/19</a:t>
+              <a:t>3/10/19</a:t>
             </a:fld>
             <a:endParaRPr lang="en-US"/>
           </a:p>
@@ -3452,7 +3453,7 @@
           <p:cNvPr id="2" name="Title 1">
             <a:extLst>
               <a:ext uri="{FF2B5EF4-FFF2-40B4-BE49-F238E27FC236}">
-                <a16:creationId xmlns:a16="http://schemas.microsoft.com/office/drawing/2014/main" id="{394EB32C-9431-A54B-9BBA-99E09A50720C}"/>
+                <a16:creationId xmlns:a16="http://schemas.microsoft.com/office/drawing/2014/main" id="{11AB2320-53F1-2648-A559-2EFF813D5AE1}"/>
               </a:ext>
             </a:extLst>
           </p:cNvPr>
@@ -3470,7 +3471,7 @@
           <a:p>
             <a:r>
               <a:rPr lang="en-US" dirty="0"/>
-              <a:t>Gyroscope Noise</a:t>
+              <a:t>Filtering</a:t>
             </a:r>
           </a:p>
         </p:txBody>
@@ -3480,7 +3481,7 @@
           <p:cNvPr id="3" name="Content Placeholder 2">
             <a:extLst>
               <a:ext uri="{FF2B5EF4-FFF2-40B4-BE49-F238E27FC236}">
-                <a16:creationId xmlns:a16="http://schemas.microsoft.com/office/drawing/2014/main" id="{001AD2F8-54C0-0049-816E-E6AA9C707AB3}"/>
+                <a16:creationId xmlns:a16="http://schemas.microsoft.com/office/drawing/2014/main" id="{63B5C89D-897A-ED46-AD08-3ABFAEE012A6}"/>
               </a:ext>
             </a:extLst>
           </p:cNvPr>
@@ -3496,14 +3497,32 @@
           <a:bodyPr/>
           <a:lstStyle/>
           <a:p>
-            <a:endParaRPr lang="en-US"/>
+            <a:r>
+              <a:rPr lang="en-US" dirty="0"/>
+              <a:t>High frequency vs. low frequency</a:t>
+            </a:r>
+          </a:p>
+          <a:p>
+            <a:r>
+              <a:rPr lang="en-US" dirty="0"/>
+              <a:t>High-pass filters</a:t>
+            </a:r>
+          </a:p>
+          <a:p>
+            <a:r>
+              <a:rPr lang="en-US" dirty="0"/>
+              <a:t>Low-pass filters</a:t>
+            </a:r>
+          </a:p>
+          <a:p>
+            <a:endParaRPr lang="en-US" dirty="0"/>
           </a:p>
         </p:txBody>
       </p:sp>
     </p:spTree>
     <p:extLst>
       <p:ext uri="{BB962C8B-B14F-4D97-AF65-F5344CB8AC3E}">
-        <p14:creationId xmlns:p14="http://schemas.microsoft.com/office/powerpoint/2010/main" val="1137052397"/>
+        <p14:creationId xmlns:p14="http://schemas.microsoft.com/office/powerpoint/2010/main" val="3962212717"/>
       </p:ext>
     </p:extLst>
   </p:cSld>
@@ -3535,7 +3554,7 @@
           <p:cNvPr id="2" name="Title 1">
             <a:extLst>
               <a:ext uri="{FF2B5EF4-FFF2-40B4-BE49-F238E27FC236}">
-                <a16:creationId xmlns:a16="http://schemas.microsoft.com/office/drawing/2014/main" id="{CA190DEC-5E84-F843-B342-416D78165177}"/>
+                <a16:creationId xmlns:a16="http://schemas.microsoft.com/office/drawing/2014/main" id="{911697ED-27AC-BD44-973D-02115AF52BB6}"/>
               </a:ext>
             </a:extLst>
           </p:cNvPr>
@@ -3553,49 +3572,47 @@
           <a:p>
             <a:r>
               <a:rPr lang="en-US" dirty="0"/>
-              <a:t>Gyro Clipping</a:t>
-            </a:r>
-          </a:p>
-        </p:txBody>
-      </p:sp>
-      <p:sp>
-        <p:nvSpPr>
-          <p:cNvPr id="3" name="Content Placeholder 2">
-            <a:extLst>
-              <a:ext uri="{FF2B5EF4-FFF2-40B4-BE49-F238E27FC236}">
-                <a16:creationId xmlns:a16="http://schemas.microsoft.com/office/drawing/2014/main" id="{737BF1B2-375D-C94F-9361-7D8AAC22126A}"/>
-              </a:ext>
-            </a:extLst>
-          </p:cNvPr>
-          <p:cNvSpPr>
-            <a:spLocks noGrp="1"/>
-          </p:cNvSpPr>
+              <a:t>IMU Internal Accelerometer Filter</a:t>
+            </a:r>
+          </a:p>
+        </p:txBody>
+      </p:sp>
+      <p:pic>
+        <p:nvPicPr>
+          <p:cNvPr id="5" name="Content Placeholder 4">
+            <a:extLst>
+              <a:ext uri="{FF2B5EF4-FFF2-40B4-BE49-F238E27FC236}">
+                <a16:creationId xmlns:a16="http://schemas.microsoft.com/office/drawing/2014/main" id="{C5ED9B00-2CFF-574C-9258-14815375CA9C}"/>
+              </a:ext>
+            </a:extLst>
+          </p:cNvPr>
+          <p:cNvPicPr>
+            <a:picLocks noGrp="1" noChangeAspect="1"/>
+          </p:cNvPicPr>
           <p:nvPr>
             <p:ph idx="1"/>
           </p:nvPr>
-        </p:nvSpPr>
-        <p:spPr/>
-        <p:txBody>
-          <a:bodyPr/>
-          <a:lstStyle/>
-          <a:p>
-            <a:r>
-              <a:rPr lang="en-US" dirty="0"/>
-              <a:t>Clipping occurs when the measured value exceed what the IMU can measure</a:t>
-            </a:r>
-          </a:p>
-          <a:p>
-            <a:r>
-              <a:rPr lang="en-US" dirty="0"/>
-              <a:t>Since we are integrating the gyroscope, clipping is especially bad.</a:t>
-            </a:r>
-          </a:p>
-        </p:txBody>
-      </p:sp>
+        </p:nvPicPr>
+        <p:blipFill>
+          <a:blip r:embed="rId2"/>
+          <a:stretch>
+            <a:fillRect/>
+          </a:stretch>
+        </p:blipFill>
+        <p:spPr>
+          <a:xfrm>
+            <a:off x="1780938" y="1744276"/>
+            <a:ext cx="8496980" cy="4172430"/>
+          </a:xfrm>
+          <a:prstGeom prst="rect">
+            <a:avLst/>
+          </a:prstGeom>
+        </p:spPr>
+      </p:pic>
     </p:spTree>
     <p:extLst>
       <p:ext uri="{BB962C8B-B14F-4D97-AF65-F5344CB8AC3E}">
-        <p14:creationId xmlns:p14="http://schemas.microsoft.com/office/powerpoint/2010/main" val="2408447168"/>
+        <p14:creationId xmlns:p14="http://schemas.microsoft.com/office/powerpoint/2010/main" val="3262093970"/>
       </p:ext>
     </p:extLst>
   </p:cSld>
@@ -3606,273 +3623,6 @@
 </file>
 
 <file path=ppt/slides/slide12.xml><?xml version="1.0" encoding="utf-8"?>
-<p:sld xmlns:a="http://schemas.openxmlformats.org/drawingml/2006/main" xmlns:r="http://schemas.openxmlformats.org/officeDocument/2006/relationships" xmlns:p="http://schemas.openxmlformats.org/presentationml/2006/main">
-  <p:cSld>
-    <p:spTree>
-      <p:nvGrpSpPr>
-        <p:cNvPr id="1" name=""/>
-        <p:cNvGrpSpPr/>
-        <p:nvPr/>
-      </p:nvGrpSpPr>
-      <p:grpSpPr>
-        <a:xfrm>
-          <a:off x="0" y="0"/>
-          <a:ext cx="0" cy="0"/>
-          <a:chOff x="0" y="0"/>
-          <a:chExt cx="0" cy="0"/>
-        </a:xfrm>
-      </p:grpSpPr>
-      <p:sp>
-        <p:nvSpPr>
-          <p:cNvPr id="2" name="Title 1">
-            <a:extLst>
-              <a:ext uri="{FF2B5EF4-FFF2-40B4-BE49-F238E27FC236}">
-                <a16:creationId xmlns:a16="http://schemas.microsoft.com/office/drawing/2014/main" id="{AFDFBAC7-CEDE-0241-B966-98B596D29909}"/>
-              </a:ext>
-            </a:extLst>
-          </p:cNvPr>
-          <p:cNvSpPr>
-            <a:spLocks noGrp="1"/>
-          </p:cNvSpPr>
-          <p:nvPr>
-            <p:ph type="title"/>
-          </p:nvPr>
-        </p:nvSpPr>
-        <p:spPr/>
-        <p:txBody>
-          <a:bodyPr/>
-          <a:lstStyle/>
-          <a:p>
-            <a:r>
-              <a:rPr lang="en-US" dirty="0"/>
-              <a:t>Gyro Clipping</a:t>
-            </a:r>
-          </a:p>
-        </p:txBody>
-      </p:sp>
-      <p:sp>
-        <p:nvSpPr>
-          <p:cNvPr id="3" name="Content Placeholder 2">
-            <a:extLst>
-              <a:ext uri="{FF2B5EF4-FFF2-40B4-BE49-F238E27FC236}">
-                <a16:creationId xmlns:a16="http://schemas.microsoft.com/office/drawing/2014/main" id="{D6864801-AA56-7946-A2E7-75123807F87F}"/>
-              </a:ext>
-            </a:extLst>
-          </p:cNvPr>
-          <p:cNvSpPr>
-            <a:spLocks noGrp="1"/>
-          </p:cNvSpPr>
-          <p:nvPr>
-            <p:ph idx="1"/>
-          </p:nvPr>
-        </p:nvSpPr>
-        <p:spPr/>
-        <p:txBody>
-          <a:bodyPr/>
-          <a:lstStyle/>
-          <a:p>
-            <a:endParaRPr lang="en-US"/>
-          </a:p>
-        </p:txBody>
-      </p:sp>
-    </p:spTree>
-    <p:extLst>
-      <p:ext uri="{BB962C8B-B14F-4D97-AF65-F5344CB8AC3E}">
-        <p14:creationId xmlns:p14="http://schemas.microsoft.com/office/powerpoint/2010/main" val="3868729147"/>
-      </p:ext>
-    </p:extLst>
-  </p:cSld>
-  <p:clrMapOvr>
-    <a:masterClrMapping/>
-  </p:clrMapOvr>
-</p:sld>
-</file>
-
-<file path=ppt/slides/slide13.xml><?xml version="1.0" encoding="utf-8"?>
-<p:sld xmlns:a="http://schemas.openxmlformats.org/drawingml/2006/main" xmlns:r="http://schemas.openxmlformats.org/officeDocument/2006/relationships" xmlns:p="http://schemas.openxmlformats.org/presentationml/2006/main">
-  <p:cSld>
-    <p:spTree>
-      <p:nvGrpSpPr>
-        <p:cNvPr id="1" name=""/>
-        <p:cNvGrpSpPr/>
-        <p:nvPr/>
-      </p:nvGrpSpPr>
-      <p:grpSpPr>
-        <a:xfrm>
-          <a:off x="0" y="0"/>
-          <a:ext cx="0" cy="0"/>
-          <a:chOff x="0" y="0"/>
-          <a:chExt cx="0" cy="0"/>
-        </a:xfrm>
-      </p:grpSpPr>
-      <p:sp>
-        <p:nvSpPr>
-          <p:cNvPr id="2" name="Title 1">
-            <a:extLst>
-              <a:ext uri="{FF2B5EF4-FFF2-40B4-BE49-F238E27FC236}">
-                <a16:creationId xmlns:a16="http://schemas.microsoft.com/office/drawing/2014/main" id="{11AB2320-53F1-2648-A559-2EFF813D5AE1}"/>
-              </a:ext>
-            </a:extLst>
-          </p:cNvPr>
-          <p:cNvSpPr>
-            <a:spLocks noGrp="1"/>
-          </p:cNvSpPr>
-          <p:nvPr>
-            <p:ph type="title"/>
-          </p:nvPr>
-        </p:nvSpPr>
-        <p:spPr/>
-        <p:txBody>
-          <a:bodyPr/>
-          <a:lstStyle/>
-          <a:p>
-            <a:r>
-              <a:rPr lang="en-US" dirty="0"/>
-              <a:t>Filtering</a:t>
-            </a:r>
-          </a:p>
-        </p:txBody>
-      </p:sp>
-      <p:sp>
-        <p:nvSpPr>
-          <p:cNvPr id="3" name="Content Placeholder 2">
-            <a:extLst>
-              <a:ext uri="{FF2B5EF4-FFF2-40B4-BE49-F238E27FC236}">
-                <a16:creationId xmlns:a16="http://schemas.microsoft.com/office/drawing/2014/main" id="{63B5C89D-897A-ED46-AD08-3ABFAEE012A6}"/>
-              </a:ext>
-            </a:extLst>
-          </p:cNvPr>
-          <p:cNvSpPr>
-            <a:spLocks noGrp="1"/>
-          </p:cNvSpPr>
-          <p:nvPr>
-            <p:ph idx="1"/>
-          </p:nvPr>
-        </p:nvSpPr>
-        <p:spPr/>
-        <p:txBody>
-          <a:bodyPr/>
-          <a:lstStyle/>
-          <a:p>
-            <a:r>
-              <a:rPr lang="en-US" dirty="0"/>
-              <a:t>High frequency vs. low frequency</a:t>
-            </a:r>
-          </a:p>
-          <a:p>
-            <a:r>
-              <a:rPr lang="en-US" dirty="0"/>
-              <a:t>High-pass filters</a:t>
-            </a:r>
-          </a:p>
-          <a:p>
-            <a:r>
-              <a:rPr lang="en-US" dirty="0"/>
-              <a:t>Low-pass filters</a:t>
-            </a:r>
-          </a:p>
-          <a:p>
-            <a:endParaRPr lang="en-US" dirty="0"/>
-          </a:p>
-        </p:txBody>
-      </p:sp>
-    </p:spTree>
-    <p:extLst>
-      <p:ext uri="{BB962C8B-B14F-4D97-AF65-F5344CB8AC3E}">
-        <p14:creationId xmlns:p14="http://schemas.microsoft.com/office/powerpoint/2010/main" val="3962212717"/>
-      </p:ext>
-    </p:extLst>
-  </p:cSld>
-  <p:clrMapOvr>
-    <a:masterClrMapping/>
-  </p:clrMapOvr>
-</p:sld>
-</file>
-
-<file path=ppt/slides/slide14.xml><?xml version="1.0" encoding="utf-8"?>
-<p:sld xmlns:a="http://schemas.openxmlformats.org/drawingml/2006/main" xmlns:r="http://schemas.openxmlformats.org/officeDocument/2006/relationships" xmlns:p="http://schemas.openxmlformats.org/presentationml/2006/main">
-  <p:cSld>
-    <p:spTree>
-      <p:nvGrpSpPr>
-        <p:cNvPr id="1" name=""/>
-        <p:cNvGrpSpPr/>
-        <p:nvPr/>
-      </p:nvGrpSpPr>
-      <p:grpSpPr>
-        <a:xfrm>
-          <a:off x="0" y="0"/>
-          <a:ext cx="0" cy="0"/>
-          <a:chOff x="0" y="0"/>
-          <a:chExt cx="0" cy="0"/>
-        </a:xfrm>
-      </p:grpSpPr>
-      <p:sp>
-        <p:nvSpPr>
-          <p:cNvPr id="2" name="Title 1">
-            <a:extLst>
-              <a:ext uri="{FF2B5EF4-FFF2-40B4-BE49-F238E27FC236}">
-                <a16:creationId xmlns:a16="http://schemas.microsoft.com/office/drawing/2014/main" id="{5A383F46-4758-DE4F-B8B3-01383989109D}"/>
-              </a:ext>
-            </a:extLst>
-          </p:cNvPr>
-          <p:cNvSpPr>
-            <a:spLocks noGrp="1"/>
-          </p:cNvSpPr>
-          <p:nvPr>
-            <p:ph type="title"/>
-          </p:nvPr>
-        </p:nvSpPr>
-        <p:spPr/>
-        <p:txBody>
-          <a:bodyPr/>
-          <a:lstStyle/>
-          <a:p>
-            <a:r>
-              <a:rPr lang="en-US" dirty="0"/>
-              <a:t>IMU Internal Accelerometer Filter</a:t>
-            </a:r>
-          </a:p>
-        </p:txBody>
-      </p:sp>
-      <p:sp>
-        <p:nvSpPr>
-          <p:cNvPr id="3" name="Content Placeholder 2">
-            <a:extLst>
-              <a:ext uri="{FF2B5EF4-FFF2-40B4-BE49-F238E27FC236}">
-                <a16:creationId xmlns:a16="http://schemas.microsoft.com/office/drawing/2014/main" id="{3B5ED085-D8DE-7640-935E-BA25B14DE163}"/>
-              </a:ext>
-            </a:extLst>
-          </p:cNvPr>
-          <p:cNvSpPr>
-            <a:spLocks noGrp="1"/>
-          </p:cNvSpPr>
-          <p:nvPr>
-            <p:ph idx="1"/>
-          </p:nvPr>
-        </p:nvSpPr>
-        <p:spPr/>
-        <p:txBody>
-          <a:bodyPr/>
-          <a:lstStyle/>
-          <a:p>
-            <a:endParaRPr lang="en-US"/>
-          </a:p>
-        </p:txBody>
-      </p:sp>
-    </p:spTree>
-    <p:extLst>
-      <p:ext uri="{BB962C8B-B14F-4D97-AF65-F5344CB8AC3E}">
-        <p14:creationId xmlns:p14="http://schemas.microsoft.com/office/powerpoint/2010/main" val="3878210044"/>
-      </p:ext>
-    </p:extLst>
-  </p:cSld>
-  <p:clrMapOvr>
-    <a:masterClrMapping/>
-  </p:clrMapOvr>
-</p:sld>
-</file>
-
-<file path=ppt/slides/slide15.xml><?xml version="1.0" encoding="utf-8"?>
 <p:sld xmlns:a="http://schemas.openxmlformats.org/drawingml/2006/main" xmlns:r="http://schemas.openxmlformats.org/officeDocument/2006/relationships" xmlns:p="http://schemas.openxmlformats.org/presentationml/2006/main">
   <p:cSld>
     <p:spTree>
@@ -3988,7 +3738,7 @@
 </p:sld>
 </file>
 
-<file path=ppt/slides/slide16.xml><?xml version="1.0" encoding="utf-8"?>
+<file path=ppt/slides/slide13.xml><?xml version="1.0" encoding="utf-8"?>
 <p:sld xmlns:a="http://schemas.openxmlformats.org/drawingml/2006/main" xmlns:r="http://schemas.openxmlformats.org/officeDocument/2006/relationships" xmlns:p="http://schemas.openxmlformats.org/presentationml/2006/main">
   <p:cSld>
     <p:spTree>
@@ -4098,7 +3848,7 @@
 </p:sld>
 </file>
 
-<file path=ppt/slides/slide17.xml><?xml version="1.0" encoding="utf-8"?>
+<file path=ppt/slides/slide14.xml><?xml version="1.0" encoding="utf-8"?>
 <p:sld xmlns:a="http://schemas.openxmlformats.org/drawingml/2006/main" xmlns:r="http://schemas.openxmlformats.org/officeDocument/2006/relationships" xmlns:p="http://schemas.openxmlformats.org/presentationml/2006/main">
   <p:cSld>
     <p:spTree>
@@ -4208,7 +3958,7 @@
 </p:sld>
 </file>
 
-<file path=ppt/slides/slide18.xml><?xml version="1.0" encoding="utf-8"?>
+<file path=ppt/slides/slide15.xml><?xml version="1.0" encoding="utf-8"?>
 <p:sld xmlns:a="http://schemas.openxmlformats.org/drawingml/2006/main" xmlns:r="http://schemas.openxmlformats.org/officeDocument/2006/relationships" xmlns:p="http://schemas.openxmlformats.org/presentationml/2006/main">
   <p:cSld>
     <p:spTree>
@@ -4346,6 +4096,289 @@
 </p:sld>
 </file>
 
+<file path=ppt/slides/slide16.xml><?xml version="1.0" encoding="utf-8"?>
+<p:sld xmlns:a="http://schemas.openxmlformats.org/drawingml/2006/main" xmlns:r="http://schemas.openxmlformats.org/officeDocument/2006/relationships" xmlns:p="http://schemas.openxmlformats.org/presentationml/2006/main">
+  <p:cSld>
+    <p:spTree>
+      <p:nvGrpSpPr>
+        <p:cNvPr id="1" name=""/>
+        <p:cNvGrpSpPr/>
+        <p:nvPr/>
+      </p:nvGrpSpPr>
+      <p:grpSpPr>
+        <a:xfrm>
+          <a:off x="0" y="0"/>
+          <a:ext cx="0" cy="0"/>
+          <a:chOff x="0" y="0"/>
+          <a:chExt cx="0" cy="0"/>
+        </a:xfrm>
+      </p:grpSpPr>
+      <p:sp>
+        <p:nvSpPr>
+          <p:cNvPr id="2" name="Title 1">
+            <a:extLst>
+              <a:ext uri="{FF2B5EF4-FFF2-40B4-BE49-F238E27FC236}">
+                <a16:creationId xmlns:a16="http://schemas.microsoft.com/office/drawing/2014/main" id="{9F65D6D3-6D4B-E447-8D7E-B403E1E94B3C}"/>
+              </a:ext>
+            </a:extLst>
+          </p:cNvPr>
+          <p:cNvSpPr>
+            <a:spLocks noGrp="1"/>
+          </p:cNvSpPr>
+          <p:nvPr>
+            <p:ph type="title"/>
+          </p:nvPr>
+        </p:nvSpPr>
+        <p:spPr/>
+        <p:txBody>
+          <a:bodyPr/>
+          <a:lstStyle/>
+          <a:p>
+            <a:r>
+              <a:rPr lang="en-US"/>
+              <a:t>I2C Peripherals</a:t>
+            </a:r>
+          </a:p>
+        </p:txBody>
+      </p:sp>
+      <p:sp>
+        <p:nvSpPr>
+          <p:cNvPr id="3" name="Content Placeholder 2">
+            <a:extLst>
+              <a:ext uri="{FF2B5EF4-FFF2-40B4-BE49-F238E27FC236}">
+                <a16:creationId xmlns:a16="http://schemas.microsoft.com/office/drawing/2014/main" id="{E38307B0-A0F7-324A-A78B-4501303FB6B5}"/>
+              </a:ext>
+            </a:extLst>
+          </p:cNvPr>
+          <p:cNvSpPr>
+            <a:spLocks noGrp="1"/>
+          </p:cNvSpPr>
+          <p:nvPr>
+            <p:ph idx="1"/>
+          </p:nvPr>
+        </p:nvSpPr>
+        <p:spPr/>
+        <p:txBody>
+          <a:bodyPr/>
+          <a:lstStyle/>
+          <a:p>
+            <a:endParaRPr lang="en-US"/>
+          </a:p>
+        </p:txBody>
+      </p:sp>
+    </p:spTree>
+    <p:extLst>
+      <p:ext uri="{BB962C8B-B14F-4D97-AF65-F5344CB8AC3E}">
+        <p14:creationId xmlns:p14="http://schemas.microsoft.com/office/powerpoint/2010/main" val="984750688"/>
+      </p:ext>
+    </p:extLst>
+  </p:cSld>
+  <p:clrMapOvr>
+    <a:masterClrMapping/>
+  </p:clrMapOvr>
+</p:sld>
+</file>
+
+<file path=ppt/slides/slide17.xml><?xml version="1.0" encoding="utf-8"?>
+<p:sld xmlns:a="http://schemas.openxmlformats.org/drawingml/2006/main" xmlns:r="http://schemas.openxmlformats.org/officeDocument/2006/relationships" xmlns:p="http://schemas.openxmlformats.org/presentationml/2006/main">
+  <p:cSld>
+    <p:spTree>
+      <p:nvGrpSpPr>
+        <p:cNvPr id="1" name=""/>
+        <p:cNvGrpSpPr/>
+        <p:nvPr/>
+      </p:nvGrpSpPr>
+      <p:grpSpPr>
+        <a:xfrm>
+          <a:off x="0" y="0"/>
+          <a:ext cx="0" cy="0"/>
+          <a:chOff x="0" y="0"/>
+          <a:chExt cx="0" cy="0"/>
+        </a:xfrm>
+      </p:grpSpPr>
+      <p:sp>
+        <p:nvSpPr>
+          <p:cNvPr id="2" name="Title 1">
+            <a:extLst>
+              <a:ext uri="{FF2B5EF4-FFF2-40B4-BE49-F238E27FC236}">
+                <a16:creationId xmlns:a16="http://schemas.microsoft.com/office/drawing/2014/main" id="{9539FFFD-D4F6-1C47-85D2-7EEEDC27F98E}"/>
+              </a:ext>
+            </a:extLst>
+          </p:cNvPr>
+          <p:cNvSpPr>
+            <a:spLocks noGrp="1"/>
+          </p:cNvSpPr>
+          <p:nvPr>
+            <p:ph type="title"/>
+          </p:nvPr>
+        </p:nvSpPr>
+        <p:spPr/>
+        <p:txBody>
+          <a:bodyPr/>
+          <a:lstStyle/>
+          <a:p>
+            <a:endParaRPr lang="en-US" dirty="0"/>
+          </a:p>
+        </p:txBody>
+      </p:sp>
+      <p:sp>
+        <p:nvSpPr>
+          <p:cNvPr id="3" name="Content Placeholder 2">
+            <a:extLst>
+              <a:ext uri="{FF2B5EF4-FFF2-40B4-BE49-F238E27FC236}">
+                <a16:creationId xmlns:a16="http://schemas.microsoft.com/office/drawing/2014/main" id="{F80FD4AD-677B-BD49-8C42-D97DCD39438F}"/>
+              </a:ext>
+            </a:extLst>
+          </p:cNvPr>
+          <p:cNvSpPr>
+            <a:spLocks noGrp="1"/>
+          </p:cNvSpPr>
+          <p:nvPr>
+            <p:ph idx="1"/>
+          </p:nvPr>
+        </p:nvSpPr>
+        <p:spPr/>
+        <p:txBody>
+          <a:bodyPr/>
+          <a:lstStyle/>
+          <a:p>
+            <a:endParaRPr lang="en-US" dirty="0"/>
+          </a:p>
+        </p:txBody>
+      </p:sp>
+      <p:pic>
+        <p:nvPicPr>
+          <p:cNvPr id="5" name="Picture 4">
+            <a:extLst>
+              <a:ext uri="{FF2B5EF4-FFF2-40B4-BE49-F238E27FC236}">
+                <a16:creationId xmlns:a16="http://schemas.microsoft.com/office/drawing/2014/main" id="{BE3AD8F5-D64A-F94D-B723-0E31D0841F40}"/>
+              </a:ext>
+            </a:extLst>
+          </p:cNvPr>
+          <p:cNvPicPr>
+            <a:picLocks noChangeAspect="1"/>
+          </p:cNvPicPr>
+          <p:nvPr/>
+        </p:nvPicPr>
+        <p:blipFill>
+          <a:blip r:embed="rId2"/>
+          <a:stretch>
+            <a:fillRect/>
+          </a:stretch>
+        </p:blipFill>
+        <p:spPr>
+          <a:xfrm>
+            <a:off x="463085" y="365125"/>
+            <a:ext cx="11265830" cy="6307883"/>
+          </a:xfrm>
+          <a:prstGeom prst="rect">
+            <a:avLst/>
+          </a:prstGeom>
+        </p:spPr>
+      </p:pic>
+    </p:spTree>
+    <p:extLst>
+      <p:ext uri="{BB962C8B-B14F-4D97-AF65-F5344CB8AC3E}">
+        <p14:creationId xmlns:p14="http://schemas.microsoft.com/office/powerpoint/2010/main" val="1347653691"/>
+      </p:ext>
+    </p:extLst>
+  </p:cSld>
+  <p:clrMapOvr>
+    <a:masterClrMapping/>
+  </p:clrMapOvr>
+</p:sld>
+</file>
+
+<file path=ppt/slides/slide18.xml><?xml version="1.0" encoding="utf-8"?>
+<p:sld xmlns:a="http://schemas.openxmlformats.org/drawingml/2006/main" xmlns:r="http://schemas.openxmlformats.org/officeDocument/2006/relationships" xmlns:p="http://schemas.openxmlformats.org/presentationml/2006/main">
+  <p:cSld>
+    <p:spTree>
+      <p:nvGrpSpPr>
+        <p:cNvPr id="1" name=""/>
+        <p:cNvGrpSpPr/>
+        <p:nvPr/>
+      </p:nvGrpSpPr>
+      <p:grpSpPr>
+        <a:xfrm>
+          <a:off x="0" y="0"/>
+          <a:ext cx="0" cy="0"/>
+          <a:chOff x="0" y="0"/>
+          <a:chExt cx="0" cy="0"/>
+        </a:xfrm>
+      </p:grpSpPr>
+      <p:sp>
+        <p:nvSpPr>
+          <p:cNvPr id="2" name="Title 1">
+            <a:extLst>
+              <a:ext uri="{FF2B5EF4-FFF2-40B4-BE49-F238E27FC236}">
+                <a16:creationId xmlns:a16="http://schemas.microsoft.com/office/drawing/2014/main" id="{5A383F46-4758-DE4F-B8B3-01383989109D}"/>
+              </a:ext>
+            </a:extLst>
+          </p:cNvPr>
+          <p:cNvSpPr>
+            <a:spLocks noGrp="1"/>
+          </p:cNvSpPr>
+          <p:nvPr>
+            <p:ph type="title"/>
+          </p:nvPr>
+        </p:nvSpPr>
+        <p:spPr/>
+        <p:txBody>
+          <a:bodyPr/>
+          <a:lstStyle/>
+          <a:p>
+            <a:r>
+              <a:rPr lang="en-US" dirty="0"/>
+              <a:t>Gyroscope Datapath</a:t>
+            </a:r>
+          </a:p>
+        </p:txBody>
+      </p:sp>
+      <p:pic>
+        <p:nvPicPr>
+          <p:cNvPr id="5" name="Content Placeholder 4">
+            <a:extLst>
+              <a:ext uri="{FF2B5EF4-FFF2-40B4-BE49-F238E27FC236}">
+                <a16:creationId xmlns:a16="http://schemas.microsoft.com/office/drawing/2014/main" id="{DE407253-754E-6E4F-9BFC-3FE09308704B}"/>
+              </a:ext>
+            </a:extLst>
+          </p:cNvPr>
+          <p:cNvPicPr>
+            <a:picLocks noGrp="1" noChangeAspect="1"/>
+          </p:cNvPicPr>
+          <p:nvPr>
+            <p:ph idx="1"/>
+          </p:nvPr>
+        </p:nvPicPr>
+        <p:blipFill>
+          <a:blip r:embed="rId2"/>
+          <a:stretch>
+            <a:fillRect/>
+          </a:stretch>
+        </p:blipFill>
+        <p:spPr>
+          <a:xfrm>
+            <a:off x="1981200" y="1651273"/>
+            <a:ext cx="8229600" cy="4423816"/>
+          </a:xfrm>
+          <a:prstGeom prst="rect">
+            <a:avLst/>
+          </a:prstGeom>
+        </p:spPr>
+      </p:pic>
+    </p:spTree>
+    <p:extLst>
+      <p:ext uri="{BB962C8B-B14F-4D97-AF65-F5344CB8AC3E}">
+        <p14:creationId xmlns:p14="http://schemas.microsoft.com/office/powerpoint/2010/main" val="1488286159"/>
+      </p:ext>
+    </p:extLst>
+  </p:cSld>
+  <p:clrMapOvr>
+    <a:masterClrMapping/>
+  </p:clrMapOvr>
+</p:sld>
+</file>
+
 <file path=ppt/slides/slide19.xml><?xml version="1.0" encoding="utf-8"?>
 <p:sld xmlns:a="http://schemas.openxmlformats.org/drawingml/2006/main" xmlns:r="http://schemas.openxmlformats.org/officeDocument/2006/relationships" xmlns:p="http://schemas.openxmlformats.org/presentationml/2006/main">
   <p:cSld>
@@ -4368,7 +4401,7 @@
           <p:cNvPr id="2" name="Title 1">
             <a:extLst>
               <a:ext uri="{FF2B5EF4-FFF2-40B4-BE49-F238E27FC236}">
-                <a16:creationId xmlns:a16="http://schemas.microsoft.com/office/drawing/2014/main" id="{9F65D6D3-6D4B-E447-8D7E-B403E1E94B3C}"/>
+                <a16:creationId xmlns:a16="http://schemas.microsoft.com/office/drawing/2014/main" id="{8F3C90F9-C75E-9747-8327-D31485F77AC0}"/>
               </a:ext>
             </a:extLst>
           </p:cNvPr>
@@ -4385,18 +4418,18 @@
           <a:lstStyle/>
           <a:p>
             <a:r>
-              <a:rPr lang="en-US"/>
-              <a:t>I2C Peripherals</a:t>
-            </a:r>
-          </a:p>
-        </p:txBody>
-      </p:sp>
-      <p:sp>
-        <p:nvSpPr>
-          <p:cNvPr id="3" name="Content Placeholder 2">
-            <a:extLst>
-              <a:ext uri="{FF2B5EF4-FFF2-40B4-BE49-F238E27FC236}">
-                <a16:creationId xmlns:a16="http://schemas.microsoft.com/office/drawing/2014/main" id="{E38307B0-A0F7-324A-A78B-4501303FB6B5}"/>
+              <a:rPr lang="en-US" dirty="0"/>
+              <a:t>Filter Example</a:t>
+            </a:r>
+          </a:p>
+        </p:txBody>
+      </p:sp>
+      <p:sp>
+        <p:nvSpPr>
+          <p:cNvPr id="6" name="Content Placeholder 5">
+            <a:extLst>
+              <a:ext uri="{FF2B5EF4-FFF2-40B4-BE49-F238E27FC236}">
+                <a16:creationId xmlns:a16="http://schemas.microsoft.com/office/drawing/2014/main" id="{0733C5D5-66CE-BE4F-BAD0-BCDA9A350F5E}"/>
               </a:ext>
             </a:extLst>
           </p:cNvPr>
@@ -4419,7 +4452,7 @@
     </p:spTree>
     <p:extLst>
       <p:ext uri="{BB962C8B-B14F-4D97-AF65-F5344CB8AC3E}">
-        <p14:creationId xmlns:p14="http://schemas.microsoft.com/office/powerpoint/2010/main" val="984750688"/>
+        <p14:creationId xmlns:p14="http://schemas.microsoft.com/office/powerpoint/2010/main" val="368236525"/>
       </p:ext>
     </p:extLst>
   </p:cSld>
@@ -4725,7 +4758,7 @@
           <p:cNvPr id="2" name="Title 1">
             <a:extLst>
               <a:ext uri="{FF2B5EF4-FFF2-40B4-BE49-F238E27FC236}">
-                <a16:creationId xmlns:a16="http://schemas.microsoft.com/office/drawing/2014/main" id="{9539FFFD-D4F6-1C47-85D2-7EEEDC27F98E}"/>
+                <a16:creationId xmlns:a16="http://schemas.microsoft.com/office/drawing/2014/main" id="{BF4FC43F-B2F2-F94B-B341-DDEFE170B62B}"/>
               </a:ext>
             </a:extLst>
           </p:cNvPr>
@@ -4741,69 +4774,273 @@
           <a:bodyPr/>
           <a:lstStyle/>
           <a:p>
+            <a:r>
+              <a:rPr lang="en-US" dirty="0"/>
+              <a:t>Complimentary Filter</a:t>
+            </a:r>
+          </a:p>
+        </p:txBody>
+      </p:sp>
+      <p:sp>
+        <p:nvSpPr>
+          <p:cNvPr id="3" name="Content Placeholder 2">
+            <a:extLst>
+              <a:ext uri="{FF2B5EF4-FFF2-40B4-BE49-F238E27FC236}">
+                <a16:creationId xmlns:a16="http://schemas.microsoft.com/office/drawing/2014/main" id="{845AB14F-EAD6-0646-A776-5C7F693857BB}"/>
+              </a:ext>
+            </a:extLst>
+          </p:cNvPr>
+          <p:cNvSpPr>
+            <a:spLocks noGrp="1"/>
+          </p:cNvSpPr>
+          <p:nvPr>
+            <p:ph idx="1"/>
+          </p:nvPr>
+        </p:nvSpPr>
+        <p:spPr/>
+        <p:txBody>
+          <a:bodyPr>
+            <a:normAutofit fontScale="92500" lnSpcReduction="10000"/>
+          </a:bodyPr>
+          <a:lstStyle/>
+          <a:p>
+            <a:r>
+              <a:rPr lang="en-US" dirty="0"/>
+              <a:t>Combine the best of accelerometer and gyro</a:t>
+            </a:r>
+          </a:p>
+          <a:p>
+            <a:pPr lvl="1"/>
+            <a:r>
+              <a:rPr lang="en-US" dirty="0"/>
+              <a:t>High-frequency from the gyroscope</a:t>
+            </a:r>
+          </a:p>
+          <a:p>
+            <a:pPr lvl="1"/>
+            <a:r>
+              <a:rPr lang="en-US" dirty="0"/>
+              <a:t>Low frequency from the accelerometer</a:t>
+            </a:r>
+          </a:p>
+          <a:p>
+            <a:r>
+              <a:rPr lang="en-US" dirty="0"/>
+              <a:t>The math is pretty simple</a:t>
+            </a:r>
+          </a:p>
+          <a:p>
             <a:endParaRPr lang="en-US" dirty="0"/>
           </a:p>
-        </p:txBody>
-      </p:sp>
-      <p:sp>
-        <p:nvSpPr>
-          <p:cNvPr id="3" name="Content Placeholder 2">
-            <a:extLst>
-              <a:ext uri="{FF2B5EF4-FFF2-40B4-BE49-F238E27FC236}">
-                <a16:creationId xmlns:a16="http://schemas.microsoft.com/office/drawing/2014/main" id="{F80FD4AD-677B-BD49-8C42-D97DCD39438F}"/>
-              </a:ext>
-            </a:extLst>
-          </p:cNvPr>
-          <p:cNvSpPr>
-            <a:spLocks noGrp="1"/>
-          </p:cNvSpPr>
-          <p:nvPr>
-            <p:ph idx="1"/>
-          </p:nvPr>
-        </p:nvSpPr>
-        <p:spPr/>
-        <p:txBody>
-          <a:bodyPr/>
-          <a:lstStyle/>
-          <a:p>
+          <a:p>
+            <a:pPr marL="0" indent="0">
+              <a:buNone/>
+            </a:pPr>
             <a:endParaRPr lang="en-US" dirty="0"/>
           </a:p>
-        </p:txBody>
-      </p:sp>
-      <p:pic>
-        <p:nvPicPr>
-          <p:cNvPr id="5" name="Picture 4">
-            <a:extLst>
-              <a:ext uri="{FF2B5EF4-FFF2-40B4-BE49-F238E27FC236}">
-                <a16:creationId xmlns:a16="http://schemas.microsoft.com/office/drawing/2014/main" id="{BE3AD8F5-D64A-F94D-B723-0E31D0841F40}"/>
-              </a:ext>
-            </a:extLst>
-          </p:cNvPr>
-          <p:cNvPicPr>
-            <a:picLocks noChangeAspect="1"/>
-          </p:cNvPicPr>
+          <a:p>
+            <a:pPr marL="857250" lvl="2" indent="0">
+              <a:buNone/>
+            </a:pPr>
+            <a:r>
+              <a:rPr lang="en-US" dirty="0" err="1"/>
+              <a:t>θ</a:t>
+            </a:r>
+            <a:r>
+              <a:rPr lang="en-US" baseline="-25000" dirty="0" err="1"/>
+              <a:t>new</a:t>
+            </a:r>
+            <a:r>
+              <a:rPr lang="en-US" dirty="0"/>
+              <a:t> 		the new estimated Euler angle</a:t>
+            </a:r>
+          </a:p>
+          <a:p>
+            <a:pPr marL="857250" lvl="2" indent="0">
+              <a:buNone/>
+            </a:pPr>
+            <a:r>
+              <a:rPr lang="el-GR" dirty="0"/>
+              <a:t>Θ</a:t>
+            </a:r>
+            <a:r>
+              <a:rPr lang="en-US" baseline="-25000" dirty="0"/>
+              <a:t>old</a:t>
+            </a:r>
+            <a:r>
+              <a:rPr lang="en-US" dirty="0"/>
+              <a:t> 		the previous estimated </a:t>
+            </a:r>
+            <a:r>
+              <a:rPr lang="en-US" dirty="0" err="1"/>
+              <a:t>Eurler</a:t>
+            </a:r>
+            <a:r>
+              <a:rPr lang="en-US" dirty="0"/>
+              <a:t> angle</a:t>
+            </a:r>
+            <a:endParaRPr lang="en-US" baseline="-25000" dirty="0"/>
+          </a:p>
+          <a:p>
+            <a:pPr marL="857250" lvl="2" indent="0">
+              <a:buNone/>
+            </a:pPr>
+            <a:r>
+              <a:rPr lang="en-US" dirty="0" err="1"/>
+              <a:t>dθ</a:t>
+            </a:r>
+            <a:r>
+              <a:rPr lang="en-US" dirty="0"/>
+              <a:t>/</a:t>
+            </a:r>
+            <a:r>
+              <a:rPr lang="en-US" dirty="0" err="1"/>
+              <a:t>dt</a:t>
+            </a:r>
+            <a:r>
+              <a:rPr lang="en-US" dirty="0"/>
+              <a:t> 	gyro measurement</a:t>
+            </a:r>
+          </a:p>
+          <a:p>
+            <a:pPr marL="857250" lvl="2" indent="0">
+              <a:buNone/>
+            </a:pPr>
+            <a:r>
+              <a:rPr lang="en-US" dirty="0" err="1"/>
+              <a:t>Δt</a:t>
+            </a:r>
+            <a:r>
+              <a:rPr lang="en-US" dirty="0"/>
+              <a:t> 		Time since last gyro measurement</a:t>
+            </a:r>
+          </a:p>
+          <a:p>
+            <a:pPr marL="857250" lvl="2" indent="0">
+              <a:buNone/>
+            </a:pPr>
+            <a:r>
+              <a:rPr lang="en-US" dirty="0" err="1"/>
+              <a:t>θ</a:t>
+            </a:r>
+            <a:r>
+              <a:rPr lang="en-US" baseline="-25000" dirty="0" err="1"/>
+              <a:t>e</a:t>
+            </a:r>
+            <a:r>
+              <a:rPr lang="en-US" dirty="0"/>
+              <a:t> 		Euler angle from the accelerometer</a:t>
+            </a:r>
+          </a:p>
+          <a:p>
+            <a:pPr marL="857250" lvl="2" indent="0">
+              <a:buNone/>
+            </a:pPr>
+            <a:r>
+              <a:rPr lang="en-US" dirty="0"/>
+              <a:t>C		The “complimentary gain”</a:t>
+            </a:r>
+          </a:p>
+          <a:p>
+            <a:endParaRPr lang="en-US" baseline="-25000" dirty="0"/>
+          </a:p>
+          <a:p>
+            <a:endParaRPr lang="en-US" dirty="0"/>
+          </a:p>
+        </p:txBody>
+      </p:sp>
+      <p:sp>
+        <p:nvSpPr>
+          <p:cNvPr id="4" name="TextBox 3">
+            <a:extLst>
+              <a:ext uri="{FF2B5EF4-FFF2-40B4-BE49-F238E27FC236}">
+                <a16:creationId xmlns:a16="http://schemas.microsoft.com/office/drawing/2014/main" id="{4F17CDA2-76E8-774E-86DE-4C2BA3765C8D}"/>
+              </a:ext>
+            </a:extLst>
+          </p:cNvPr>
+          <p:cNvSpPr txBox="1"/>
           <p:nvPr/>
-        </p:nvPicPr>
-        <p:blipFill>
-          <a:blip r:embed="rId2"/>
-          <a:stretch>
-            <a:fillRect/>
-          </a:stretch>
-        </p:blipFill>
+        </p:nvSpPr>
         <p:spPr>
           <a:xfrm>
-            <a:off x="463085" y="365125"/>
-            <a:ext cx="11265830" cy="6307883"/>
+            <a:off x="3455579" y="3429000"/>
+            <a:ext cx="5507085" cy="523220"/>
           </a:xfrm>
           <a:prstGeom prst="rect">
             <a:avLst/>
           </a:prstGeom>
+          <a:noFill/>
         </p:spPr>
-      </p:pic>
+        <p:txBody>
+          <a:bodyPr wrap="none" rtlCol="0">
+            <a:spAutoFit/>
+          </a:bodyPr>
+          <a:lstStyle/>
+          <a:p>
+            <a:r>
+              <a:rPr lang="en-US" sz="2800" dirty="0" err="1"/>
+              <a:t>θ</a:t>
+            </a:r>
+            <a:r>
+              <a:rPr lang="en-US" sz="2800" baseline="-25000" dirty="0" err="1"/>
+              <a:t>new</a:t>
+            </a:r>
+            <a:r>
+              <a:rPr lang="en-US" sz="2800" dirty="0"/>
+              <a:t> = C*(</a:t>
+            </a:r>
+            <a:r>
+              <a:rPr lang="en-US" sz="2800" dirty="0" err="1"/>
+              <a:t>θ</a:t>
+            </a:r>
+            <a:r>
+              <a:rPr lang="en-US" sz="2800" baseline="-25000" dirty="0" err="1"/>
+              <a:t>old</a:t>
+            </a:r>
+            <a:r>
+              <a:rPr lang="en-US" sz="2800" dirty="0"/>
+              <a:t> + </a:t>
+            </a:r>
+            <a:r>
+              <a:rPr lang="en-US" sz="2800" dirty="0" err="1"/>
+              <a:t>Δt</a:t>
+            </a:r>
+            <a:r>
+              <a:rPr lang="en-US" sz="2800" dirty="0"/>
+              <a:t>*</a:t>
+            </a:r>
+            <a:r>
+              <a:rPr lang="en-US" sz="2800" dirty="0" err="1"/>
+              <a:t>dθ</a:t>
+            </a:r>
+            <a:r>
+              <a:rPr lang="en-US" sz="2800" dirty="0"/>
+              <a:t>/</a:t>
+            </a:r>
+            <a:r>
+              <a:rPr lang="en-US" sz="2800" dirty="0" err="1"/>
+              <a:t>dt</a:t>
+            </a:r>
+            <a:r>
+              <a:rPr lang="en-US" sz="2800" dirty="0"/>
+              <a:t> ) + (1-C)*</a:t>
+            </a:r>
+            <a:r>
+              <a:rPr lang="en-US" sz="2800" dirty="0" err="1"/>
+              <a:t>θ</a:t>
+            </a:r>
+            <a:r>
+              <a:rPr lang="en-US" sz="2800" baseline="-25000" dirty="0" err="1"/>
+              <a:t>e</a:t>
+            </a:r>
+            <a:endParaRPr lang="en-US" sz="2800" baseline="-25000" dirty="0"/>
+          </a:p>
+        </p:txBody>
+      </p:sp>
     </p:spTree>
     <p:extLst>
       <p:ext uri="{BB962C8B-B14F-4D97-AF65-F5344CB8AC3E}">
-        <p14:creationId xmlns:p14="http://schemas.microsoft.com/office/powerpoint/2010/main" val="1347653691"/>
+        <p14:creationId xmlns:p14="http://schemas.microsoft.com/office/powerpoint/2010/main" val="3577497764"/>
       </p:ext>
     </p:extLst>
   </p:cSld>
@@ -4835,583 +5072,6 @@
           <p:cNvPr id="2" name="Title 1">
             <a:extLst>
               <a:ext uri="{FF2B5EF4-FFF2-40B4-BE49-F238E27FC236}">
-                <a16:creationId xmlns:a16="http://schemas.microsoft.com/office/drawing/2014/main" id="{911697ED-27AC-BD44-973D-02115AF52BB6}"/>
-              </a:ext>
-            </a:extLst>
-          </p:cNvPr>
-          <p:cNvSpPr>
-            <a:spLocks noGrp="1"/>
-          </p:cNvSpPr>
-          <p:nvPr>
-            <p:ph type="title"/>
-          </p:nvPr>
-        </p:nvSpPr>
-        <p:spPr/>
-        <p:txBody>
-          <a:bodyPr/>
-          <a:lstStyle/>
-          <a:p>
-            <a:r>
-              <a:rPr lang="en-US" dirty="0"/>
-              <a:t>Accelerometer Datapath</a:t>
-            </a:r>
-          </a:p>
-        </p:txBody>
-      </p:sp>
-      <p:pic>
-        <p:nvPicPr>
-          <p:cNvPr id="5" name="Content Placeholder 4">
-            <a:extLst>
-              <a:ext uri="{FF2B5EF4-FFF2-40B4-BE49-F238E27FC236}">
-                <a16:creationId xmlns:a16="http://schemas.microsoft.com/office/drawing/2014/main" id="{C5ED9B00-2CFF-574C-9258-14815375CA9C}"/>
-              </a:ext>
-            </a:extLst>
-          </p:cNvPr>
-          <p:cNvPicPr>
-            <a:picLocks noGrp="1" noChangeAspect="1"/>
-          </p:cNvPicPr>
-          <p:nvPr>
-            <p:ph idx="1"/>
-          </p:nvPr>
-        </p:nvPicPr>
-        <p:blipFill>
-          <a:blip r:embed="rId2"/>
-          <a:stretch>
-            <a:fillRect/>
-          </a:stretch>
-        </p:blipFill>
-        <p:spPr>
-          <a:xfrm>
-            <a:off x="1780938" y="1744276"/>
-            <a:ext cx="8496980" cy="4172430"/>
-          </a:xfrm>
-          <a:prstGeom prst="rect">
-            <a:avLst/>
-          </a:prstGeom>
-        </p:spPr>
-      </p:pic>
-    </p:spTree>
-    <p:extLst>
-      <p:ext uri="{BB962C8B-B14F-4D97-AF65-F5344CB8AC3E}">
-        <p14:creationId xmlns:p14="http://schemas.microsoft.com/office/powerpoint/2010/main" val="3262093970"/>
-      </p:ext>
-    </p:extLst>
-  </p:cSld>
-  <p:clrMapOvr>
-    <a:masterClrMapping/>
-  </p:clrMapOvr>
-</p:sld>
-</file>
-
-<file path=ppt/slides/slide22.xml><?xml version="1.0" encoding="utf-8"?>
-<p:sld xmlns:a="http://schemas.openxmlformats.org/drawingml/2006/main" xmlns:r="http://schemas.openxmlformats.org/officeDocument/2006/relationships" xmlns:p="http://schemas.openxmlformats.org/presentationml/2006/main">
-  <p:cSld>
-    <p:spTree>
-      <p:nvGrpSpPr>
-        <p:cNvPr id="1" name=""/>
-        <p:cNvGrpSpPr/>
-        <p:nvPr/>
-      </p:nvGrpSpPr>
-      <p:grpSpPr>
-        <a:xfrm>
-          <a:off x="0" y="0"/>
-          <a:ext cx="0" cy="0"/>
-          <a:chOff x="0" y="0"/>
-          <a:chExt cx="0" cy="0"/>
-        </a:xfrm>
-      </p:grpSpPr>
-      <p:sp>
-        <p:nvSpPr>
-          <p:cNvPr id="2" name="Title 1">
-            <a:extLst>
-              <a:ext uri="{FF2B5EF4-FFF2-40B4-BE49-F238E27FC236}">
-                <a16:creationId xmlns:a16="http://schemas.microsoft.com/office/drawing/2014/main" id="{5A383F46-4758-DE4F-B8B3-01383989109D}"/>
-              </a:ext>
-            </a:extLst>
-          </p:cNvPr>
-          <p:cNvSpPr>
-            <a:spLocks noGrp="1"/>
-          </p:cNvSpPr>
-          <p:nvPr>
-            <p:ph type="title"/>
-          </p:nvPr>
-        </p:nvSpPr>
-        <p:spPr/>
-        <p:txBody>
-          <a:bodyPr/>
-          <a:lstStyle/>
-          <a:p>
-            <a:r>
-              <a:rPr lang="en-US" dirty="0"/>
-              <a:t>Gyroscope Datapath</a:t>
-            </a:r>
-          </a:p>
-        </p:txBody>
-      </p:sp>
-      <p:pic>
-        <p:nvPicPr>
-          <p:cNvPr id="5" name="Content Placeholder 4">
-            <a:extLst>
-              <a:ext uri="{FF2B5EF4-FFF2-40B4-BE49-F238E27FC236}">
-                <a16:creationId xmlns:a16="http://schemas.microsoft.com/office/drawing/2014/main" id="{DE407253-754E-6E4F-9BFC-3FE09308704B}"/>
-              </a:ext>
-            </a:extLst>
-          </p:cNvPr>
-          <p:cNvPicPr>
-            <a:picLocks noGrp="1" noChangeAspect="1"/>
-          </p:cNvPicPr>
-          <p:nvPr>
-            <p:ph idx="1"/>
-          </p:nvPr>
-        </p:nvPicPr>
-        <p:blipFill>
-          <a:blip r:embed="rId2"/>
-          <a:stretch>
-            <a:fillRect/>
-          </a:stretch>
-        </p:blipFill>
-        <p:spPr>
-          <a:xfrm>
-            <a:off x="1981200" y="1651273"/>
-            <a:ext cx="8229600" cy="4423816"/>
-          </a:xfrm>
-          <a:prstGeom prst="rect">
-            <a:avLst/>
-          </a:prstGeom>
-        </p:spPr>
-      </p:pic>
-    </p:spTree>
-    <p:extLst>
-      <p:ext uri="{BB962C8B-B14F-4D97-AF65-F5344CB8AC3E}">
-        <p14:creationId xmlns:p14="http://schemas.microsoft.com/office/powerpoint/2010/main" val="1488286159"/>
-      </p:ext>
-    </p:extLst>
-  </p:cSld>
-  <p:clrMapOvr>
-    <a:masterClrMapping/>
-  </p:clrMapOvr>
-</p:sld>
-</file>
-
-<file path=ppt/slides/slide23.xml><?xml version="1.0" encoding="utf-8"?>
-<p:sld xmlns:a="http://schemas.openxmlformats.org/drawingml/2006/main" xmlns:r="http://schemas.openxmlformats.org/officeDocument/2006/relationships" xmlns:p="http://schemas.openxmlformats.org/presentationml/2006/main">
-  <p:cSld>
-    <p:spTree>
-      <p:nvGrpSpPr>
-        <p:cNvPr id="1" name=""/>
-        <p:cNvGrpSpPr/>
-        <p:nvPr/>
-      </p:nvGrpSpPr>
-      <p:grpSpPr>
-        <a:xfrm>
-          <a:off x="0" y="0"/>
-          <a:ext cx="0" cy="0"/>
-          <a:chOff x="0" y="0"/>
-          <a:chExt cx="0" cy="0"/>
-        </a:xfrm>
-      </p:grpSpPr>
-      <p:sp>
-        <p:nvSpPr>
-          <p:cNvPr id="2" name="Title 1">
-            <a:extLst>
-              <a:ext uri="{FF2B5EF4-FFF2-40B4-BE49-F238E27FC236}">
-                <a16:creationId xmlns:a16="http://schemas.microsoft.com/office/drawing/2014/main" id="{8F3C90F9-C75E-9747-8327-D31485F77AC0}"/>
-              </a:ext>
-            </a:extLst>
-          </p:cNvPr>
-          <p:cNvSpPr>
-            <a:spLocks noGrp="1"/>
-          </p:cNvSpPr>
-          <p:nvPr>
-            <p:ph type="title"/>
-          </p:nvPr>
-        </p:nvSpPr>
-        <p:spPr/>
-        <p:txBody>
-          <a:bodyPr/>
-          <a:lstStyle/>
-          <a:p>
-            <a:r>
-              <a:rPr lang="en-US" dirty="0"/>
-              <a:t>Filter Example</a:t>
-            </a:r>
-          </a:p>
-        </p:txBody>
-      </p:sp>
-      <p:sp>
-        <p:nvSpPr>
-          <p:cNvPr id="6" name="Content Placeholder 5">
-            <a:extLst>
-              <a:ext uri="{FF2B5EF4-FFF2-40B4-BE49-F238E27FC236}">
-                <a16:creationId xmlns:a16="http://schemas.microsoft.com/office/drawing/2014/main" id="{0733C5D5-66CE-BE4F-BAD0-BCDA9A350F5E}"/>
-              </a:ext>
-            </a:extLst>
-          </p:cNvPr>
-          <p:cNvSpPr>
-            <a:spLocks noGrp="1"/>
-          </p:cNvSpPr>
-          <p:nvPr>
-            <p:ph idx="1"/>
-          </p:nvPr>
-        </p:nvSpPr>
-        <p:spPr/>
-        <p:txBody>
-          <a:bodyPr/>
-          <a:lstStyle/>
-          <a:p>
-            <a:endParaRPr lang="en-US"/>
-          </a:p>
-        </p:txBody>
-      </p:sp>
-    </p:spTree>
-    <p:extLst>
-      <p:ext uri="{BB962C8B-B14F-4D97-AF65-F5344CB8AC3E}">
-        <p14:creationId xmlns:p14="http://schemas.microsoft.com/office/powerpoint/2010/main" val="368236525"/>
-      </p:ext>
-    </p:extLst>
-  </p:cSld>
-  <p:clrMapOvr>
-    <a:masterClrMapping/>
-  </p:clrMapOvr>
-</p:sld>
-</file>
-
-<file path=ppt/slides/slide24.xml><?xml version="1.0" encoding="utf-8"?>
-<p:sld xmlns:a="http://schemas.openxmlformats.org/drawingml/2006/main" xmlns:r="http://schemas.openxmlformats.org/officeDocument/2006/relationships" xmlns:p="http://schemas.openxmlformats.org/presentationml/2006/main">
-  <p:cSld>
-    <p:spTree>
-      <p:nvGrpSpPr>
-        <p:cNvPr id="1" name=""/>
-        <p:cNvGrpSpPr/>
-        <p:nvPr/>
-      </p:nvGrpSpPr>
-      <p:grpSpPr>
-        <a:xfrm>
-          <a:off x="0" y="0"/>
-          <a:ext cx="0" cy="0"/>
-          <a:chOff x="0" y="0"/>
-          <a:chExt cx="0" cy="0"/>
-        </a:xfrm>
-      </p:grpSpPr>
-      <p:sp>
-        <p:nvSpPr>
-          <p:cNvPr id="2" name="Title 1">
-            <a:extLst>
-              <a:ext uri="{FF2B5EF4-FFF2-40B4-BE49-F238E27FC236}">
-                <a16:creationId xmlns:a16="http://schemas.microsoft.com/office/drawing/2014/main" id="{BF4FC43F-B2F2-F94B-B341-DDEFE170B62B}"/>
-              </a:ext>
-            </a:extLst>
-          </p:cNvPr>
-          <p:cNvSpPr>
-            <a:spLocks noGrp="1"/>
-          </p:cNvSpPr>
-          <p:nvPr>
-            <p:ph type="title"/>
-          </p:nvPr>
-        </p:nvSpPr>
-        <p:spPr/>
-        <p:txBody>
-          <a:bodyPr/>
-          <a:lstStyle/>
-          <a:p>
-            <a:r>
-              <a:rPr lang="en-US" dirty="0"/>
-              <a:t>Complimentary Filter</a:t>
-            </a:r>
-          </a:p>
-        </p:txBody>
-      </p:sp>
-      <p:sp>
-        <p:nvSpPr>
-          <p:cNvPr id="3" name="Content Placeholder 2">
-            <a:extLst>
-              <a:ext uri="{FF2B5EF4-FFF2-40B4-BE49-F238E27FC236}">
-                <a16:creationId xmlns:a16="http://schemas.microsoft.com/office/drawing/2014/main" id="{845AB14F-EAD6-0646-A776-5C7F693857BB}"/>
-              </a:ext>
-            </a:extLst>
-          </p:cNvPr>
-          <p:cNvSpPr>
-            <a:spLocks noGrp="1"/>
-          </p:cNvSpPr>
-          <p:nvPr>
-            <p:ph idx="1"/>
-          </p:nvPr>
-        </p:nvSpPr>
-        <p:spPr/>
-        <p:txBody>
-          <a:bodyPr>
-            <a:normAutofit fontScale="92500" lnSpcReduction="10000"/>
-          </a:bodyPr>
-          <a:lstStyle/>
-          <a:p>
-            <a:r>
-              <a:rPr lang="en-US" dirty="0"/>
-              <a:t>Combine the best of accelerometer and gyro</a:t>
-            </a:r>
-          </a:p>
-          <a:p>
-            <a:pPr lvl="1"/>
-            <a:r>
-              <a:rPr lang="en-US" dirty="0"/>
-              <a:t>High-frequency from the gyroscope</a:t>
-            </a:r>
-          </a:p>
-          <a:p>
-            <a:pPr lvl="1"/>
-            <a:r>
-              <a:rPr lang="en-US" dirty="0"/>
-              <a:t>Low frequency from the accelerometer</a:t>
-            </a:r>
-          </a:p>
-          <a:p>
-            <a:r>
-              <a:rPr lang="en-US" dirty="0"/>
-              <a:t>The math is pretty simple</a:t>
-            </a:r>
-          </a:p>
-          <a:p>
-            <a:endParaRPr lang="en-US" dirty="0"/>
-          </a:p>
-          <a:p>
-            <a:pPr marL="0" indent="0">
-              <a:buNone/>
-            </a:pPr>
-            <a:endParaRPr lang="en-US" dirty="0"/>
-          </a:p>
-          <a:p>
-            <a:pPr marL="857250" lvl="2" indent="0">
-              <a:buNone/>
-            </a:pPr>
-            <a:r>
-              <a:rPr lang="en-US" dirty="0" err="1"/>
-              <a:t>θ</a:t>
-            </a:r>
-            <a:r>
-              <a:rPr lang="en-US" baseline="-25000" dirty="0" err="1"/>
-              <a:t>new</a:t>
-            </a:r>
-            <a:r>
-              <a:rPr lang="en-US" dirty="0"/>
-              <a:t> 		the new estimated Euler angle</a:t>
-            </a:r>
-          </a:p>
-          <a:p>
-            <a:pPr marL="857250" lvl="2" indent="0">
-              <a:buNone/>
-            </a:pPr>
-            <a:r>
-              <a:rPr lang="el-GR" dirty="0"/>
-              <a:t>Θ</a:t>
-            </a:r>
-            <a:r>
-              <a:rPr lang="en-US" baseline="-25000" dirty="0"/>
-              <a:t>old</a:t>
-            </a:r>
-            <a:r>
-              <a:rPr lang="en-US" dirty="0"/>
-              <a:t> 		the previous estimated </a:t>
-            </a:r>
-            <a:r>
-              <a:rPr lang="en-US" dirty="0" err="1"/>
-              <a:t>Eurler</a:t>
-            </a:r>
-            <a:r>
-              <a:rPr lang="en-US" dirty="0"/>
-              <a:t> angle</a:t>
-            </a:r>
-            <a:endParaRPr lang="en-US" baseline="-25000" dirty="0"/>
-          </a:p>
-          <a:p>
-            <a:pPr marL="857250" lvl="2" indent="0">
-              <a:buNone/>
-            </a:pPr>
-            <a:r>
-              <a:rPr lang="en-US" dirty="0" err="1"/>
-              <a:t>dθ</a:t>
-            </a:r>
-            <a:r>
-              <a:rPr lang="en-US" dirty="0"/>
-              <a:t>/</a:t>
-            </a:r>
-            <a:r>
-              <a:rPr lang="en-US" dirty="0" err="1"/>
-              <a:t>dt</a:t>
-            </a:r>
-            <a:r>
-              <a:rPr lang="en-US" dirty="0"/>
-              <a:t> 	gyro measurement</a:t>
-            </a:r>
-          </a:p>
-          <a:p>
-            <a:pPr marL="857250" lvl="2" indent="0">
-              <a:buNone/>
-            </a:pPr>
-            <a:r>
-              <a:rPr lang="en-US" dirty="0" err="1"/>
-              <a:t>Δt</a:t>
-            </a:r>
-            <a:r>
-              <a:rPr lang="en-US" dirty="0"/>
-              <a:t> 		Time since last gyro measurement</a:t>
-            </a:r>
-          </a:p>
-          <a:p>
-            <a:pPr marL="857250" lvl="2" indent="0">
-              <a:buNone/>
-            </a:pPr>
-            <a:r>
-              <a:rPr lang="en-US" dirty="0" err="1"/>
-              <a:t>θ</a:t>
-            </a:r>
-            <a:r>
-              <a:rPr lang="en-US" baseline="-25000" dirty="0" err="1"/>
-              <a:t>e</a:t>
-            </a:r>
-            <a:r>
-              <a:rPr lang="en-US" dirty="0"/>
-              <a:t> 		Euler angle from the accelerometer</a:t>
-            </a:r>
-          </a:p>
-          <a:p>
-            <a:pPr marL="857250" lvl="2" indent="0">
-              <a:buNone/>
-            </a:pPr>
-            <a:r>
-              <a:rPr lang="en-US" dirty="0"/>
-              <a:t>C		The “complimentary gain”</a:t>
-            </a:r>
-          </a:p>
-          <a:p>
-            <a:endParaRPr lang="en-US" baseline="-25000" dirty="0"/>
-          </a:p>
-          <a:p>
-            <a:endParaRPr lang="en-US" dirty="0"/>
-          </a:p>
-        </p:txBody>
-      </p:sp>
-      <p:sp>
-        <p:nvSpPr>
-          <p:cNvPr id="4" name="TextBox 3">
-            <a:extLst>
-              <a:ext uri="{FF2B5EF4-FFF2-40B4-BE49-F238E27FC236}">
-                <a16:creationId xmlns:a16="http://schemas.microsoft.com/office/drawing/2014/main" id="{4F17CDA2-76E8-774E-86DE-4C2BA3765C8D}"/>
-              </a:ext>
-            </a:extLst>
-          </p:cNvPr>
-          <p:cNvSpPr txBox="1"/>
-          <p:nvPr/>
-        </p:nvSpPr>
-        <p:spPr>
-          <a:xfrm>
-            <a:off x="3455579" y="3429000"/>
-            <a:ext cx="5507085" cy="523220"/>
-          </a:xfrm>
-          <a:prstGeom prst="rect">
-            <a:avLst/>
-          </a:prstGeom>
-          <a:noFill/>
-        </p:spPr>
-        <p:txBody>
-          <a:bodyPr wrap="none" rtlCol="0">
-            <a:spAutoFit/>
-          </a:bodyPr>
-          <a:lstStyle/>
-          <a:p>
-            <a:r>
-              <a:rPr lang="en-US" sz="2800" dirty="0" err="1"/>
-              <a:t>θ</a:t>
-            </a:r>
-            <a:r>
-              <a:rPr lang="en-US" sz="2800" baseline="-25000" dirty="0" err="1"/>
-              <a:t>new</a:t>
-            </a:r>
-            <a:r>
-              <a:rPr lang="en-US" sz="2800" dirty="0"/>
-              <a:t> = C*(</a:t>
-            </a:r>
-            <a:r>
-              <a:rPr lang="en-US" sz="2800" dirty="0" err="1"/>
-              <a:t>θ</a:t>
-            </a:r>
-            <a:r>
-              <a:rPr lang="en-US" sz="2800" baseline="-25000" dirty="0" err="1"/>
-              <a:t>old</a:t>
-            </a:r>
-            <a:r>
-              <a:rPr lang="en-US" sz="2800" dirty="0"/>
-              <a:t> + </a:t>
-            </a:r>
-            <a:r>
-              <a:rPr lang="en-US" sz="2800" dirty="0" err="1"/>
-              <a:t>Δt</a:t>
-            </a:r>
-            <a:r>
-              <a:rPr lang="en-US" sz="2800" dirty="0"/>
-              <a:t>*</a:t>
-            </a:r>
-            <a:r>
-              <a:rPr lang="en-US" sz="2800" dirty="0" err="1"/>
-              <a:t>dθ</a:t>
-            </a:r>
-            <a:r>
-              <a:rPr lang="en-US" sz="2800" dirty="0"/>
-              <a:t>/</a:t>
-            </a:r>
-            <a:r>
-              <a:rPr lang="en-US" sz="2800" dirty="0" err="1"/>
-              <a:t>dt</a:t>
-            </a:r>
-            <a:r>
-              <a:rPr lang="en-US" sz="2800" dirty="0"/>
-              <a:t> ) + (1-C)*</a:t>
-            </a:r>
-            <a:r>
-              <a:rPr lang="en-US" sz="2800" dirty="0" err="1"/>
-              <a:t>θ</a:t>
-            </a:r>
-            <a:r>
-              <a:rPr lang="en-US" sz="2800" baseline="-25000" dirty="0" err="1"/>
-              <a:t>e</a:t>
-            </a:r>
-            <a:endParaRPr lang="en-US" sz="2800" baseline="-25000" dirty="0"/>
-          </a:p>
-        </p:txBody>
-      </p:sp>
-    </p:spTree>
-    <p:extLst>
-      <p:ext uri="{BB962C8B-B14F-4D97-AF65-F5344CB8AC3E}">
-        <p14:creationId xmlns:p14="http://schemas.microsoft.com/office/powerpoint/2010/main" val="3577497764"/>
-      </p:ext>
-    </p:extLst>
-  </p:cSld>
-  <p:clrMapOvr>
-    <a:masterClrMapping/>
-  </p:clrMapOvr>
-</p:sld>
-</file>
-
-<file path=ppt/slides/slide25.xml><?xml version="1.0" encoding="utf-8"?>
-<p:sld xmlns:a="http://schemas.openxmlformats.org/drawingml/2006/main" xmlns:r="http://schemas.openxmlformats.org/officeDocument/2006/relationships" xmlns:p="http://schemas.openxmlformats.org/presentationml/2006/main">
-  <p:cSld>
-    <p:spTree>
-      <p:nvGrpSpPr>
-        <p:cNvPr id="1" name=""/>
-        <p:cNvGrpSpPr/>
-        <p:nvPr/>
-      </p:nvGrpSpPr>
-      <p:grpSpPr>
-        <a:xfrm>
-          <a:off x="0" y="0"/>
-          <a:ext cx="0" cy="0"/>
-          <a:chOff x="0" y="0"/>
-          <a:chExt cx="0" cy="0"/>
-        </a:xfrm>
-      </p:grpSpPr>
-      <p:sp>
-        <p:nvSpPr>
-          <p:cNvPr id="2" name="Title 1">
-            <a:extLst>
-              <a:ext uri="{FF2B5EF4-FFF2-40B4-BE49-F238E27FC236}">
                 <a16:creationId xmlns:a16="http://schemas.microsoft.com/office/drawing/2014/main" id="{6368B972-5A3A-CE4C-B35B-32475577016C}"/>
               </a:ext>
             </a:extLst>
@@ -5490,7 +5150,7 @@
 </p:sld>
 </file>
 
-<file path=ppt/slides/slide26.xml><?xml version="1.0" encoding="utf-8"?>
+<file path=ppt/slides/slide22.xml><?xml version="1.0" encoding="utf-8"?>
 <p:sld xmlns:a="http://schemas.openxmlformats.org/drawingml/2006/main" xmlns:r="http://schemas.openxmlformats.org/officeDocument/2006/relationships" xmlns:p="http://schemas.openxmlformats.org/presentationml/2006/main">
   <p:cSld>
     <p:spTree>
@@ -5599,7 +5259,7 @@
 </p:sld>
 </file>
 
-<file path=ppt/slides/slide27.xml><?xml version="1.0" encoding="utf-8"?>
+<file path=ppt/slides/slide23.xml><?xml version="1.0" encoding="utf-8"?>
 <p:sld xmlns:a="http://schemas.openxmlformats.org/drawingml/2006/main" xmlns:r="http://schemas.openxmlformats.org/officeDocument/2006/relationships" xmlns:p="http://schemas.openxmlformats.org/presentationml/2006/main">
   <p:cSld>
     <p:spTree>
@@ -5708,7 +5368,7 @@
 </p:sld>
 </file>
 
-<file path=ppt/slides/slide28.xml><?xml version="1.0" encoding="utf-8"?>
+<file path=ppt/slides/slide24.xml><?xml version="1.0" encoding="utf-8"?>
 <p:sld xmlns:a="http://schemas.openxmlformats.org/drawingml/2006/main" xmlns:r="http://schemas.openxmlformats.org/officeDocument/2006/relationships" xmlns:p="http://schemas.openxmlformats.org/presentationml/2006/main">
   <p:cSld>
     <p:spTree>
@@ -5818,7 +5478,7 @@
 </p:sld>
 </file>
 
-<file path=ppt/slides/slide29.xml><?xml version="1.0" encoding="utf-8"?>
+<file path=ppt/slides/slide25.xml><?xml version="1.0" encoding="utf-8"?>
 <p:sld xmlns:a="http://schemas.openxmlformats.org/drawingml/2006/main" xmlns:r="http://schemas.openxmlformats.org/officeDocument/2006/relationships" xmlns:p="http://schemas.openxmlformats.org/presentationml/2006/main">
   <p:cSld>
     <p:spTree>
@@ -5975,7 +5635,7 @@
 </p:sld>
 </file>
 
-<file path=ppt/slides/slide3.xml><?xml version="1.0" encoding="utf-8"?>
+<file path=ppt/slides/slide26.xml><?xml version="1.0" encoding="utf-8"?>
 <p:sld xmlns:a="http://schemas.openxmlformats.org/drawingml/2006/main" xmlns:r="http://schemas.openxmlformats.org/officeDocument/2006/relationships" xmlns:p="http://schemas.openxmlformats.org/presentationml/2006/main">
   <p:cSld>
     <p:spTree>
@@ -5994,101 +5654,6 @@
       </p:grpSpPr>
       <p:sp>
         <p:nvSpPr>
-          <p:cNvPr id="2" name="Title 1"/>
-          <p:cNvSpPr>
-            <a:spLocks noGrp="1"/>
-          </p:cNvSpPr>
-          <p:nvPr>
-            <p:ph type="title"/>
-          </p:nvPr>
-        </p:nvSpPr>
-        <p:spPr/>
-        <p:txBody>
-          <a:bodyPr/>
-          <a:lstStyle/>
-          <a:p>
-            <a:r>
-              <a:rPr lang="en-US" dirty="0"/>
-              <a:t>Maintaining Stability</a:t>
-            </a:r>
-          </a:p>
-        </p:txBody>
-      </p:sp>
-      <p:sp>
-        <p:nvSpPr>
-          <p:cNvPr id="3" name="Content Placeholder 2"/>
-          <p:cNvSpPr>
-            <a:spLocks noGrp="1"/>
-          </p:cNvSpPr>
-          <p:nvPr>
-            <p:ph idx="1"/>
-          </p:nvPr>
-        </p:nvSpPr>
-        <p:spPr/>
-        <p:txBody>
-          <a:bodyPr/>
-          <a:lstStyle/>
-          <a:p>
-            <a:r>
-              <a:rPr lang="en-US" dirty="0"/>
-              <a:t>Multi-rotor aircraft are inherently unstable</a:t>
-            </a:r>
-          </a:p>
-          <a:p>
-            <a:pPr lvl="1"/>
-            <a:r>
-              <a:rPr lang="en-US" dirty="0"/>
-              <a:t>Mismatched motor power (voltage variation, manufacturing variation in motors or props)</a:t>
-            </a:r>
-          </a:p>
-          <a:p>
-            <a:pPr lvl="1"/>
-            <a:r>
-              <a:rPr lang="en-US" dirty="0"/>
-              <a:t>Variation in air currents and density.</a:t>
-            </a:r>
-          </a:p>
-          <a:p>
-            <a:pPr lvl="1"/>
-            <a:r>
-              <a:rPr lang="en-US" dirty="0"/>
-              <a:t>Once perturbed, there’s no force acting on the aircraft to return it to equilibrium.</a:t>
-            </a:r>
-          </a:p>
-        </p:txBody>
-      </p:sp>
-    </p:spTree>
-    <p:extLst>
-      <p:ext uri="{BB962C8B-B14F-4D97-AF65-F5344CB8AC3E}">
-        <p14:creationId xmlns:p14="http://schemas.microsoft.com/office/powerpoint/2010/main" val="171781059"/>
-      </p:ext>
-    </p:extLst>
-  </p:cSld>
-  <p:clrMapOvr>
-    <a:masterClrMapping/>
-  </p:clrMapOvr>
-</p:sld>
-</file>
-
-<file path=ppt/slides/slide30.xml><?xml version="1.0" encoding="utf-8"?>
-<p:sld xmlns:a="http://schemas.openxmlformats.org/drawingml/2006/main" xmlns:r="http://schemas.openxmlformats.org/officeDocument/2006/relationships" xmlns:p="http://schemas.openxmlformats.org/presentationml/2006/main">
-  <p:cSld>
-    <p:spTree>
-      <p:nvGrpSpPr>
-        <p:cNvPr id="1" name=""/>
-        <p:cNvGrpSpPr/>
-        <p:nvPr/>
-      </p:nvGrpSpPr>
-      <p:grpSpPr>
-        <a:xfrm>
-          <a:off x="0" y="0"/>
-          <a:ext cx="0" cy="0"/>
-          <a:chOff x="0" y="0"/>
-          <a:chExt cx="0" cy="0"/>
-        </a:xfrm>
-      </p:grpSpPr>
-      <p:sp>
-        <p:nvSpPr>
           <p:cNvPr id="32" name="Shape 32"/>
           <p:cNvSpPr>
             <a:spLocks noGrp="1"/>
@@ -6152,7 +5717,7 @@
 </p:sld>
 </file>
 
-<file path=ppt/slides/slide31.xml><?xml version="1.0" encoding="utf-8"?>
+<file path=ppt/slides/slide27.xml><?xml version="1.0" encoding="utf-8"?>
 <p:sld xmlns:a="http://schemas.openxmlformats.org/drawingml/2006/main" xmlns:r="http://schemas.openxmlformats.org/officeDocument/2006/relationships" xmlns:p="http://schemas.openxmlformats.org/presentationml/2006/main" show="0">
   <p:cSld>
     <p:spTree>
@@ -6303,7 +5868,7 @@
 </p:sld>
 </file>
 
-<file path=ppt/slides/slide32.xml><?xml version="1.0" encoding="utf-8"?>
+<file path=ppt/slides/slide28.xml><?xml version="1.0" encoding="utf-8"?>
 <p:sld xmlns:a="http://schemas.openxmlformats.org/drawingml/2006/main" xmlns:r="http://schemas.openxmlformats.org/officeDocument/2006/relationships" xmlns:p="http://schemas.openxmlformats.org/presentationml/2006/main" show="0">
   <p:cSld>
     <p:spTree>
@@ -6402,7 +5967,7 @@
 </p:sld>
 </file>
 
-<file path=ppt/slides/slide33.xml><?xml version="1.0" encoding="utf-8"?>
+<file path=ppt/slides/slide29.xml><?xml version="1.0" encoding="utf-8"?>
 <p:sld xmlns:a="http://schemas.openxmlformats.org/drawingml/2006/main" xmlns:r="http://schemas.openxmlformats.org/officeDocument/2006/relationships" xmlns:p="http://schemas.openxmlformats.org/presentationml/2006/main">
   <p:cSld>
     <p:spTree>
@@ -6631,7 +6196,102 @@
 </p:sld>
 </file>
 
-<file path=ppt/slides/slide34.xml><?xml version="1.0" encoding="utf-8"?>
+<file path=ppt/slides/slide3.xml><?xml version="1.0" encoding="utf-8"?>
+<p:sld xmlns:a="http://schemas.openxmlformats.org/drawingml/2006/main" xmlns:r="http://schemas.openxmlformats.org/officeDocument/2006/relationships" xmlns:p="http://schemas.openxmlformats.org/presentationml/2006/main">
+  <p:cSld>
+    <p:spTree>
+      <p:nvGrpSpPr>
+        <p:cNvPr id="1" name=""/>
+        <p:cNvGrpSpPr/>
+        <p:nvPr/>
+      </p:nvGrpSpPr>
+      <p:grpSpPr>
+        <a:xfrm>
+          <a:off x="0" y="0"/>
+          <a:ext cx="0" cy="0"/>
+          <a:chOff x="0" y="0"/>
+          <a:chExt cx="0" cy="0"/>
+        </a:xfrm>
+      </p:grpSpPr>
+      <p:sp>
+        <p:nvSpPr>
+          <p:cNvPr id="2" name="Title 1"/>
+          <p:cNvSpPr>
+            <a:spLocks noGrp="1"/>
+          </p:cNvSpPr>
+          <p:nvPr>
+            <p:ph type="title"/>
+          </p:nvPr>
+        </p:nvSpPr>
+        <p:spPr/>
+        <p:txBody>
+          <a:bodyPr/>
+          <a:lstStyle/>
+          <a:p>
+            <a:r>
+              <a:rPr lang="en-US" dirty="0"/>
+              <a:t>Maintaining Stability</a:t>
+            </a:r>
+          </a:p>
+        </p:txBody>
+      </p:sp>
+      <p:sp>
+        <p:nvSpPr>
+          <p:cNvPr id="3" name="Content Placeholder 2"/>
+          <p:cNvSpPr>
+            <a:spLocks noGrp="1"/>
+          </p:cNvSpPr>
+          <p:nvPr>
+            <p:ph idx="1"/>
+          </p:nvPr>
+        </p:nvSpPr>
+        <p:spPr/>
+        <p:txBody>
+          <a:bodyPr/>
+          <a:lstStyle/>
+          <a:p>
+            <a:r>
+              <a:rPr lang="en-US" dirty="0"/>
+              <a:t>Multi-rotor aircraft are inherently unstable</a:t>
+            </a:r>
+          </a:p>
+          <a:p>
+            <a:pPr lvl="1"/>
+            <a:r>
+              <a:rPr lang="en-US" dirty="0"/>
+              <a:t>Mismatched motor power (voltage variation, manufacturing variation in motors or props)</a:t>
+            </a:r>
+          </a:p>
+          <a:p>
+            <a:pPr lvl="1"/>
+            <a:r>
+              <a:rPr lang="en-US" dirty="0"/>
+              <a:t>Variation in air currents and density.</a:t>
+            </a:r>
+          </a:p>
+          <a:p>
+            <a:pPr lvl="1"/>
+            <a:r>
+              <a:rPr lang="en-US" dirty="0"/>
+              <a:t>Once perturbed, there’s no force acting on the aircraft to return it to equilibrium.</a:t>
+            </a:r>
+          </a:p>
+        </p:txBody>
+      </p:sp>
+    </p:spTree>
+    <p:extLst>
+      <p:ext uri="{BB962C8B-B14F-4D97-AF65-F5344CB8AC3E}">
+        <p14:creationId xmlns:p14="http://schemas.microsoft.com/office/powerpoint/2010/main" val="171781059"/>
+      </p:ext>
+    </p:extLst>
+  </p:cSld>
+  <p:clrMapOvr>
+    <a:masterClrMapping/>
+  </p:clrMapOvr>
+</p:sld>
+</file>
+
+<file path=ppt/slides/slide30.xml><?xml version="1.0" encoding="utf-8"?>
 <p:sld xmlns:a="http://schemas.openxmlformats.org/drawingml/2006/main" xmlns:r="http://schemas.openxmlformats.org/officeDocument/2006/relationships" xmlns:p="http://schemas.openxmlformats.org/presentationml/2006/main">
   <p:cSld>
     <p:spTree>
@@ -6860,7 +6520,7 @@
 </p:sld>
 </file>
 
-<file path=ppt/slides/slide35.xml><?xml version="1.0" encoding="utf-8"?>
+<file path=ppt/slides/slide31.xml><?xml version="1.0" encoding="utf-8"?>
 <p:sld xmlns:a="http://schemas.openxmlformats.org/drawingml/2006/main" xmlns:r="http://schemas.openxmlformats.org/officeDocument/2006/relationships" xmlns:p="http://schemas.openxmlformats.org/presentationml/2006/main">
   <p:cSld>
     <p:spTree>
@@ -7050,7 +6710,7 @@
 </p:sld>
 </file>
 
-<file path=ppt/slides/slide36.xml><?xml version="1.0" encoding="utf-8"?>
+<file path=ppt/slides/slide32.xml><?xml version="1.0" encoding="utf-8"?>
 <p:sld xmlns:a="http://schemas.openxmlformats.org/drawingml/2006/main" xmlns:r="http://schemas.openxmlformats.org/officeDocument/2006/relationships" xmlns:p="http://schemas.openxmlformats.org/presentationml/2006/main">
   <p:cSld>
     <p:spTree>
@@ -7116,7 +6776,7 @@
           <a:lstStyle>
             <a:lvl1pPr>
               <a:defRPr u="sng">
-                <a:hlinkClick r:id=""/>
+                <a:hlinkClick r:id="" action="ppaction://noaction"/>
               </a:defRPr>
             </a:lvl1pPr>
           </a:lstStyle>
@@ -7168,7 +6828,7 @@
 </p:sld>
 </file>
 
-<file path=ppt/slides/slide37.xml><?xml version="1.0" encoding="utf-8"?>
+<file path=ppt/slides/slide33.xml><?xml version="1.0" encoding="utf-8"?>
 <p:sld xmlns:a="http://schemas.openxmlformats.org/drawingml/2006/main" xmlns:r="http://schemas.openxmlformats.org/officeDocument/2006/relationships" xmlns:p="http://schemas.openxmlformats.org/presentationml/2006/main">
   <p:cSld>
     <p:spTree>
@@ -7293,7 +6953,7 @@
 </p:sld>
 </file>
 
-<file path=ppt/slides/slide38.xml><?xml version="1.0" encoding="utf-8"?>
+<file path=ppt/slides/slide34.xml><?xml version="1.0" encoding="utf-8"?>
 <p:sld xmlns:a="http://schemas.openxmlformats.org/drawingml/2006/main" xmlns:r="http://schemas.openxmlformats.org/officeDocument/2006/relationships" xmlns:p="http://schemas.openxmlformats.org/presentationml/2006/main">
   <p:cSld>
     <p:spTree>
@@ -7555,7 +7215,7 @@
           </a:ln>
           <a:extLst>
             <a:ext uri="{C572A759-6A51-4108-AA02-DFA0A04FC94B}">
-              <ma14:wrappingTextBoxFlag xmlns:ma14="http://schemas.microsoft.com/office/mac/drawingml/2011/main" xmlns="" val="1"/>
+              <ma14:wrappingTextBoxFlag xmlns="" xmlns:ma14="http://schemas.microsoft.com/office/mac/drawingml/2011/main" val="1"/>
             </a:ext>
           </a:extLst>
         </p:spPr>
@@ -7598,7 +7258,7 @@
           </a:ln>
           <a:extLst>
             <a:ext uri="{C572A759-6A51-4108-AA02-DFA0A04FC94B}">
-              <ma14:wrappingTextBoxFlag xmlns:ma14="http://schemas.microsoft.com/office/mac/drawingml/2011/main" xmlns="" val="1"/>
+              <ma14:wrappingTextBoxFlag xmlns="" xmlns:ma14="http://schemas.microsoft.com/office/mac/drawingml/2011/main" val="1"/>
             </a:ext>
           </a:extLst>
         </p:spPr>
@@ -7641,7 +7301,7 @@
           </a:ln>
           <a:extLst>
             <a:ext uri="{C572A759-6A51-4108-AA02-DFA0A04FC94B}">
-              <ma14:wrappingTextBoxFlag xmlns:ma14="http://schemas.microsoft.com/office/mac/drawingml/2011/main" xmlns="" val="1"/>
+              <ma14:wrappingTextBoxFlag xmlns="" xmlns:ma14="http://schemas.microsoft.com/office/mac/drawingml/2011/main" val="1"/>
             </a:ext>
           </a:extLst>
         </p:spPr>
@@ -7726,7 +7386,7 @@
 </p:sld>
 </file>
 
-<file path=ppt/slides/slide39.xml><?xml version="1.0" encoding="utf-8"?>
+<file path=ppt/slides/slide35.xml><?xml version="1.0" encoding="utf-8"?>
 <p:sld xmlns:a="http://schemas.openxmlformats.org/drawingml/2006/main" xmlns:r="http://schemas.openxmlformats.org/officeDocument/2006/relationships" xmlns:p="http://schemas.openxmlformats.org/presentationml/2006/main" show="0">
   <p:cSld>
     <p:spTree>
@@ -7851,113 +7511,7 @@
 </p:sld>
 </file>
 
-<file path=ppt/slides/slide4.xml><?xml version="1.0" encoding="utf-8"?>
-<p:sld xmlns:a="http://schemas.openxmlformats.org/drawingml/2006/main" xmlns:r="http://schemas.openxmlformats.org/officeDocument/2006/relationships" xmlns:p="http://schemas.openxmlformats.org/presentationml/2006/main">
-  <p:cSld>
-    <p:spTree>
-      <p:nvGrpSpPr>
-        <p:cNvPr id="1" name=""/>
-        <p:cNvGrpSpPr/>
-        <p:nvPr/>
-      </p:nvGrpSpPr>
-      <p:grpSpPr>
-        <a:xfrm>
-          <a:off x="0" y="0"/>
-          <a:ext cx="0" cy="0"/>
-          <a:chOff x="0" y="0"/>
-          <a:chExt cx="0" cy="0"/>
-        </a:xfrm>
-      </p:grpSpPr>
-      <p:sp>
-        <p:nvSpPr>
-          <p:cNvPr id="4" name="Title 3"/>
-          <p:cNvSpPr>
-            <a:spLocks noGrp="1"/>
-          </p:cNvSpPr>
-          <p:nvPr>
-            <p:ph type="title"/>
-          </p:nvPr>
-        </p:nvSpPr>
-        <p:spPr/>
-        <p:txBody>
-          <a:bodyPr/>
-          <a:lstStyle/>
-          <a:p>
-            <a:r>
-              <a:rPr lang="en-US" dirty="0"/>
-              <a:t>Lab Tasks</a:t>
-            </a:r>
-          </a:p>
-        </p:txBody>
-      </p:sp>
-      <p:sp>
-        <p:nvSpPr>
-          <p:cNvPr id="6" name="Content Placeholder 5"/>
-          <p:cNvSpPr>
-            <a:spLocks noGrp="1"/>
-          </p:cNvSpPr>
-          <p:nvPr>
-            <p:ph idx="1"/>
-          </p:nvPr>
-        </p:nvSpPr>
-        <p:spPr/>
-        <p:txBody>
-          <a:bodyPr/>
-          <a:lstStyle/>
-          <a:p>
-            <a:r>
-              <a:rPr lang="en-US" dirty="0"/>
-              <a:t>Read values from IMU.</a:t>
-            </a:r>
-          </a:p>
-          <a:p>
-            <a:r>
-              <a:rPr lang="en-US" dirty="0"/>
-              <a:t>Use Arduino’s plotting tool</a:t>
-            </a:r>
-          </a:p>
-          <a:p>
-            <a:r>
-              <a:rPr lang="en-US" dirty="0"/>
-              <a:t>Run your serial port at max speed!!! </a:t>
-            </a:r>
-          </a:p>
-          <a:p>
-            <a:r>
-              <a:rPr lang="en-US" dirty="0"/>
-              <a:t>Read the pitch of your test stand with the motors on</a:t>
-            </a:r>
-          </a:p>
-          <a:p>
-            <a:pPr lvl="1"/>
-            <a:r>
-              <a:rPr lang="en-US" dirty="0"/>
-              <a:t>Configure the filters on the IMU</a:t>
-            </a:r>
-          </a:p>
-          <a:p>
-            <a:pPr lvl="1"/>
-            <a:r>
-              <a:rPr lang="en-US" dirty="0"/>
-              <a:t>Implement a complimentary filter in software.</a:t>
-            </a:r>
-          </a:p>
-        </p:txBody>
-      </p:sp>
-    </p:spTree>
-    <p:extLst>
-      <p:ext uri="{BB962C8B-B14F-4D97-AF65-F5344CB8AC3E}">
-        <p14:creationId xmlns:p14="http://schemas.microsoft.com/office/powerpoint/2010/main" val="2059893488"/>
-      </p:ext>
-    </p:extLst>
-  </p:cSld>
-  <p:clrMapOvr>
-    <a:masterClrMapping/>
-  </p:clrMapOvr>
-</p:sld>
-</file>
-
-<file path=ppt/slides/slide40.xml><?xml version="1.0" encoding="utf-8"?>
+<file path=ppt/slides/slide36.xml><?xml version="1.0" encoding="utf-8"?>
 <p:sld xmlns:a="http://schemas.openxmlformats.org/drawingml/2006/main" xmlns:r="http://schemas.openxmlformats.org/officeDocument/2006/relationships" xmlns:p="http://schemas.openxmlformats.org/presentationml/2006/main">
   <p:cSld>
     <p:spTree>
@@ -8434,7 +7988,7 @@
 </p:sld>
 </file>
 
-<file path=ppt/slides/slide41.xml><?xml version="1.0" encoding="utf-8"?>
+<file path=ppt/slides/slide37.xml><?xml version="1.0" encoding="utf-8"?>
 <p:sld xmlns:a="http://schemas.openxmlformats.org/drawingml/2006/main" xmlns:r="http://schemas.openxmlformats.org/officeDocument/2006/relationships" xmlns:p="http://schemas.openxmlformats.org/presentationml/2006/main">
   <p:cSld>
     <p:spTree>
@@ -8586,7 +8140,7 @@
 </p:sld>
 </file>
 
-<file path=ppt/slides/slide42.xml><?xml version="1.0" encoding="utf-8"?>
+<file path=ppt/slides/slide38.xml><?xml version="1.0" encoding="utf-8"?>
 <p:sld xmlns:a="http://schemas.openxmlformats.org/drawingml/2006/main" xmlns:r="http://schemas.openxmlformats.org/officeDocument/2006/relationships" xmlns:p="http://schemas.openxmlformats.org/presentationml/2006/main">
   <p:cSld>
     <p:spTree>
@@ -8730,7 +8284,7 @@
 </p:sld>
 </file>
 
-<file path=ppt/slides/slide43.xml><?xml version="1.0" encoding="utf-8"?>
+<file path=ppt/slides/slide39.xml><?xml version="1.0" encoding="utf-8"?>
 <p:sld xmlns:a="http://schemas.openxmlformats.org/drawingml/2006/main" xmlns:r="http://schemas.openxmlformats.org/officeDocument/2006/relationships" xmlns:p="http://schemas.openxmlformats.org/presentationml/2006/main">
   <p:cSld>
     <p:spTree>
@@ -8880,7 +8434,7 @@
 </p:sld>
 </file>
 
-<file path=ppt/slides/slide44.xml><?xml version="1.0" encoding="utf-8"?>
+<file path=ppt/slides/slide4.xml><?xml version="1.0" encoding="utf-8"?>
 <p:sld xmlns:a="http://schemas.openxmlformats.org/drawingml/2006/main" xmlns:r="http://schemas.openxmlformats.org/officeDocument/2006/relationships" xmlns:p="http://schemas.openxmlformats.org/presentationml/2006/main">
   <p:cSld>
     <p:spTree>
@@ -8899,7 +8453,7 @@
       </p:grpSpPr>
       <p:sp>
         <p:nvSpPr>
-          <p:cNvPr id="2" name="Title 1"/>
+          <p:cNvPr id="4" name="Title 3"/>
           <p:cNvSpPr>
             <a:spLocks noGrp="1"/>
           </p:cNvSpPr>
@@ -8914,14 +8468,14 @@
           <a:p>
             <a:r>
               <a:rPr lang="en-US" dirty="0"/>
-              <a:t>Slides on Sensors</a:t>
-            </a:r>
-          </a:p>
-        </p:txBody>
-      </p:sp>
-      <p:sp>
-        <p:nvSpPr>
-          <p:cNvPr id="3" name="Content Placeholder 2"/>
+              <a:t>Lab Tasks</a:t>
+            </a:r>
+          </a:p>
+        </p:txBody>
+      </p:sp>
+      <p:sp>
+        <p:nvSpPr>
+          <p:cNvPr id="6" name="Content Placeholder 5"/>
           <p:cNvSpPr>
             <a:spLocks noGrp="1"/>
           </p:cNvSpPr>
@@ -8931,112 +8485,44 @@
         </p:nvSpPr>
         <p:spPr/>
         <p:txBody>
-          <a:bodyPr>
-            <a:normAutofit fontScale="92500" lnSpcReduction="20000"/>
-          </a:bodyPr>
-          <a:lstStyle/>
-          <a:p>
-            <a:r>
-              <a:rPr lang="en-US" dirty="0"/>
-              <a:t>Accelerometer</a:t>
+          <a:bodyPr/>
+          <a:lstStyle/>
+          <a:p>
+            <a:r>
+              <a:rPr lang="en-US" dirty="0"/>
+              <a:t>Read values from IMU.</a:t>
+            </a:r>
+          </a:p>
+          <a:p>
+            <a:r>
+              <a:rPr lang="en-US" dirty="0"/>
+              <a:t>Use Arduino’s plotting tool</a:t>
+            </a:r>
+          </a:p>
+          <a:p>
+            <a:r>
+              <a:rPr lang="en-US" dirty="0"/>
+              <a:t>Run your serial port at max speed!!! </a:t>
+            </a:r>
+          </a:p>
+          <a:p>
+            <a:r>
+              <a:rPr lang="en-US" dirty="0"/>
+              <a:t>Read the pitch of your test stand with the motors on</a:t>
             </a:r>
           </a:p>
           <a:p>
             <a:pPr lvl="1"/>
             <a:r>
               <a:rPr lang="en-US" dirty="0"/>
-              <a:t>Demo the data we get (3-axis accelerations)</a:t>
+              <a:t>Configure the filters on the IMU</a:t>
             </a:r>
           </a:p>
           <a:p>
             <a:pPr lvl="1"/>
             <a:r>
               <a:rPr lang="en-US" dirty="0"/>
-              <a:t>Conversion to Euler angles.  Show math.</a:t>
-            </a:r>
-          </a:p>
-          <a:p>
-            <a:pPr lvl="1"/>
-            <a:r>
-              <a:rPr lang="en-US" dirty="0"/>
-              <a:t>Conversion to acceleration along </a:t>
-            </a:r>
-            <a:r>
-              <a:rPr lang="en-US" dirty="0" err="1"/>
-              <a:t>x,y,z</a:t>
-            </a:r>
-            <a:r>
-              <a:rPr lang="en-US" dirty="0"/>
-              <a:t>?</a:t>
-            </a:r>
-          </a:p>
-          <a:p>
-            <a:pPr lvl="1"/>
-            <a:r>
-              <a:rPr lang="en-US" dirty="0"/>
-              <a:t>Maybe talk about coordinate systems?</a:t>
-            </a:r>
-          </a:p>
-          <a:p>
-            <a:r>
-              <a:rPr lang="en-US" dirty="0"/>
-              <a:t>Gyroscope</a:t>
-            </a:r>
-          </a:p>
-          <a:p>
-            <a:pPr lvl="1"/>
-            <a:r>
-              <a:rPr lang="en-US" dirty="0"/>
-              <a:t>Demo the data we get</a:t>
-            </a:r>
-          </a:p>
-          <a:p>
-            <a:r>
-              <a:rPr lang="en-US" dirty="0"/>
-              <a:t>Other sensors</a:t>
-            </a:r>
-          </a:p>
-          <a:p>
-            <a:pPr lvl="1"/>
-            <a:r>
-              <a:rPr lang="en-US" dirty="0"/>
-              <a:t>GPS</a:t>
-            </a:r>
-          </a:p>
-          <a:p>
-            <a:pPr lvl="1"/>
-            <a:r>
-              <a:rPr lang="en-US" dirty="0"/>
-              <a:t>Barometer</a:t>
-            </a:r>
-          </a:p>
-          <a:p>
-            <a:pPr lvl="1"/>
-            <a:r>
-              <a:rPr lang="en-US" dirty="0"/>
-              <a:t>Magnetometer</a:t>
-            </a:r>
-          </a:p>
-          <a:p>
-            <a:pPr lvl="1"/>
-            <a:r>
-              <a:rPr lang="en-US" dirty="0"/>
-              <a:t>Temperature (for correcting measurements)</a:t>
-            </a:r>
-          </a:p>
-          <a:p>
-            <a:pPr lvl="2"/>
-            <a:r>
-              <a:rPr lang="en-US" dirty="0"/>
-              <a:t>https://</a:t>
-            </a:r>
-            <a:r>
-              <a:rPr lang="en-US" dirty="0" err="1"/>
-              <a:t>wiki.dronecode.org</a:t>
-            </a:r>
-            <a:r>
-              <a:rPr lang="en-US" dirty="0"/>
-              <a:t>/_media/u01.imu_temperature_compensation_-_hessel_van_der_molen.pdf</a:t>
+              <a:t>Implement a complimentary filter in software.</a:t>
             </a:r>
           </a:p>
         </p:txBody>
@@ -9044,7 +8530,7 @@
     </p:spTree>
     <p:extLst>
       <p:ext uri="{BB962C8B-B14F-4D97-AF65-F5344CB8AC3E}">
-        <p14:creationId xmlns:p14="http://schemas.microsoft.com/office/powerpoint/2010/main" val="3342077452"/>
+        <p14:creationId xmlns:p14="http://schemas.microsoft.com/office/powerpoint/2010/main" val="2059893488"/>
       </p:ext>
     </p:extLst>
   </p:cSld>
@@ -9054,7 +8540,7 @@
 </p:sld>
 </file>
 
-<file path=ppt/slides/slide45.xml><?xml version="1.0" encoding="utf-8"?>
+<file path=ppt/slides/slide40.xml><?xml version="1.0" encoding="utf-8"?>
 <p:sld xmlns:a="http://schemas.openxmlformats.org/drawingml/2006/main" xmlns:r="http://schemas.openxmlformats.org/officeDocument/2006/relationships" xmlns:p="http://schemas.openxmlformats.org/presentationml/2006/main">
   <p:cSld>
     <p:spTree>
@@ -9088,7 +8574,7 @@
           <a:p>
             <a:r>
               <a:rPr lang="en-US" dirty="0"/>
-              <a:t>New Slides on Filters</a:t>
+              <a:t>Slides on Sensors</a:t>
             </a:r>
           </a:p>
         </p:txBody>
@@ -9106,130 +8592,119 @@
         <p:spPr/>
         <p:txBody>
           <a:bodyPr>
-            <a:normAutofit fontScale="77500" lnSpcReduction="20000"/>
+            <a:normAutofit fontScale="92500" lnSpcReduction="20000"/>
           </a:bodyPr>
           <a:lstStyle/>
           <a:p>
             <a:r>
               <a:rPr lang="en-US" dirty="0"/>
-              <a:t>Noise</a:t>
-            </a:r>
-          </a:p>
-          <a:p>
-            <a:r>
-              <a:rPr lang="en-US" dirty="0"/>
-              <a:t>Calibration</a:t>
-            </a:r>
-          </a:p>
-          <a:p>
-            <a:r>
-              <a:rPr lang="en-US" dirty="0"/>
-              <a:t>Demo of noisy measurements</a:t>
-            </a:r>
-          </a:p>
-          <a:p>
-            <a:r>
-              <a:rPr lang="en-US" dirty="0"/>
-              <a:t>Demo of progressive improvements</a:t>
+              <a:t>Accelerometer</a:t>
             </a:r>
           </a:p>
           <a:p>
             <a:pPr lvl="1"/>
             <a:r>
               <a:rPr lang="en-US" dirty="0"/>
-              <a:t>Calibration</a:t>
+              <a:t>Demo the data we get (3-axis accelerations)</a:t>
             </a:r>
           </a:p>
           <a:p>
             <a:pPr lvl="1"/>
             <a:r>
               <a:rPr lang="en-US" dirty="0"/>
-              <a:t>Tuning filters in the </a:t>
+              <a:t>Conversion to Euler angles.  Show math.</a:t>
+            </a:r>
+          </a:p>
+          <a:p>
+            <a:pPr lvl="1"/>
+            <a:r>
+              <a:rPr lang="en-US" dirty="0"/>
+              <a:t>Conversion to acceleration along </a:t>
             </a:r>
             <a:r>
               <a:rPr lang="en-US" dirty="0" err="1"/>
-              <a:t>quadcopter</a:t>
-            </a:r>
-            <a:endParaRPr lang="en-US" dirty="0"/>
+              <a:t>x,y,z</a:t>
+            </a:r>
+            <a:r>
+              <a:rPr lang="en-US" dirty="0"/>
+              <a:t>?</a:t>
+            </a:r>
           </a:p>
           <a:p>
             <a:pPr lvl="1"/>
             <a:r>
               <a:rPr lang="en-US" dirty="0"/>
-              <a:t>Tuning complimentary filter</a:t>
+              <a:t>Maybe talk about coordinate systems?</a:t>
+            </a:r>
+          </a:p>
+          <a:p>
+            <a:r>
+              <a:rPr lang="en-US" dirty="0"/>
+              <a:t>Gyroscope</a:t>
+            </a:r>
+          </a:p>
+          <a:p>
+            <a:pPr lvl="1"/>
+            <a:r>
+              <a:rPr lang="en-US" dirty="0"/>
+              <a:t>Demo the data we get</a:t>
+            </a:r>
+          </a:p>
+          <a:p>
+            <a:r>
+              <a:rPr lang="en-US" dirty="0"/>
+              <a:t>Other sensors</a:t>
+            </a:r>
+          </a:p>
+          <a:p>
+            <a:pPr lvl="1"/>
+            <a:r>
+              <a:rPr lang="en-US" dirty="0"/>
+              <a:t>GPS</a:t>
+            </a:r>
+          </a:p>
+          <a:p>
+            <a:pPr lvl="1"/>
+            <a:r>
+              <a:rPr lang="en-US" dirty="0"/>
+              <a:t>Barometer</a:t>
+            </a:r>
+          </a:p>
+          <a:p>
+            <a:pPr lvl="1"/>
+            <a:r>
+              <a:rPr lang="en-US" dirty="0"/>
+              <a:t>Magnetometer</a:t>
+            </a:r>
+          </a:p>
+          <a:p>
+            <a:pPr lvl="1"/>
+            <a:r>
+              <a:rPr lang="en-US" dirty="0"/>
+              <a:t>Temperature (for correcting measurements)</a:t>
             </a:r>
           </a:p>
           <a:p>
             <a:pPr lvl="2"/>
             <a:r>
               <a:rPr lang="en-US" dirty="0"/>
-              <a:t>Demo Drift from integrating gyroscope</a:t>
-            </a:r>
-          </a:p>
-          <a:p>
-            <a:pPr lvl="1"/>
-            <a:r>
-              <a:rPr lang="en-US" dirty="0"/>
-              <a:t>Tuning moving average on </a:t>
+              <a:t>https://</a:t>
             </a:r>
             <a:r>
               <a:rPr lang="en-US" dirty="0" err="1"/>
-              <a:t>euler</a:t>
-            </a:r>
-            <a:r>
-              <a:rPr lang="en-US" dirty="0"/>
-              <a:t> angles</a:t>
-            </a:r>
-          </a:p>
-          <a:p>
-            <a:r>
-              <a:rPr lang="en-US" dirty="0"/>
-              <a:t>Demo of “good” pitch/roll angle measurements</a:t>
-            </a:r>
-          </a:p>
-          <a:p>
-            <a:r>
-              <a:rPr lang="en-US" dirty="0"/>
-              <a:t>Discuss magnetometer?</a:t>
-            </a:r>
-          </a:p>
-          <a:p>
-            <a:pPr lvl="1"/>
-            <a:r>
-              <a:rPr lang="en-US" dirty="0"/>
-              <a:t>Calibration: </a:t>
-            </a:r>
-            <a:r>
-              <a:rPr lang="en-US" dirty="0">
-                <a:hlinkClick r:id="rId2"/>
-              </a:rPr>
-              <a:t>https://github.com/kriswiner/MPU-6050/wiki/Simple-and-Effective-Magnetometer-Calibration</a:t>
-            </a:r>
-            <a:endParaRPr lang="en-US" dirty="0"/>
-          </a:p>
-          <a:p>
-            <a:pPr lvl="1"/>
-            <a:r>
-              <a:rPr lang="en-US" dirty="0"/>
-              <a:t>Heading calculations</a:t>
-            </a:r>
-          </a:p>
-          <a:p>
-            <a:pPr lvl="1"/>
-            <a:endParaRPr lang="en-US" dirty="0"/>
-          </a:p>
-          <a:p>
-            <a:pPr marL="0" indent="0">
-              <a:buNone/>
-            </a:pPr>
-            <a:endParaRPr lang="en-US" dirty="0"/>
+              <a:t>wiki.dronecode.org</a:t>
+            </a:r>
+            <a:r>
+              <a:rPr lang="en-US" dirty="0"/>
+              <a:t>/_media/u01.imu_temperature_compensation_-_hessel_van_der_molen.pdf</a:t>
+            </a:r>
           </a:p>
         </p:txBody>
       </p:sp>
     </p:spTree>
     <p:extLst>
       <p:ext uri="{BB962C8B-B14F-4D97-AF65-F5344CB8AC3E}">
-        <p14:creationId xmlns:p14="http://schemas.microsoft.com/office/powerpoint/2010/main" val="2814360818"/>
+        <p14:creationId xmlns:p14="http://schemas.microsoft.com/office/powerpoint/2010/main" val="3342077452"/>
       </p:ext>
     </p:extLst>
   </p:cSld>
@@ -9239,7 +8714,7 @@
 </p:sld>
 </file>
 
-<file path=ppt/slides/slide46.xml><?xml version="1.0" encoding="utf-8"?>
+<file path=ppt/slides/slide41.xml><?xml version="1.0" encoding="utf-8"?>
 <p:sld xmlns:a="http://schemas.openxmlformats.org/drawingml/2006/main" xmlns:r="http://schemas.openxmlformats.org/officeDocument/2006/relationships" xmlns:p="http://schemas.openxmlformats.org/presentationml/2006/main">
   <p:cSld>
     <p:spTree>
@@ -9273,6 +8748,191 @@
           <a:p>
             <a:r>
               <a:rPr lang="en-US" dirty="0"/>
+              <a:t>New Slides on Filters</a:t>
+            </a:r>
+          </a:p>
+        </p:txBody>
+      </p:sp>
+      <p:sp>
+        <p:nvSpPr>
+          <p:cNvPr id="3" name="Content Placeholder 2"/>
+          <p:cNvSpPr>
+            <a:spLocks noGrp="1"/>
+          </p:cNvSpPr>
+          <p:nvPr>
+            <p:ph idx="1"/>
+          </p:nvPr>
+        </p:nvSpPr>
+        <p:spPr/>
+        <p:txBody>
+          <a:bodyPr>
+            <a:normAutofit fontScale="77500" lnSpcReduction="20000"/>
+          </a:bodyPr>
+          <a:lstStyle/>
+          <a:p>
+            <a:r>
+              <a:rPr lang="en-US" dirty="0"/>
+              <a:t>Noise</a:t>
+            </a:r>
+          </a:p>
+          <a:p>
+            <a:r>
+              <a:rPr lang="en-US" dirty="0"/>
+              <a:t>Calibration</a:t>
+            </a:r>
+          </a:p>
+          <a:p>
+            <a:r>
+              <a:rPr lang="en-US" dirty="0"/>
+              <a:t>Demo of noisy measurements</a:t>
+            </a:r>
+          </a:p>
+          <a:p>
+            <a:r>
+              <a:rPr lang="en-US" dirty="0"/>
+              <a:t>Demo of progressive improvements</a:t>
+            </a:r>
+          </a:p>
+          <a:p>
+            <a:pPr lvl="1"/>
+            <a:r>
+              <a:rPr lang="en-US" dirty="0"/>
+              <a:t>Calibration</a:t>
+            </a:r>
+          </a:p>
+          <a:p>
+            <a:pPr lvl="1"/>
+            <a:r>
+              <a:rPr lang="en-US" dirty="0"/>
+              <a:t>Tuning filters in the </a:t>
+            </a:r>
+            <a:r>
+              <a:rPr lang="en-US" dirty="0" err="1"/>
+              <a:t>quadcopter</a:t>
+            </a:r>
+            <a:endParaRPr lang="en-US" dirty="0"/>
+          </a:p>
+          <a:p>
+            <a:pPr lvl="1"/>
+            <a:r>
+              <a:rPr lang="en-US" dirty="0"/>
+              <a:t>Tuning complimentary filter</a:t>
+            </a:r>
+          </a:p>
+          <a:p>
+            <a:pPr lvl="2"/>
+            <a:r>
+              <a:rPr lang="en-US" dirty="0"/>
+              <a:t>Demo Drift from integrating gyroscope</a:t>
+            </a:r>
+          </a:p>
+          <a:p>
+            <a:pPr lvl="1"/>
+            <a:r>
+              <a:rPr lang="en-US" dirty="0"/>
+              <a:t>Tuning moving average on </a:t>
+            </a:r>
+            <a:r>
+              <a:rPr lang="en-US" dirty="0" err="1"/>
+              <a:t>euler</a:t>
+            </a:r>
+            <a:r>
+              <a:rPr lang="en-US" dirty="0"/>
+              <a:t> angles</a:t>
+            </a:r>
+          </a:p>
+          <a:p>
+            <a:r>
+              <a:rPr lang="en-US" dirty="0"/>
+              <a:t>Demo of “good” pitch/roll angle measurements</a:t>
+            </a:r>
+          </a:p>
+          <a:p>
+            <a:r>
+              <a:rPr lang="en-US" dirty="0"/>
+              <a:t>Discuss magnetometer?</a:t>
+            </a:r>
+          </a:p>
+          <a:p>
+            <a:pPr lvl="1"/>
+            <a:r>
+              <a:rPr lang="en-US" dirty="0"/>
+              <a:t>Calibration: </a:t>
+            </a:r>
+            <a:r>
+              <a:rPr lang="en-US" dirty="0">
+                <a:hlinkClick r:id="rId2"/>
+              </a:rPr>
+              <a:t>https://github.com/kriswiner/MPU-6050/wiki/Simple-and-Effective-Magnetometer-Calibration</a:t>
+            </a:r>
+            <a:endParaRPr lang="en-US" dirty="0"/>
+          </a:p>
+          <a:p>
+            <a:pPr lvl="1"/>
+            <a:r>
+              <a:rPr lang="en-US" dirty="0"/>
+              <a:t>Heading calculations</a:t>
+            </a:r>
+          </a:p>
+          <a:p>
+            <a:pPr lvl="1"/>
+            <a:endParaRPr lang="en-US" dirty="0"/>
+          </a:p>
+          <a:p>
+            <a:pPr marL="0" indent="0">
+              <a:buNone/>
+            </a:pPr>
+            <a:endParaRPr lang="en-US" dirty="0"/>
+          </a:p>
+        </p:txBody>
+      </p:sp>
+    </p:spTree>
+    <p:extLst>
+      <p:ext uri="{BB962C8B-B14F-4D97-AF65-F5344CB8AC3E}">
+        <p14:creationId xmlns:p14="http://schemas.microsoft.com/office/powerpoint/2010/main" val="2814360818"/>
+      </p:ext>
+    </p:extLst>
+  </p:cSld>
+  <p:clrMapOvr>
+    <a:masterClrMapping/>
+  </p:clrMapOvr>
+</p:sld>
+</file>
+
+<file path=ppt/slides/slide42.xml><?xml version="1.0" encoding="utf-8"?>
+<p:sld xmlns:a="http://schemas.openxmlformats.org/drawingml/2006/main" xmlns:r="http://schemas.openxmlformats.org/officeDocument/2006/relationships" xmlns:p="http://schemas.openxmlformats.org/presentationml/2006/main">
+  <p:cSld>
+    <p:spTree>
+      <p:nvGrpSpPr>
+        <p:cNvPr id="1" name=""/>
+        <p:cNvGrpSpPr/>
+        <p:nvPr/>
+      </p:nvGrpSpPr>
+      <p:grpSpPr>
+        <a:xfrm>
+          <a:off x="0" y="0"/>
+          <a:ext cx="0" cy="0"/>
+          <a:chOff x="0" y="0"/>
+          <a:chExt cx="0" cy="0"/>
+        </a:xfrm>
+      </p:grpSpPr>
+      <p:sp>
+        <p:nvSpPr>
+          <p:cNvPr id="2" name="Title 1"/>
+          <p:cNvSpPr>
+            <a:spLocks noGrp="1"/>
+          </p:cNvSpPr>
+          <p:nvPr>
+            <p:ph type="title"/>
+          </p:nvPr>
+        </p:nvSpPr>
+        <p:spPr/>
+        <p:txBody>
+          <a:bodyPr/>
+          <a:lstStyle/>
+          <a:p>
+            <a:r>
+              <a:rPr lang="en-US" dirty="0"/>
               <a:t>Higher-order Navigation</a:t>
             </a:r>
           </a:p>
@@ -9364,7 +9024,7 @@
 </p:sld>
 </file>
 
-<file path=ppt/slides/slide47.xml><?xml version="1.0" encoding="utf-8"?>
+<file path=ppt/slides/slide43.xml><?xml version="1.0" encoding="utf-8"?>
 <p:sld xmlns:a="http://schemas.openxmlformats.org/drawingml/2006/main" xmlns:r="http://schemas.openxmlformats.org/officeDocument/2006/relationships" xmlns:p="http://schemas.openxmlformats.org/presentationml/2006/main">
   <p:cSld>
     <p:spTree>
@@ -9496,7 +9156,7 @@
 </p:sld>
 </file>
 
-<file path=ppt/slides/slide48.xml><?xml version="1.0" encoding="utf-8"?>
+<file path=ppt/slides/slide44.xml><?xml version="1.0" encoding="utf-8"?>
 <p:sld xmlns:a="http://schemas.openxmlformats.org/drawingml/2006/main" xmlns:r="http://schemas.openxmlformats.org/officeDocument/2006/relationships" xmlns:p="http://schemas.openxmlformats.org/presentationml/2006/main">
   <p:cSld>
     <p:spTree>
@@ -9639,7 +9299,7 @@
 </p:sld>
 </file>
 
-<file path=ppt/slides/slide49.xml><?xml version="1.0" encoding="utf-8"?>
+<file path=ppt/slides/slide45.xml><?xml version="1.0" encoding="utf-8"?>
 <p:sld xmlns:a="http://schemas.openxmlformats.org/drawingml/2006/main" xmlns:r="http://schemas.openxmlformats.org/officeDocument/2006/relationships" xmlns:p="http://schemas.openxmlformats.org/presentationml/2006/main">
   <p:cSld>
     <p:spTree>
@@ -9782,141 +9442,7 @@
 </p:sld>
 </file>
 
-<file path=ppt/slides/slide5.xml><?xml version="1.0" encoding="utf-8"?>
-<p:sld xmlns:a="http://schemas.openxmlformats.org/drawingml/2006/main" xmlns:r="http://schemas.openxmlformats.org/officeDocument/2006/relationships" xmlns:p="http://schemas.openxmlformats.org/presentationml/2006/main">
-  <p:cSld>
-    <p:spTree>
-      <p:nvGrpSpPr>
-        <p:cNvPr id="1" name=""/>
-        <p:cNvGrpSpPr/>
-        <p:nvPr/>
-      </p:nvGrpSpPr>
-      <p:grpSpPr>
-        <a:xfrm>
-          <a:off x="0" y="0"/>
-          <a:ext cx="0" cy="0"/>
-          <a:chOff x="0" y="0"/>
-          <a:chExt cx="0" cy="0"/>
-        </a:xfrm>
-      </p:grpSpPr>
-      <p:sp>
-        <p:nvSpPr>
-          <p:cNvPr id="2" name="Title 1"/>
-          <p:cNvSpPr>
-            <a:spLocks noGrp="1"/>
-          </p:cNvSpPr>
-          <p:nvPr>
-            <p:ph type="title"/>
-          </p:nvPr>
-        </p:nvSpPr>
-        <p:spPr/>
-        <p:txBody>
-          <a:bodyPr/>
-          <a:lstStyle/>
-          <a:p>
-            <a:r>
-              <a:rPr lang="en-US" dirty="0"/>
-              <a:t>Euler Angles</a:t>
-            </a:r>
-          </a:p>
-        </p:txBody>
-      </p:sp>
-      <p:sp>
-        <p:nvSpPr>
-          <p:cNvPr id="5" name="Content Placeholder 4"/>
-          <p:cNvSpPr>
-            <a:spLocks noGrp="1"/>
-          </p:cNvSpPr>
-          <p:nvPr>
-            <p:ph sz="half" idx="1"/>
-          </p:nvPr>
-        </p:nvSpPr>
-        <p:spPr/>
-        <p:txBody>
-          <a:bodyPr/>
-          <a:lstStyle/>
-          <a:p>
-            <a:r>
-              <a:rPr lang="en-US" dirty="0"/>
-              <a:t>3 angles to specify an orientation</a:t>
-            </a:r>
-          </a:p>
-          <a:p>
-            <a:r>
-              <a:rPr lang="en-US" dirty="0"/>
-              <a:t>The AHRS library gives you the pitch and roll angles</a:t>
-            </a:r>
-          </a:p>
-          <a:p>
-            <a:r>
-              <a:rPr lang="en-US" dirty="0"/>
-              <a:t>We don’t need the yaw angle</a:t>
-            </a:r>
-          </a:p>
-        </p:txBody>
-      </p:sp>
-      <p:sp>
-        <p:nvSpPr>
-          <p:cNvPr id="7" name="Content Placeholder 6">
-            <a:extLst>
-              <a:ext uri="{FF2B5EF4-FFF2-40B4-BE49-F238E27FC236}">
-                <a16:creationId xmlns:a16="http://schemas.microsoft.com/office/drawing/2014/main" id="{7F18E24D-828B-0A49-A6E4-3277A73BE93A}"/>
-              </a:ext>
-            </a:extLst>
-          </p:cNvPr>
-          <p:cNvSpPr>
-            <a:spLocks noGrp="1"/>
-          </p:cNvSpPr>
-          <p:nvPr>
-            <p:ph sz="half" idx="2"/>
-          </p:nvPr>
-        </p:nvSpPr>
-        <p:spPr/>
-        <p:txBody>
-          <a:bodyPr/>
-          <a:lstStyle/>
-          <a:p>
-            <a:endParaRPr lang="en-US"/>
-          </a:p>
-        </p:txBody>
-      </p:sp>
-      <p:pic>
-        <p:nvPicPr>
-          <p:cNvPr id="6" name="Content Placeholder 3"/>
-          <p:cNvPicPr>
-            <a:picLocks noChangeAspect="1"/>
-          </p:cNvPicPr>
-          <p:nvPr/>
-        </p:nvPicPr>
-        <p:blipFill rotWithShape="1">
-          <a:blip r:embed="rId2"/>
-          <a:srcRect l="792" t="3469" r="292" b="5923"/>
-          <a:stretch/>
-        </p:blipFill>
-        <p:spPr>
-          <a:xfrm>
-            <a:off x="5826148" y="2302896"/>
-            <a:ext cx="3698853" cy="2545391"/>
-          </a:xfrm>
-          <a:prstGeom prst="rect">
-            <a:avLst/>
-          </a:prstGeom>
-        </p:spPr>
-      </p:pic>
-    </p:spTree>
-    <p:extLst>
-      <p:ext uri="{BB962C8B-B14F-4D97-AF65-F5344CB8AC3E}">
-        <p14:creationId xmlns:p14="http://schemas.microsoft.com/office/powerpoint/2010/main" val="2416830297"/>
-      </p:ext>
-    </p:extLst>
-  </p:cSld>
-  <p:clrMapOvr>
-    <a:masterClrMapping/>
-  </p:clrMapOvr>
-</p:sld>
-</file>
-
-<file path=ppt/slides/slide50.xml><?xml version="1.0" encoding="utf-8"?>
+<file path=ppt/slides/slide46.xml><?xml version="1.0" encoding="utf-8"?>
 <p:sld xmlns:a="http://schemas.openxmlformats.org/drawingml/2006/main" xmlns:r="http://schemas.openxmlformats.org/officeDocument/2006/relationships" xmlns:p="http://schemas.openxmlformats.org/presentationml/2006/main">
   <p:cSld>
     <p:spTree>
@@ -10416,6 +9942,140 @@
 </p:sld>
 </file>
 
+<file path=ppt/slides/slide5.xml><?xml version="1.0" encoding="utf-8"?>
+<p:sld xmlns:a="http://schemas.openxmlformats.org/drawingml/2006/main" xmlns:r="http://schemas.openxmlformats.org/officeDocument/2006/relationships" xmlns:p="http://schemas.openxmlformats.org/presentationml/2006/main">
+  <p:cSld>
+    <p:spTree>
+      <p:nvGrpSpPr>
+        <p:cNvPr id="1" name=""/>
+        <p:cNvGrpSpPr/>
+        <p:nvPr/>
+      </p:nvGrpSpPr>
+      <p:grpSpPr>
+        <a:xfrm>
+          <a:off x="0" y="0"/>
+          <a:ext cx="0" cy="0"/>
+          <a:chOff x="0" y="0"/>
+          <a:chExt cx="0" cy="0"/>
+        </a:xfrm>
+      </p:grpSpPr>
+      <p:sp>
+        <p:nvSpPr>
+          <p:cNvPr id="2" name="Title 1"/>
+          <p:cNvSpPr>
+            <a:spLocks noGrp="1"/>
+          </p:cNvSpPr>
+          <p:nvPr>
+            <p:ph type="title"/>
+          </p:nvPr>
+        </p:nvSpPr>
+        <p:spPr/>
+        <p:txBody>
+          <a:bodyPr/>
+          <a:lstStyle/>
+          <a:p>
+            <a:r>
+              <a:rPr lang="en-US" dirty="0"/>
+              <a:t>Euler Angles</a:t>
+            </a:r>
+          </a:p>
+        </p:txBody>
+      </p:sp>
+      <p:sp>
+        <p:nvSpPr>
+          <p:cNvPr id="5" name="Content Placeholder 4"/>
+          <p:cNvSpPr>
+            <a:spLocks noGrp="1"/>
+          </p:cNvSpPr>
+          <p:nvPr>
+            <p:ph sz="half" idx="1"/>
+          </p:nvPr>
+        </p:nvSpPr>
+        <p:spPr/>
+        <p:txBody>
+          <a:bodyPr/>
+          <a:lstStyle/>
+          <a:p>
+            <a:r>
+              <a:rPr lang="en-US" dirty="0"/>
+              <a:t>3 angles to specify an orientation</a:t>
+            </a:r>
+          </a:p>
+          <a:p>
+            <a:r>
+              <a:rPr lang="en-US" dirty="0"/>
+              <a:t>The AHRS library gives you the pitch and roll angles</a:t>
+            </a:r>
+          </a:p>
+          <a:p>
+            <a:r>
+              <a:rPr lang="en-US" dirty="0"/>
+              <a:t>We don’t need the yaw angle</a:t>
+            </a:r>
+          </a:p>
+        </p:txBody>
+      </p:sp>
+      <p:sp>
+        <p:nvSpPr>
+          <p:cNvPr id="7" name="Content Placeholder 6">
+            <a:extLst>
+              <a:ext uri="{FF2B5EF4-FFF2-40B4-BE49-F238E27FC236}">
+                <a16:creationId xmlns:a16="http://schemas.microsoft.com/office/drawing/2014/main" id="{7F18E24D-828B-0A49-A6E4-3277A73BE93A}"/>
+              </a:ext>
+            </a:extLst>
+          </p:cNvPr>
+          <p:cNvSpPr>
+            <a:spLocks noGrp="1"/>
+          </p:cNvSpPr>
+          <p:nvPr>
+            <p:ph sz="half" idx="2"/>
+          </p:nvPr>
+        </p:nvSpPr>
+        <p:spPr/>
+        <p:txBody>
+          <a:bodyPr/>
+          <a:lstStyle/>
+          <a:p>
+            <a:endParaRPr lang="en-US"/>
+          </a:p>
+        </p:txBody>
+      </p:sp>
+      <p:pic>
+        <p:nvPicPr>
+          <p:cNvPr id="6" name="Content Placeholder 3"/>
+          <p:cNvPicPr>
+            <a:picLocks noChangeAspect="1"/>
+          </p:cNvPicPr>
+          <p:nvPr/>
+        </p:nvPicPr>
+        <p:blipFill rotWithShape="1">
+          <a:blip r:embed="rId2"/>
+          <a:srcRect l="792" t="3469" r="292" b="5923"/>
+          <a:stretch/>
+        </p:blipFill>
+        <p:spPr>
+          <a:xfrm>
+            <a:off x="5826148" y="2302896"/>
+            <a:ext cx="3698853" cy="2545391"/>
+          </a:xfrm>
+          <a:prstGeom prst="rect">
+            <a:avLst/>
+          </a:prstGeom>
+        </p:spPr>
+      </p:pic>
+    </p:spTree>
+    <p:extLst>
+      <p:ext uri="{BB962C8B-B14F-4D97-AF65-F5344CB8AC3E}">
+        <p14:creationId xmlns:p14="http://schemas.microsoft.com/office/powerpoint/2010/main" val="2416830297"/>
+      </p:ext>
+    </p:extLst>
+  </p:cSld>
+  <p:clrMapOvr>
+    <a:masterClrMapping/>
+  </p:clrMapOvr>
+</p:sld>
+</file>
+
 <file path=ppt/slides/slide6.xml><?xml version="1.0" encoding="utf-8"?>
 <p:sld xmlns:a="http://schemas.openxmlformats.org/drawingml/2006/main" xmlns:r="http://schemas.openxmlformats.org/officeDocument/2006/relationships" xmlns:p="http://schemas.openxmlformats.org/presentationml/2006/main">
   <p:cSld>
@@ -10474,7 +10134,7 @@
             <a:spLocks noGrp="1"/>
           </p:cNvSpPr>
           <p:nvPr>
-            <p:ph idx="1"/>
+            <p:ph sz="half" idx="1"/>
           </p:nvPr>
         </p:nvSpPr>
         <p:spPr/>
@@ -10535,6 +10195,35 @@
           </a:p>
         </p:txBody>
       </p:sp>
+      <p:pic>
+        <p:nvPicPr>
+          <p:cNvPr id="5" name="Content Placeholder 4" descr="A screenshot of a cell phone&#10;&#10;Description automatically generated">
+            <a:extLst>
+              <a:ext uri="{FF2B5EF4-FFF2-40B4-BE49-F238E27FC236}">
+                <a16:creationId xmlns:a16="http://schemas.microsoft.com/office/drawing/2014/main" id="{D25426B1-9236-A240-8B9F-0AAB9453F623}"/>
+              </a:ext>
+            </a:extLst>
+          </p:cNvPr>
+          <p:cNvPicPr>
+            <a:picLocks noGrp="1" noChangeAspect="1"/>
+          </p:cNvPicPr>
+          <p:nvPr>
+            <p:ph sz="half" idx="2"/>
+          </p:nvPr>
+        </p:nvPicPr>
+        <p:blipFill>
+          <a:blip r:embed="rId2"/>
+          <a:stretch>
+            <a:fillRect/>
+          </a:stretch>
+        </p:blipFill>
+        <p:spPr>
+          <a:xfrm>
+            <a:off x="5519057" y="1384899"/>
+            <a:ext cx="6487886" cy="5232790"/>
+          </a:xfrm>
+        </p:spPr>
+      </p:pic>
     </p:spTree>
     <p:extLst>
       <p:ext uri="{BB962C8B-B14F-4D97-AF65-F5344CB8AC3E}">
@@ -10595,18 +10284,99 @@
       </p:sp>
       <p:sp>
         <p:nvSpPr>
-          <p:cNvPr id="3" name="Content Placeholder 2">
-            <a:extLst>
-              <a:ext uri="{FF2B5EF4-FFF2-40B4-BE49-F238E27FC236}">
-                <a16:creationId xmlns:a16="http://schemas.microsoft.com/office/drawing/2014/main" id="{2DE20BEB-F790-4346-BAF9-DC277FEACF72}"/>
-              </a:ext>
-            </a:extLst>
-          </p:cNvPr>
-          <p:cNvSpPr>
-            <a:spLocks noGrp="1"/>
-          </p:cNvSpPr>
-          <p:nvPr>
-            <p:ph idx="1"/>
+          <p:cNvPr id="6" name="Text Placeholder 5">
+            <a:extLst>
+              <a:ext uri="{FF2B5EF4-FFF2-40B4-BE49-F238E27FC236}">
+                <a16:creationId xmlns:a16="http://schemas.microsoft.com/office/drawing/2014/main" id="{FBC571D7-0857-5144-B6D0-B17BAA3DB28D}"/>
+              </a:ext>
+            </a:extLst>
+          </p:cNvPr>
+          <p:cNvSpPr>
+            <a:spLocks noGrp="1"/>
+          </p:cNvSpPr>
+          <p:nvPr>
+            <p:ph type="body" idx="1"/>
+          </p:nvPr>
+        </p:nvSpPr>
+        <p:spPr/>
+        <p:txBody>
+          <a:bodyPr/>
+          <a:lstStyle/>
+          <a:p>
+            <a:r>
+              <a:rPr lang="en-US" dirty="0"/>
+              <a:t>Pitch</a:t>
+            </a:r>
+          </a:p>
+        </p:txBody>
+      </p:sp>
+      <p:sp>
+        <p:nvSpPr>
+          <p:cNvPr id="7" name="Content Placeholder 6">
+            <a:extLst>
+              <a:ext uri="{FF2B5EF4-FFF2-40B4-BE49-F238E27FC236}">
+                <a16:creationId xmlns:a16="http://schemas.microsoft.com/office/drawing/2014/main" id="{53166FD3-6C84-D348-B98D-7F9D9274238A}"/>
+              </a:ext>
+            </a:extLst>
+          </p:cNvPr>
+          <p:cNvSpPr>
+            <a:spLocks noGrp="1"/>
+          </p:cNvSpPr>
+          <p:nvPr>
+            <p:ph sz="half" idx="2"/>
+          </p:nvPr>
+        </p:nvSpPr>
+        <p:spPr/>
+        <p:txBody>
+          <a:bodyPr/>
+          <a:lstStyle/>
+          <a:p>
+            <a:endParaRPr lang="en-US"/>
+          </a:p>
+        </p:txBody>
+      </p:sp>
+      <p:sp>
+        <p:nvSpPr>
+          <p:cNvPr id="8" name="Text Placeholder 7">
+            <a:extLst>
+              <a:ext uri="{FF2B5EF4-FFF2-40B4-BE49-F238E27FC236}">
+                <a16:creationId xmlns:a16="http://schemas.microsoft.com/office/drawing/2014/main" id="{5663F409-1699-DB4A-B367-1F4C9E70C2F9}"/>
+              </a:ext>
+            </a:extLst>
+          </p:cNvPr>
+          <p:cNvSpPr>
+            <a:spLocks noGrp="1"/>
+          </p:cNvSpPr>
+          <p:nvPr>
+            <p:ph type="body" sz="quarter" idx="3"/>
+          </p:nvPr>
+        </p:nvSpPr>
+        <p:spPr/>
+        <p:txBody>
+          <a:bodyPr/>
+          <a:lstStyle/>
+          <a:p>
+            <a:r>
+              <a:rPr lang="en-US" dirty="0"/>
+              <a:t>Roll</a:t>
+            </a:r>
+          </a:p>
+        </p:txBody>
+      </p:sp>
+      <p:sp>
+        <p:nvSpPr>
+          <p:cNvPr id="9" name="Content Placeholder 8">
+            <a:extLst>
+              <a:ext uri="{FF2B5EF4-FFF2-40B4-BE49-F238E27FC236}">
+                <a16:creationId xmlns:a16="http://schemas.microsoft.com/office/drawing/2014/main" id="{4070EFA9-BA77-4F45-B739-0A5F7965F2A8}"/>
+              </a:ext>
+            </a:extLst>
+          </p:cNvPr>
+          <p:cNvSpPr>
+            <a:spLocks noGrp="1"/>
+          </p:cNvSpPr>
+          <p:nvPr>
+            <p:ph sz="quarter" idx="4"/>
           </p:nvPr>
         </p:nvSpPr>
         <p:spPr/>
@@ -10689,7 +10459,7 @@
             <a:spLocks noGrp="1"/>
           </p:cNvSpPr>
           <p:nvPr>
-            <p:ph idx="1"/>
+            <p:ph sz="half" idx="1"/>
           </p:nvPr>
         </p:nvSpPr>
         <p:spPr/>
@@ -10753,6 +10523,35 @@
           </a:p>
         </p:txBody>
       </p:sp>
+      <p:pic>
+        <p:nvPicPr>
+          <p:cNvPr id="5" name="Content Placeholder 4" descr="A screenshot of a cell phone&#10;&#10;Description automatically generated">
+            <a:extLst>
+              <a:ext uri="{FF2B5EF4-FFF2-40B4-BE49-F238E27FC236}">
+                <a16:creationId xmlns:a16="http://schemas.microsoft.com/office/drawing/2014/main" id="{3AB7B74E-94C0-7745-BC08-DB31448879DC}"/>
+              </a:ext>
+            </a:extLst>
+          </p:cNvPr>
+          <p:cNvPicPr>
+            <a:picLocks noGrp="1" noChangeAspect="1"/>
+          </p:cNvPicPr>
+          <p:nvPr>
+            <p:ph sz="half" idx="2"/>
+          </p:nvPr>
+        </p:nvPicPr>
+        <p:blipFill>
+          <a:blip r:embed="rId2"/>
+          <a:stretch>
+            <a:fillRect/>
+          </a:stretch>
+        </p:blipFill>
+        <p:spPr>
+          <a:xfrm>
+            <a:off x="5834743" y="1305881"/>
+            <a:ext cx="6683828" cy="5390826"/>
+          </a:xfrm>
+        </p:spPr>
+      </p:pic>
     </p:spTree>
     <p:extLst>
       <p:ext uri="{BB962C8B-B14F-4D97-AF65-F5344CB8AC3E}">
@@ -10788,7 +10587,7 @@
           <p:cNvPr id="2" name="Title 1">
             <a:extLst>
               <a:ext uri="{FF2B5EF4-FFF2-40B4-BE49-F238E27FC236}">
-                <a16:creationId xmlns:a16="http://schemas.microsoft.com/office/drawing/2014/main" id="{14A5356A-D1C5-BB44-AF3B-FBD2EBF213CC}"/>
+                <a16:creationId xmlns:a16="http://schemas.microsoft.com/office/drawing/2014/main" id="{CA190DEC-5E84-F843-B342-416D78165177}"/>
               </a:ext>
             </a:extLst>
           </p:cNvPr>
@@ -10806,7 +10605,7 @@
           <a:p>
             <a:r>
               <a:rPr lang="en-US" dirty="0"/>
-              <a:t>Accelerometer Noise</a:t>
+              <a:t>Gyro Clipping</a:t>
             </a:r>
           </a:p>
         </p:txBody>
@@ -10816,30 +10615,74 @@
           <p:cNvPr id="3" name="Content Placeholder 2">
             <a:extLst>
               <a:ext uri="{FF2B5EF4-FFF2-40B4-BE49-F238E27FC236}">
-                <a16:creationId xmlns:a16="http://schemas.microsoft.com/office/drawing/2014/main" id="{A87A454F-5009-DF4E-A06D-5FB88EBFA685}"/>
-              </a:ext>
-            </a:extLst>
-          </p:cNvPr>
-          <p:cNvSpPr>
-            <a:spLocks noGrp="1"/>
-          </p:cNvSpPr>
-          <p:nvPr>
-            <p:ph idx="1"/>
-          </p:nvPr>
-        </p:nvSpPr>
-        <p:spPr/>
-        <p:txBody>
-          <a:bodyPr/>
-          <a:lstStyle/>
-          <a:p>
-            <a:endParaRPr lang="en-US"/>
-          </a:p>
-        </p:txBody>
-      </p:sp>
+                <a16:creationId xmlns:a16="http://schemas.microsoft.com/office/drawing/2014/main" id="{737BF1B2-375D-C94F-9361-7D8AAC22126A}"/>
+              </a:ext>
+            </a:extLst>
+          </p:cNvPr>
+          <p:cNvSpPr>
+            <a:spLocks noGrp="1"/>
+          </p:cNvSpPr>
+          <p:nvPr>
+            <p:ph sz="half" idx="1"/>
+          </p:nvPr>
+        </p:nvSpPr>
+        <p:spPr/>
+        <p:txBody>
+          <a:bodyPr/>
+          <a:lstStyle/>
+          <a:p>
+            <a:r>
+              <a:rPr lang="en-US" dirty="0"/>
+              <a:t>Clipping occurs when the measured value exceed what the IMU can measure</a:t>
+            </a:r>
+          </a:p>
+          <a:p>
+            <a:r>
+              <a:rPr lang="en-US" dirty="0"/>
+              <a:t>Since we are integrating the gyroscope, clipping is especially bad.</a:t>
+            </a:r>
+          </a:p>
+          <a:p>
+            <a:r>
+              <a:rPr lang="en-US" dirty="0"/>
+              <a:t>Fix it by setting the resolution of your gyroscope.</a:t>
+            </a:r>
+          </a:p>
+        </p:txBody>
+      </p:sp>
+      <p:pic>
+        <p:nvPicPr>
+          <p:cNvPr id="5" name="Content Placeholder 4" descr="A screenshot of a computer screen&#10;&#10;Description automatically generated">
+            <a:extLst>
+              <a:ext uri="{FF2B5EF4-FFF2-40B4-BE49-F238E27FC236}">
+                <a16:creationId xmlns:a16="http://schemas.microsoft.com/office/drawing/2014/main" id="{D69D31CB-5B65-7144-B023-CD7615402813}"/>
+              </a:ext>
+            </a:extLst>
+          </p:cNvPr>
+          <p:cNvPicPr>
+            <a:picLocks noGrp="1" noChangeAspect="1"/>
+          </p:cNvPicPr>
+          <p:nvPr>
+            <p:ph sz="half" idx="2"/>
+          </p:nvPr>
+        </p:nvPicPr>
+        <p:blipFill>
+          <a:blip r:embed="rId2"/>
+          <a:stretch>
+            <a:fillRect/>
+          </a:stretch>
+        </p:blipFill>
+        <p:spPr>
+          <a:xfrm>
+            <a:off x="5851311" y="1240971"/>
+            <a:ext cx="6221969" cy="5018314"/>
+          </a:xfrm>
+        </p:spPr>
+      </p:pic>
     </p:spTree>
     <p:extLst>
       <p:ext uri="{BB962C8B-B14F-4D97-AF65-F5344CB8AC3E}">
-        <p14:creationId xmlns:p14="http://schemas.microsoft.com/office/powerpoint/2010/main" val="2011371007"/>
+        <p14:creationId xmlns:p14="http://schemas.microsoft.com/office/powerpoint/2010/main" val="2408447168"/>
       </p:ext>
     </p:extLst>
   </p:cSld>

</xml_diff>

<commit_message>
update slides and labs
</commit_message>
<xml_diff>
--- a/labs/Sensing-And-Filtering/Sensing-And-Filtering.pptx
+++ b/labs/Sensing-And-Filtering/Sensing-And-Filtering.pptx
@@ -304,7 +304,7 @@
           <a:p>
             <a:fld id="{48000354-592C-D644-9B2B-8FBA8F24B574}" type="datetimeFigureOut">
               <a:rPr lang="en-US" smtClean="0"/>
-              <a:t>3/10/19</a:t>
+              <a:t>4/14/19</a:t>
             </a:fld>
             <a:endParaRPr lang="en-US"/>
           </a:p>
@@ -502,7 +502,7 @@
           <a:p>
             <a:fld id="{48000354-592C-D644-9B2B-8FBA8F24B574}" type="datetimeFigureOut">
               <a:rPr lang="en-US" smtClean="0"/>
-              <a:t>3/10/19</a:t>
+              <a:t>4/14/19</a:t>
             </a:fld>
             <a:endParaRPr lang="en-US"/>
           </a:p>
@@ -710,7 +710,7 @@
           <a:p>
             <a:fld id="{48000354-592C-D644-9B2B-8FBA8F24B574}" type="datetimeFigureOut">
               <a:rPr lang="en-US" smtClean="0"/>
-              <a:t>3/10/19</a:t>
+              <a:t>4/14/19</a:t>
             </a:fld>
             <a:endParaRPr lang="en-US"/>
           </a:p>
@@ -908,7 +908,7 @@
           <a:p>
             <a:fld id="{48000354-592C-D644-9B2B-8FBA8F24B574}" type="datetimeFigureOut">
               <a:rPr lang="en-US" smtClean="0"/>
-              <a:t>3/10/19</a:t>
+              <a:t>4/14/19</a:t>
             </a:fld>
             <a:endParaRPr lang="en-US"/>
           </a:p>
@@ -1183,7 +1183,7 @@
           <a:p>
             <a:fld id="{48000354-592C-D644-9B2B-8FBA8F24B574}" type="datetimeFigureOut">
               <a:rPr lang="en-US" smtClean="0"/>
-              <a:t>3/10/19</a:t>
+              <a:t>4/14/19</a:t>
             </a:fld>
             <a:endParaRPr lang="en-US"/>
           </a:p>
@@ -1448,7 +1448,7 @@
           <a:p>
             <a:fld id="{48000354-592C-D644-9B2B-8FBA8F24B574}" type="datetimeFigureOut">
               <a:rPr lang="en-US" smtClean="0"/>
-              <a:t>3/10/19</a:t>
+              <a:t>4/14/19</a:t>
             </a:fld>
             <a:endParaRPr lang="en-US"/>
           </a:p>
@@ -1860,7 +1860,7 @@
           <a:p>
             <a:fld id="{48000354-592C-D644-9B2B-8FBA8F24B574}" type="datetimeFigureOut">
               <a:rPr lang="en-US" smtClean="0"/>
-              <a:t>3/10/19</a:t>
+              <a:t>4/14/19</a:t>
             </a:fld>
             <a:endParaRPr lang="en-US"/>
           </a:p>
@@ -2001,7 +2001,7 @@
           <a:p>
             <a:fld id="{48000354-592C-D644-9B2B-8FBA8F24B574}" type="datetimeFigureOut">
               <a:rPr lang="en-US" smtClean="0"/>
-              <a:t>3/10/19</a:t>
+              <a:t>4/14/19</a:t>
             </a:fld>
             <a:endParaRPr lang="en-US"/>
           </a:p>
@@ -2114,7 +2114,7 @@
           <a:p>
             <a:fld id="{48000354-592C-D644-9B2B-8FBA8F24B574}" type="datetimeFigureOut">
               <a:rPr lang="en-US" smtClean="0"/>
-              <a:t>3/10/19</a:t>
+              <a:t>4/14/19</a:t>
             </a:fld>
             <a:endParaRPr lang="en-US"/>
           </a:p>
@@ -2425,7 +2425,7 @@
           <a:p>
             <a:fld id="{48000354-592C-D644-9B2B-8FBA8F24B574}" type="datetimeFigureOut">
               <a:rPr lang="en-US" smtClean="0"/>
-              <a:t>3/10/19</a:t>
+              <a:t>4/14/19</a:t>
             </a:fld>
             <a:endParaRPr lang="en-US"/>
           </a:p>
@@ -2713,7 +2713,7 @@
           <a:p>
             <a:fld id="{48000354-592C-D644-9B2B-8FBA8F24B574}" type="datetimeFigureOut">
               <a:rPr lang="en-US" smtClean="0"/>
-              <a:t>3/10/19</a:t>
+              <a:t>4/14/19</a:t>
             </a:fld>
             <a:endParaRPr lang="en-US"/>
           </a:p>
@@ -2954,7 +2954,7 @@
           <a:p>
             <a:fld id="{48000354-592C-D644-9B2B-8FBA8F24B574}" type="datetimeFigureOut">
               <a:rPr lang="en-US" smtClean="0"/>
-              <a:t>3/10/19</a:t>
+              <a:t>4/14/19</a:t>
             </a:fld>
             <a:endParaRPr lang="en-US"/>
           </a:p>
@@ -6273,7 +6273,7 @@
             <a:pPr lvl="1"/>
             <a:r>
               <a:rPr lang="en-US" dirty="0"/>
-              <a:t>Once perturbed, there’s no force acting on the aircraft to return it to equilibrium.</a:t>
+              <a:t>Once perturbed, there’s no force acting on the aircraft to return it to equilibrium (unlike an airplane).</a:t>
             </a:r>
           </a:p>
         </p:txBody>
@@ -7215,7 +7215,7 @@
           </a:ln>
           <a:extLst>
             <a:ext uri="{C572A759-6A51-4108-AA02-DFA0A04FC94B}">
-              <ma14:wrappingTextBoxFlag xmlns="" xmlns:ma14="http://schemas.microsoft.com/office/mac/drawingml/2011/main" val="1"/>
+              <ma14:wrappingTextBoxFlag xmlns:ma14="http://schemas.microsoft.com/office/mac/drawingml/2011/main" xmlns="" val="1"/>
             </a:ext>
           </a:extLst>
         </p:spPr>
@@ -7258,7 +7258,7 @@
           </a:ln>
           <a:extLst>
             <a:ext uri="{C572A759-6A51-4108-AA02-DFA0A04FC94B}">
-              <ma14:wrappingTextBoxFlag xmlns="" xmlns:ma14="http://schemas.microsoft.com/office/mac/drawingml/2011/main" val="1"/>
+              <ma14:wrappingTextBoxFlag xmlns:ma14="http://schemas.microsoft.com/office/mac/drawingml/2011/main" xmlns="" val="1"/>
             </a:ext>
           </a:extLst>
         </p:spPr>
@@ -7301,7 +7301,7 @@
           </a:ln>
           <a:extLst>
             <a:ext uri="{C572A759-6A51-4108-AA02-DFA0A04FC94B}">
-              <ma14:wrappingTextBoxFlag xmlns="" xmlns:ma14="http://schemas.microsoft.com/office/mac/drawingml/2011/main" val="1"/>
+              <ma14:wrappingTextBoxFlag xmlns:ma14="http://schemas.microsoft.com/office/mac/drawingml/2011/main" xmlns="" val="1"/>
             </a:ext>
           </a:extLst>
         </p:spPr>
@@ -10010,8 +10010,11 @@
           <a:p>
             <a:r>
               <a:rPr lang="en-US" dirty="0"/>
-              <a:t>We don’t need the yaw angle</a:t>
-            </a:r>
+              <a:t>We are only using ‘pitch’ in this  lab.</a:t>
+            </a:r>
+          </a:p>
+          <a:p>
+            <a:endParaRPr lang="en-US" dirty="0"/>
           </a:p>
         </p:txBody>
       </p:sp>

</xml_diff>

<commit_message>
update slides and lab writes
</commit_message>
<xml_diff>
--- a/labs/Sensing-And-Filtering/Sensing-And-Filtering.pptx
+++ b/labs/Sensing-And-Filtering/Sensing-And-Filtering.pptx
@@ -15,14 +15,14 @@
     <p:sldId id="342" r:id="rId9"/>
     <p:sldId id="352" r:id="rId10"/>
     <p:sldId id="348" r:id="rId11"/>
-    <p:sldId id="354" r:id="rId12"/>
+    <p:sldId id="350" r:id="rId12"/>
     <p:sldId id="353" r:id="rId13"/>
     <p:sldId id="355" r:id="rId14"/>
     <p:sldId id="356" r:id="rId15"/>
     <p:sldId id="357" r:id="rId16"/>
-    <p:sldId id="363" r:id="rId17"/>
-    <p:sldId id="358" r:id="rId18"/>
-    <p:sldId id="350" r:id="rId19"/>
+    <p:sldId id="354" r:id="rId17"/>
+    <p:sldId id="363" r:id="rId18"/>
+    <p:sldId id="358" r:id="rId19"/>
     <p:sldId id="351" r:id="rId20"/>
     <p:sldId id="343" r:id="rId21"/>
     <p:sldId id="347" r:id="rId22"/>
@@ -30,27 +30,29 @@
     <p:sldId id="360" r:id="rId24"/>
     <p:sldId id="361" r:id="rId25"/>
     <p:sldId id="258" r:id="rId26"/>
-    <p:sldId id="266" r:id="rId27"/>
-    <p:sldId id="262" r:id="rId28"/>
-    <p:sldId id="267" r:id="rId29"/>
-    <p:sldId id="268" r:id="rId30"/>
-    <p:sldId id="269" r:id="rId31"/>
-    <p:sldId id="270" r:id="rId32"/>
-    <p:sldId id="271" r:id="rId33"/>
-    <p:sldId id="272" r:id="rId34"/>
-    <p:sldId id="273" r:id="rId35"/>
-    <p:sldId id="274" r:id="rId36"/>
-    <p:sldId id="260" r:id="rId37"/>
-    <p:sldId id="282" r:id="rId38"/>
-    <p:sldId id="338" r:id="rId39"/>
-    <p:sldId id="339" r:id="rId40"/>
-    <p:sldId id="264" r:id="rId41"/>
-    <p:sldId id="263" r:id="rId42"/>
-    <p:sldId id="283" r:id="rId43"/>
-    <p:sldId id="278" r:id="rId44"/>
-    <p:sldId id="279" r:id="rId45"/>
-    <p:sldId id="280" r:id="rId46"/>
-    <p:sldId id="284" r:id="rId47"/>
+    <p:sldId id="364" r:id="rId27"/>
+    <p:sldId id="365" r:id="rId28"/>
+    <p:sldId id="266" r:id="rId29"/>
+    <p:sldId id="262" r:id="rId30"/>
+    <p:sldId id="267" r:id="rId31"/>
+    <p:sldId id="268" r:id="rId32"/>
+    <p:sldId id="269" r:id="rId33"/>
+    <p:sldId id="270" r:id="rId34"/>
+    <p:sldId id="271" r:id="rId35"/>
+    <p:sldId id="272" r:id="rId36"/>
+    <p:sldId id="273" r:id="rId37"/>
+    <p:sldId id="274" r:id="rId38"/>
+    <p:sldId id="260" r:id="rId39"/>
+    <p:sldId id="282" r:id="rId40"/>
+    <p:sldId id="338" r:id="rId41"/>
+    <p:sldId id="339" r:id="rId42"/>
+    <p:sldId id="264" r:id="rId43"/>
+    <p:sldId id="263" r:id="rId44"/>
+    <p:sldId id="283" r:id="rId45"/>
+    <p:sldId id="278" r:id="rId46"/>
+    <p:sldId id="279" r:id="rId47"/>
+    <p:sldId id="280" r:id="rId48"/>
+    <p:sldId id="284" r:id="rId49"/>
   </p:sldIdLst>
   <p:sldSz cx="12192000" cy="6858000"/>
   <p:notesSz cx="6858000" cy="9144000"/>
@@ -304,7 +306,7 @@
           <a:p>
             <a:fld id="{48000354-592C-D644-9B2B-8FBA8F24B574}" type="datetimeFigureOut">
               <a:rPr lang="en-US" smtClean="0"/>
-              <a:t>4/14/19</a:t>
+              <a:t>4/16/19</a:t>
             </a:fld>
             <a:endParaRPr lang="en-US"/>
           </a:p>
@@ -502,7 +504,7 @@
           <a:p>
             <a:fld id="{48000354-592C-D644-9B2B-8FBA8F24B574}" type="datetimeFigureOut">
               <a:rPr lang="en-US" smtClean="0"/>
-              <a:t>4/14/19</a:t>
+              <a:t>4/16/19</a:t>
             </a:fld>
             <a:endParaRPr lang="en-US"/>
           </a:p>
@@ -710,7 +712,7 @@
           <a:p>
             <a:fld id="{48000354-592C-D644-9B2B-8FBA8F24B574}" type="datetimeFigureOut">
               <a:rPr lang="en-US" smtClean="0"/>
-              <a:t>4/14/19</a:t>
+              <a:t>4/16/19</a:t>
             </a:fld>
             <a:endParaRPr lang="en-US"/>
           </a:p>
@@ -908,7 +910,7 @@
           <a:p>
             <a:fld id="{48000354-592C-D644-9B2B-8FBA8F24B574}" type="datetimeFigureOut">
               <a:rPr lang="en-US" smtClean="0"/>
-              <a:t>4/14/19</a:t>
+              <a:t>4/16/19</a:t>
             </a:fld>
             <a:endParaRPr lang="en-US"/>
           </a:p>
@@ -1183,7 +1185,7 @@
           <a:p>
             <a:fld id="{48000354-592C-D644-9B2B-8FBA8F24B574}" type="datetimeFigureOut">
               <a:rPr lang="en-US" smtClean="0"/>
-              <a:t>4/14/19</a:t>
+              <a:t>4/16/19</a:t>
             </a:fld>
             <a:endParaRPr lang="en-US"/>
           </a:p>
@@ -1448,7 +1450,7 @@
           <a:p>
             <a:fld id="{48000354-592C-D644-9B2B-8FBA8F24B574}" type="datetimeFigureOut">
               <a:rPr lang="en-US" smtClean="0"/>
-              <a:t>4/14/19</a:t>
+              <a:t>4/16/19</a:t>
             </a:fld>
             <a:endParaRPr lang="en-US"/>
           </a:p>
@@ -1860,7 +1862,7 @@
           <a:p>
             <a:fld id="{48000354-592C-D644-9B2B-8FBA8F24B574}" type="datetimeFigureOut">
               <a:rPr lang="en-US" smtClean="0"/>
-              <a:t>4/14/19</a:t>
+              <a:t>4/16/19</a:t>
             </a:fld>
             <a:endParaRPr lang="en-US"/>
           </a:p>
@@ -2001,7 +2003,7 @@
           <a:p>
             <a:fld id="{48000354-592C-D644-9B2B-8FBA8F24B574}" type="datetimeFigureOut">
               <a:rPr lang="en-US" smtClean="0"/>
-              <a:t>4/14/19</a:t>
+              <a:t>4/16/19</a:t>
             </a:fld>
             <a:endParaRPr lang="en-US"/>
           </a:p>
@@ -2114,7 +2116,7 @@
           <a:p>
             <a:fld id="{48000354-592C-D644-9B2B-8FBA8F24B574}" type="datetimeFigureOut">
               <a:rPr lang="en-US" smtClean="0"/>
-              <a:t>4/14/19</a:t>
+              <a:t>4/16/19</a:t>
             </a:fld>
             <a:endParaRPr lang="en-US"/>
           </a:p>
@@ -2425,7 +2427,7 @@
           <a:p>
             <a:fld id="{48000354-592C-D644-9B2B-8FBA8F24B574}" type="datetimeFigureOut">
               <a:rPr lang="en-US" smtClean="0"/>
-              <a:t>4/14/19</a:t>
+              <a:t>4/16/19</a:t>
             </a:fld>
             <a:endParaRPr lang="en-US"/>
           </a:p>
@@ -2713,7 +2715,7 @@
           <a:p>
             <a:fld id="{48000354-592C-D644-9B2B-8FBA8F24B574}" type="datetimeFigureOut">
               <a:rPr lang="en-US" smtClean="0"/>
-              <a:t>4/14/19</a:t>
+              <a:t>4/16/19</a:t>
             </a:fld>
             <a:endParaRPr lang="en-US"/>
           </a:p>
@@ -2954,7 +2956,7 @@
           <a:p>
             <a:fld id="{48000354-592C-D644-9B2B-8FBA8F24B574}" type="datetimeFigureOut">
               <a:rPr lang="en-US" smtClean="0"/>
-              <a:t>4/14/19</a:t>
+              <a:t>4/16/19</a:t>
             </a:fld>
             <a:endParaRPr lang="en-US"/>
           </a:p>
@@ -3554,7 +3556,7 @@
           <p:cNvPr id="2" name="Title 1">
             <a:extLst>
               <a:ext uri="{FF2B5EF4-FFF2-40B4-BE49-F238E27FC236}">
-                <a16:creationId xmlns:a16="http://schemas.microsoft.com/office/drawing/2014/main" id="{911697ED-27AC-BD44-973D-02115AF52BB6}"/>
+                <a16:creationId xmlns:a16="http://schemas.microsoft.com/office/drawing/2014/main" id="{5A383F46-4758-DE4F-B8B3-01383989109D}"/>
               </a:ext>
             </a:extLst>
           </p:cNvPr>
@@ -3572,7 +3574,7 @@
           <a:p>
             <a:r>
               <a:rPr lang="en-US" dirty="0"/>
-              <a:t>IMU Internal Accelerometer Filter</a:t>
+              <a:t>Gyroscope Datapath</a:t>
             </a:r>
           </a:p>
         </p:txBody>
@@ -3582,7 +3584,7 @@
           <p:cNvPr id="5" name="Content Placeholder 4">
             <a:extLst>
               <a:ext uri="{FF2B5EF4-FFF2-40B4-BE49-F238E27FC236}">
-                <a16:creationId xmlns:a16="http://schemas.microsoft.com/office/drawing/2014/main" id="{C5ED9B00-2CFF-574C-9258-14815375CA9C}"/>
+                <a16:creationId xmlns:a16="http://schemas.microsoft.com/office/drawing/2014/main" id="{DE407253-754E-6E4F-9BFC-3FE09308704B}"/>
               </a:ext>
             </a:extLst>
           </p:cNvPr>
@@ -3601,8 +3603,8 @@
         </p:blipFill>
         <p:spPr>
           <a:xfrm>
-            <a:off x="1780938" y="1744276"/>
-            <a:ext cx="8496980" cy="4172430"/>
+            <a:off x="1981200" y="1651273"/>
+            <a:ext cx="8229600" cy="4423816"/>
           </a:xfrm>
           <a:prstGeom prst="rect">
             <a:avLst/>
@@ -3612,7 +3614,7 @@
     </p:spTree>
     <p:extLst>
       <p:ext uri="{BB962C8B-B14F-4D97-AF65-F5344CB8AC3E}">
-        <p14:creationId xmlns:p14="http://schemas.microsoft.com/office/powerpoint/2010/main" val="3262093970"/>
+        <p14:creationId xmlns:p14="http://schemas.microsoft.com/office/powerpoint/2010/main" val="1488286159"/>
       </p:ext>
     </p:extLst>
   </p:cSld>
@@ -4118,6 +4120,96 @@
           <p:cNvPr id="2" name="Title 1">
             <a:extLst>
               <a:ext uri="{FF2B5EF4-FFF2-40B4-BE49-F238E27FC236}">
+                <a16:creationId xmlns:a16="http://schemas.microsoft.com/office/drawing/2014/main" id="{911697ED-27AC-BD44-973D-02115AF52BB6}"/>
+              </a:ext>
+            </a:extLst>
+          </p:cNvPr>
+          <p:cNvSpPr>
+            <a:spLocks noGrp="1"/>
+          </p:cNvSpPr>
+          <p:nvPr>
+            <p:ph type="title"/>
+          </p:nvPr>
+        </p:nvSpPr>
+        <p:spPr/>
+        <p:txBody>
+          <a:bodyPr/>
+          <a:lstStyle/>
+          <a:p>
+            <a:r>
+              <a:rPr lang="en-US" dirty="0"/>
+              <a:t>IMU Internal Accelerometer Filter</a:t>
+            </a:r>
+          </a:p>
+        </p:txBody>
+      </p:sp>
+      <p:pic>
+        <p:nvPicPr>
+          <p:cNvPr id="5" name="Content Placeholder 4">
+            <a:extLst>
+              <a:ext uri="{FF2B5EF4-FFF2-40B4-BE49-F238E27FC236}">
+                <a16:creationId xmlns:a16="http://schemas.microsoft.com/office/drawing/2014/main" id="{C5ED9B00-2CFF-574C-9258-14815375CA9C}"/>
+              </a:ext>
+            </a:extLst>
+          </p:cNvPr>
+          <p:cNvPicPr>
+            <a:picLocks noGrp="1" noChangeAspect="1"/>
+          </p:cNvPicPr>
+          <p:nvPr>
+            <p:ph idx="1"/>
+          </p:nvPr>
+        </p:nvPicPr>
+        <p:blipFill>
+          <a:blip r:embed="rId2"/>
+          <a:stretch>
+            <a:fillRect/>
+          </a:stretch>
+        </p:blipFill>
+        <p:spPr>
+          <a:xfrm>
+            <a:off x="1780938" y="1744276"/>
+            <a:ext cx="8496980" cy="4172430"/>
+          </a:xfrm>
+          <a:prstGeom prst="rect">
+            <a:avLst/>
+          </a:prstGeom>
+        </p:spPr>
+      </p:pic>
+    </p:spTree>
+    <p:extLst>
+      <p:ext uri="{BB962C8B-B14F-4D97-AF65-F5344CB8AC3E}">
+        <p14:creationId xmlns:p14="http://schemas.microsoft.com/office/powerpoint/2010/main" val="3262093970"/>
+      </p:ext>
+    </p:extLst>
+  </p:cSld>
+  <p:clrMapOvr>
+    <a:masterClrMapping/>
+  </p:clrMapOvr>
+</p:sld>
+</file>
+
+<file path=ppt/slides/slide17.xml><?xml version="1.0" encoding="utf-8"?>
+<p:sld xmlns:a="http://schemas.openxmlformats.org/drawingml/2006/main" xmlns:r="http://schemas.openxmlformats.org/officeDocument/2006/relationships" xmlns:p="http://schemas.openxmlformats.org/presentationml/2006/main">
+  <p:cSld>
+    <p:spTree>
+      <p:nvGrpSpPr>
+        <p:cNvPr id="1" name=""/>
+        <p:cNvGrpSpPr/>
+        <p:nvPr/>
+      </p:nvGrpSpPr>
+      <p:grpSpPr>
+        <a:xfrm>
+          <a:off x="0" y="0"/>
+          <a:ext cx="0" cy="0"/>
+          <a:chOff x="0" y="0"/>
+          <a:chExt cx="0" cy="0"/>
+        </a:xfrm>
+      </p:grpSpPr>
+      <p:sp>
+        <p:nvSpPr>
+          <p:cNvPr id="2" name="Title 1">
+            <a:extLst>
+              <a:ext uri="{FF2B5EF4-FFF2-40B4-BE49-F238E27FC236}">
                 <a16:creationId xmlns:a16="http://schemas.microsoft.com/office/drawing/2014/main" id="{9F65D6D3-6D4B-E447-8D7E-B403E1E94B3C}"/>
               </a:ext>
             </a:extLst>
@@ -4162,7 +4254,7 @@
           <a:bodyPr/>
           <a:lstStyle/>
           <a:p>
-            <a:endParaRPr lang="en-US"/>
+            <a:endParaRPr lang="en-US" dirty="0"/>
           </a:p>
         </p:txBody>
       </p:sp>
@@ -4179,7 +4271,7 @@
 </p:sld>
 </file>
 
-<file path=ppt/slides/slide17.xml><?xml version="1.0" encoding="utf-8"?>
+<file path=ppt/slides/slide18.xml><?xml version="1.0" encoding="utf-8"?>
 <p:sld xmlns:a="http://schemas.openxmlformats.org/drawingml/2006/main" xmlns:r="http://schemas.openxmlformats.org/officeDocument/2006/relationships" xmlns:p="http://schemas.openxmlformats.org/presentationml/2006/main">
   <p:cSld>
     <p:spTree>
@@ -4289,96 +4381,6 @@
 </p:sld>
 </file>
 
-<file path=ppt/slides/slide18.xml><?xml version="1.0" encoding="utf-8"?>
-<p:sld xmlns:a="http://schemas.openxmlformats.org/drawingml/2006/main" xmlns:r="http://schemas.openxmlformats.org/officeDocument/2006/relationships" xmlns:p="http://schemas.openxmlformats.org/presentationml/2006/main">
-  <p:cSld>
-    <p:spTree>
-      <p:nvGrpSpPr>
-        <p:cNvPr id="1" name=""/>
-        <p:cNvGrpSpPr/>
-        <p:nvPr/>
-      </p:nvGrpSpPr>
-      <p:grpSpPr>
-        <a:xfrm>
-          <a:off x="0" y="0"/>
-          <a:ext cx="0" cy="0"/>
-          <a:chOff x="0" y="0"/>
-          <a:chExt cx="0" cy="0"/>
-        </a:xfrm>
-      </p:grpSpPr>
-      <p:sp>
-        <p:nvSpPr>
-          <p:cNvPr id="2" name="Title 1">
-            <a:extLst>
-              <a:ext uri="{FF2B5EF4-FFF2-40B4-BE49-F238E27FC236}">
-                <a16:creationId xmlns:a16="http://schemas.microsoft.com/office/drawing/2014/main" id="{5A383F46-4758-DE4F-B8B3-01383989109D}"/>
-              </a:ext>
-            </a:extLst>
-          </p:cNvPr>
-          <p:cNvSpPr>
-            <a:spLocks noGrp="1"/>
-          </p:cNvSpPr>
-          <p:nvPr>
-            <p:ph type="title"/>
-          </p:nvPr>
-        </p:nvSpPr>
-        <p:spPr/>
-        <p:txBody>
-          <a:bodyPr/>
-          <a:lstStyle/>
-          <a:p>
-            <a:r>
-              <a:rPr lang="en-US" dirty="0"/>
-              <a:t>Gyroscope Datapath</a:t>
-            </a:r>
-          </a:p>
-        </p:txBody>
-      </p:sp>
-      <p:pic>
-        <p:nvPicPr>
-          <p:cNvPr id="5" name="Content Placeholder 4">
-            <a:extLst>
-              <a:ext uri="{FF2B5EF4-FFF2-40B4-BE49-F238E27FC236}">
-                <a16:creationId xmlns:a16="http://schemas.microsoft.com/office/drawing/2014/main" id="{DE407253-754E-6E4F-9BFC-3FE09308704B}"/>
-              </a:ext>
-            </a:extLst>
-          </p:cNvPr>
-          <p:cNvPicPr>
-            <a:picLocks noGrp="1" noChangeAspect="1"/>
-          </p:cNvPicPr>
-          <p:nvPr>
-            <p:ph idx="1"/>
-          </p:nvPr>
-        </p:nvPicPr>
-        <p:blipFill>
-          <a:blip r:embed="rId2"/>
-          <a:stretch>
-            <a:fillRect/>
-          </a:stretch>
-        </p:blipFill>
-        <p:spPr>
-          <a:xfrm>
-            <a:off x="1981200" y="1651273"/>
-            <a:ext cx="8229600" cy="4423816"/>
-          </a:xfrm>
-          <a:prstGeom prst="rect">
-            <a:avLst/>
-          </a:prstGeom>
-        </p:spPr>
-      </p:pic>
-    </p:spTree>
-    <p:extLst>
-      <p:ext uri="{BB962C8B-B14F-4D97-AF65-F5344CB8AC3E}">
-        <p14:creationId xmlns:p14="http://schemas.microsoft.com/office/powerpoint/2010/main" val="1488286159"/>
-      </p:ext>
-    </p:extLst>
-  </p:cSld>
-  <p:clrMapOvr>
-    <a:masterClrMapping/>
-  </p:clrMapOvr>
-</p:sld>
-</file>
-
 <file path=ppt/slides/slide19.xml><?xml version="1.0" encoding="utf-8"?>
 <p:sld xmlns:a="http://schemas.openxmlformats.org/drawingml/2006/main" xmlns:r="http://schemas.openxmlformats.org/officeDocument/2006/relationships" xmlns:p="http://schemas.openxmlformats.org/presentationml/2006/main">
   <p:cSld>
@@ -4419,7 +4421,7 @@
           <a:p>
             <a:r>
               <a:rPr lang="en-US" dirty="0"/>
-              <a:t>Filter Example</a:t>
+              <a:t>Filter Demo</a:t>
             </a:r>
           </a:p>
         </p:txBody>
@@ -4899,7 +4901,7 @@
             </a:r>
             <a:r>
               <a:rPr lang="en-US" dirty="0"/>
-              <a:t> 	gyro measurement</a:t>
+              <a:t> 		gyro measurement</a:t>
             </a:r>
           </a:p>
           <a:p>
@@ -5238,8 +5240,8 @@
         </p:blipFill>
         <p:spPr>
           <a:xfrm>
-            <a:off x="1354108" y="396370"/>
-            <a:ext cx="9142382" cy="5888816"/>
+            <a:off x="-221673" y="-618626"/>
+            <a:ext cx="12413673" cy="7995928"/>
           </a:xfrm>
           <a:prstGeom prst="rect">
             <a:avLst/>
@@ -5654,45 +5656,46 @@
       </p:grpSpPr>
       <p:sp>
         <p:nvSpPr>
-          <p:cNvPr id="32" name="Shape 32"/>
-          <p:cNvSpPr>
-            <a:spLocks noGrp="1"/>
-          </p:cNvSpPr>
-          <p:nvPr>
-            <p:ph type="ctrTitle"/>
-          </p:nvPr>
-        </p:nvSpPr>
-        <p:spPr>
-          <a:prstGeom prst="rect">
-            <a:avLst/>
-          </a:prstGeom>
-        </p:spPr>
-        <p:txBody>
-          <a:bodyPr/>
-          <a:lstStyle/>
-          <a:p>
-            <a:pPr lvl="0">
-              <a:defRPr sz="1800">
-                <a:solidFill>
-                  <a:srgbClr val="000000"/>
-                </a:solidFill>
-              </a:defRPr>
-            </a:pPr>
-            <a:r>
-              <a:rPr sz="5600" dirty="0"/>
-              <a:t>The PID Controller</a:t>
-            </a:r>
-          </a:p>
-        </p:txBody>
-      </p:sp>
-      <p:sp>
-        <p:nvSpPr>
-          <p:cNvPr id="2" name="Subtitle 1"/>
-          <p:cNvSpPr>
-            <a:spLocks noGrp="1"/>
-          </p:cNvSpPr>
-          <p:nvPr>
-            <p:ph type="subTitle" idx="1"/>
+          <p:cNvPr id="5" name="Title 4">
+            <a:extLst>
+              <a:ext uri="{FF2B5EF4-FFF2-40B4-BE49-F238E27FC236}">
+                <a16:creationId xmlns:a16="http://schemas.microsoft.com/office/drawing/2014/main" id="{D9BD3E73-ED06-AE4C-A39E-9AFAAB6F9EB2}"/>
+              </a:ext>
+            </a:extLst>
+          </p:cNvPr>
+          <p:cNvSpPr>
+            <a:spLocks noGrp="1"/>
+          </p:cNvSpPr>
+          <p:nvPr>
+            <p:ph type="title"/>
+          </p:nvPr>
+        </p:nvSpPr>
+        <p:spPr/>
+        <p:txBody>
+          <a:bodyPr/>
+          <a:lstStyle/>
+          <a:p>
+            <a:r>
+              <a:rPr lang="en-US" dirty="0"/>
+              <a:t>The End</a:t>
+            </a:r>
+          </a:p>
+        </p:txBody>
+      </p:sp>
+      <p:sp>
+        <p:nvSpPr>
+          <p:cNvPr id="6" name="Text Placeholder 5">
+            <a:extLst>
+              <a:ext uri="{FF2B5EF4-FFF2-40B4-BE49-F238E27FC236}">
+                <a16:creationId xmlns:a16="http://schemas.microsoft.com/office/drawing/2014/main" id="{B7A139DA-568E-724B-AF6A-97833BDC652E}"/>
+              </a:ext>
+            </a:extLst>
+          </p:cNvPr>
+          <p:cNvSpPr>
+            <a:spLocks noGrp="1"/>
+          </p:cNvSpPr>
+          <p:nvPr>
+            <p:ph type="body" idx="1"/>
           </p:nvPr>
         </p:nvSpPr>
         <p:spPr/>
@@ -5707,7 +5710,7 @@
     </p:spTree>
     <p:extLst>
       <p:ext uri="{BB962C8B-B14F-4D97-AF65-F5344CB8AC3E}">
-        <p14:creationId xmlns:p14="http://schemas.microsoft.com/office/powerpoint/2010/main" val="1086841966"/>
+        <p14:creationId xmlns:p14="http://schemas.microsoft.com/office/powerpoint/2010/main" val="1449135960"/>
       </p:ext>
     </p:extLst>
   </p:cSld>
@@ -5718,7 +5721,7 @@
 </file>
 
 <file path=ppt/slides/slide27.xml><?xml version="1.0" encoding="utf-8"?>
-<p:sld xmlns:a="http://schemas.openxmlformats.org/drawingml/2006/main" xmlns:r="http://schemas.openxmlformats.org/officeDocument/2006/relationships" xmlns:p="http://schemas.openxmlformats.org/presentationml/2006/main" show="0">
+<p:sld xmlns:a="http://schemas.openxmlformats.org/drawingml/2006/main" xmlns:r="http://schemas.openxmlformats.org/officeDocument/2006/relationships" xmlns:p="http://schemas.openxmlformats.org/presentationml/2006/main">
   <p:cSld>
     <p:spTree>
       <p:nvGrpSpPr>
@@ -5736,7 +5739,13 @@
       </p:grpSpPr>
       <p:sp>
         <p:nvSpPr>
-          <p:cNvPr id="2" name="Title 1"/>
+          <p:cNvPr id="2" name="Title 1">
+            <a:extLst>
+              <a:ext uri="{FF2B5EF4-FFF2-40B4-BE49-F238E27FC236}">
+                <a16:creationId xmlns:a16="http://schemas.microsoft.com/office/drawing/2014/main" id="{33C73BC1-F680-AE48-8309-201328A468E1}"/>
+              </a:ext>
+            </a:extLst>
+          </p:cNvPr>
           <p:cNvSpPr>
             <a:spLocks noGrp="1"/>
           </p:cNvSpPr>
@@ -5751,114 +5760,121 @@
           <a:p>
             <a:r>
               <a:rPr lang="en-US" dirty="0"/>
-              <a:t>To add</a:t>
-            </a:r>
-          </a:p>
-        </p:txBody>
-      </p:sp>
-      <p:sp>
-        <p:nvSpPr>
-          <p:cNvPr id="3" name="Content Placeholder 2"/>
-          <p:cNvSpPr>
-            <a:spLocks noGrp="1"/>
-          </p:cNvSpPr>
-          <p:nvPr>
-            <p:ph idx="1"/>
+              <a:t>Next time	</a:t>
+            </a:r>
+          </a:p>
+        </p:txBody>
+      </p:sp>
+      <p:sp>
+        <p:nvSpPr>
+          <p:cNvPr id="3" name="Content Placeholder 2">
+            <a:extLst>
+              <a:ext uri="{FF2B5EF4-FFF2-40B4-BE49-F238E27FC236}">
+                <a16:creationId xmlns:a16="http://schemas.microsoft.com/office/drawing/2014/main" id="{D27C99BC-BFCB-E146-8F86-A909832F7FF7}"/>
+              </a:ext>
+            </a:extLst>
+          </p:cNvPr>
+          <p:cNvSpPr>
+            <a:spLocks noGrp="1"/>
+          </p:cNvSpPr>
+          <p:nvPr>
+            <p:ph sz="half" idx="1"/>
           </p:nvPr>
         </p:nvSpPr>
         <p:spPr/>
         <p:txBody>
           <a:bodyPr>
-            <a:normAutofit lnSpcReduction="10000"/>
+            <a:normAutofit fontScale="92500"/>
           </a:bodyPr>
           <a:lstStyle/>
           <a:p>
             <a:r>
               <a:rPr lang="en-US" dirty="0"/>
-              <a:t>Discuss different ways they can control their quad</a:t>
-            </a:r>
-          </a:p>
-          <a:p>
-            <a:pPr lvl="1"/>
-            <a:r>
-              <a:rPr lang="en-US" dirty="0"/>
-              <a:t>Pitch/roll -&gt; rate of change of angle</a:t>
-            </a:r>
-          </a:p>
-          <a:p>
-            <a:pPr lvl="1"/>
-            <a:r>
-              <a:rPr lang="en-US" dirty="0"/>
-              <a:t>Pitch/roll -&gt; angle of attack</a:t>
-            </a:r>
-          </a:p>
-          <a:p>
-            <a:pPr lvl="1"/>
-            <a:r>
-              <a:rPr lang="en-US" dirty="0"/>
-              <a:t>Pitch/roll -&gt; velocity</a:t>
-            </a:r>
-          </a:p>
-          <a:p>
-            <a:pPr lvl="1"/>
-            <a:r>
-              <a:rPr lang="en-US" dirty="0"/>
-              <a:t>Pitch/roll -&gt; position</a:t>
-            </a:r>
-          </a:p>
-          <a:p>
-            <a:pPr lvl="1"/>
-            <a:r>
-              <a:rPr lang="en-US" dirty="0"/>
-              <a:t>Throttle -&gt; throttle</a:t>
-            </a:r>
-          </a:p>
-          <a:p>
-            <a:pPr lvl="1"/>
-            <a:r>
-              <a:rPr lang="en-US" dirty="0"/>
-              <a:t>Throttle -&gt; rate of climb</a:t>
-            </a:r>
-          </a:p>
-          <a:p>
-            <a:pPr lvl="1"/>
-            <a:r>
-              <a:rPr lang="en-US" dirty="0"/>
-              <a:t>Throttle -&gt; altitude</a:t>
-            </a:r>
-          </a:p>
-          <a:p>
-            <a:r>
-              <a:rPr lang="en-US" dirty="0"/>
-              <a:t>Discuss higher-order control</a:t>
-            </a:r>
-          </a:p>
-          <a:p>
-            <a:pPr lvl="1"/>
-            <a:r>
-              <a:rPr lang="en-US" dirty="0"/>
-              <a:t>How to integrate GPS</a:t>
-            </a:r>
-          </a:p>
-          <a:p>
-            <a:pPr lvl="1"/>
-            <a:r>
-              <a:rPr lang="en-US" dirty="0"/>
-              <a:t>How to integrate barometer</a:t>
-            </a:r>
-          </a:p>
-          <a:p>
+              <a:t>More details and updated code about writing to registers</a:t>
+            </a:r>
+          </a:p>
+          <a:p>
+            <a:r>
+              <a:rPr lang="en-US" dirty="0"/>
+              <a:t>More detailed discussion of XL </a:t>
+            </a:r>
+            <a:r>
+              <a:rPr lang="en-US" dirty="0" err="1"/>
+              <a:t>datapath</a:t>
+            </a:r>
+            <a:r>
+              <a:rPr lang="en-US" dirty="0"/>
+              <a:t> and filtering.</a:t>
+            </a:r>
+          </a:p>
+          <a:p>
+            <a:r>
+              <a:rPr lang="en-US" dirty="0"/>
+              <a:t>Slides about LP and HP filters.</a:t>
+            </a:r>
+          </a:p>
+          <a:p>
+            <a:r>
+              <a:rPr lang="en-US" dirty="0"/>
+              <a:t>These slides + assembly slides took about 60 min.</a:t>
+            </a:r>
+          </a:p>
+          <a:p>
+            <a:r>
+              <a:rPr lang="en-US" dirty="0"/>
+              <a:t>30 min of questions at the start. </a:t>
+            </a:r>
+          </a:p>
+          <a:p>
+            <a:r>
+              <a:rPr lang="en-US" dirty="0"/>
+              <a:t>Adjust complimentary filter demo, so it’s easier </a:t>
+            </a:r>
+            <a:r>
+              <a:rPr lang="en-US"/>
+              <a:t>to get to C = 0</a:t>
+            </a:r>
             <a:endParaRPr lang="en-US" dirty="0"/>
           </a:p>
           <a:p>
             <a:endParaRPr lang="en-US" dirty="0"/>
+          </a:p>
+          <a:p>
+            <a:endParaRPr lang="en-US" dirty="0"/>
+          </a:p>
+        </p:txBody>
+      </p:sp>
+      <p:sp>
+        <p:nvSpPr>
+          <p:cNvPr id="4" name="Content Placeholder 3">
+            <a:extLst>
+              <a:ext uri="{FF2B5EF4-FFF2-40B4-BE49-F238E27FC236}">
+                <a16:creationId xmlns:a16="http://schemas.microsoft.com/office/drawing/2014/main" id="{083AB541-A0B4-DC4E-AAB8-A920544D27F0}"/>
+              </a:ext>
+            </a:extLst>
+          </p:cNvPr>
+          <p:cNvSpPr>
+            <a:spLocks noGrp="1"/>
+          </p:cNvSpPr>
+          <p:nvPr>
+            <p:ph sz="half" idx="2"/>
+          </p:nvPr>
+        </p:nvSpPr>
+        <p:spPr/>
+        <p:txBody>
+          <a:bodyPr>
+            <a:normAutofit fontScale="92500"/>
+          </a:bodyPr>
+          <a:lstStyle/>
+          <a:p>
+            <a:endParaRPr lang="en-US"/>
           </a:p>
         </p:txBody>
       </p:sp>
     </p:spTree>
     <p:extLst>
       <p:ext uri="{BB962C8B-B14F-4D97-AF65-F5344CB8AC3E}">
-        <p14:creationId xmlns:p14="http://schemas.microsoft.com/office/powerpoint/2010/main" val="2746314964"/>
+        <p14:creationId xmlns:p14="http://schemas.microsoft.com/office/powerpoint/2010/main" val="69075986"/>
       </p:ext>
     </p:extLst>
   </p:cSld>
@@ -5887,6 +5903,334 @@
       </p:grpSpPr>
       <p:sp>
         <p:nvSpPr>
+          <p:cNvPr id="32" name="Shape 32"/>
+          <p:cNvSpPr>
+            <a:spLocks noGrp="1"/>
+          </p:cNvSpPr>
+          <p:nvPr>
+            <p:ph type="ctrTitle"/>
+          </p:nvPr>
+        </p:nvSpPr>
+        <p:spPr>
+          <a:prstGeom prst="rect">
+            <a:avLst/>
+          </a:prstGeom>
+        </p:spPr>
+        <p:txBody>
+          <a:bodyPr/>
+          <a:lstStyle/>
+          <a:p>
+            <a:pPr lvl="0">
+              <a:defRPr sz="1800">
+                <a:solidFill>
+                  <a:srgbClr val="000000"/>
+                </a:solidFill>
+              </a:defRPr>
+            </a:pPr>
+            <a:r>
+              <a:rPr sz="5600" dirty="0"/>
+              <a:t>The PID Controller</a:t>
+            </a:r>
+          </a:p>
+        </p:txBody>
+      </p:sp>
+      <p:sp>
+        <p:nvSpPr>
+          <p:cNvPr id="2" name="Subtitle 1"/>
+          <p:cNvSpPr>
+            <a:spLocks noGrp="1"/>
+          </p:cNvSpPr>
+          <p:nvPr>
+            <p:ph type="subTitle" idx="1"/>
+          </p:nvPr>
+        </p:nvSpPr>
+        <p:spPr/>
+        <p:txBody>
+          <a:bodyPr/>
+          <a:lstStyle/>
+          <a:p>
+            <a:endParaRPr lang="en-US"/>
+          </a:p>
+        </p:txBody>
+      </p:sp>
+    </p:spTree>
+    <p:extLst>
+      <p:ext uri="{BB962C8B-B14F-4D97-AF65-F5344CB8AC3E}">
+        <p14:creationId xmlns:p14="http://schemas.microsoft.com/office/powerpoint/2010/main" val="1086841966"/>
+      </p:ext>
+    </p:extLst>
+  </p:cSld>
+  <p:clrMapOvr>
+    <a:masterClrMapping/>
+  </p:clrMapOvr>
+</p:sld>
+</file>
+
+<file path=ppt/slides/slide29.xml><?xml version="1.0" encoding="utf-8"?>
+<p:sld xmlns:a="http://schemas.openxmlformats.org/drawingml/2006/main" xmlns:r="http://schemas.openxmlformats.org/officeDocument/2006/relationships" xmlns:p="http://schemas.openxmlformats.org/presentationml/2006/main" show="0">
+  <p:cSld>
+    <p:spTree>
+      <p:nvGrpSpPr>
+        <p:cNvPr id="1" name=""/>
+        <p:cNvGrpSpPr/>
+        <p:nvPr/>
+      </p:nvGrpSpPr>
+      <p:grpSpPr>
+        <a:xfrm>
+          <a:off x="0" y="0"/>
+          <a:ext cx="0" cy="0"/>
+          <a:chOff x="0" y="0"/>
+          <a:chExt cx="0" cy="0"/>
+        </a:xfrm>
+      </p:grpSpPr>
+      <p:sp>
+        <p:nvSpPr>
+          <p:cNvPr id="2" name="Title 1"/>
+          <p:cNvSpPr>
+            <a:spLocks noGrp="1"/>
+          </p:cNvSpPr>
+          <p:nvPr>
+            <p:ph type="title"/>
+          </p:nvPr>
+        </p:nvSpPr>
+        <p:spPr/>
+        <p:txBody>
+          <a:bodyPr/>
+          <a:lstStyle/>
+          <a:p>
+            <a:r>
+              <a:rPr lang="en-US" dirty="0"/>
+              <a:t>To add</a:t>
+            </a:r>
+          </a:p>
+        </p:txBody>
+      </p:sp>
+      <p:sp>
+        <p:nvSpPr>
+          <p:cNvPr id="3" name="Content Placeholder 2"/>
+          <p:cNvSpPr>
+            <a:spLocks noGrp="1"/>
+          </p:cNvSpPr>
+          <p:nvPr>
+            <p:ph idx="1"/>
+          </p:nvPr>
+        </p:nvSpPr>
+        <p:spPr/>
+        <p:txBody>
+          <a:bodyPr>
+            <a:normAutofit lnSpcReduction="10000"/>
+          </a:bodyPr>
+          <a:lstStyle/>
+          <a:p>
+            <a:r>
+              <a:rPr lang="en-US" dirty="0"/>
+              <a:t>Discuss different ways they can control their quad</a:t>
+            </a:r>
+          </a:p>
+          <a:p>
+            <a:pPr lvl="1"/>
+            <a:r>
+              <a:rPr lang="en-US" dirty="0"/>
+              <a:t>Pitch/roll -&gt; rate of change of angle</a:t>
+            </a:r>
+          </a:p>
+          <a:p>
+            <a:pPr lvl="1"/>
+            <a:r>
+              <a:rPr lang="en-US" dirty="0"/>
+              <a:t>Pitch/roll -&gt; angle of attack</a:t>
+            </a:r>
+          </a:p>
+          <a:p>
+            <a:pPr lvl="1"/>
+            <a:r>
+              <a:rPr lang="en-US" dirty="0"/>
+              <a:t>Pitch/roll -&gt; velocity</a:t>
+            </a:r>
+          </a:p>
+          <a:p>
+            <a:pPr lvl="1"/>
+            <a:r>
+              <a:rPr lang="en-US" dirty="0"/>
+              <a:t>Pitch/roll -&gt; position</a:t>
+            </a:r>
+          </a:p>
+          <a:p>
+            <a:pPr lvl="1"/>
+            <a:r>
+              <a:rPr lang="en-US" dirty="0"/>
+              <a:t>Throttle -&gt; throttle</a:t>
+            </a:r>
+          </a:p>
+          <a:p>
+            <a:pPr lvl="1"/>
+            <a:r>
+              <a:rPr lang="en-US" dirty="0"/>
+              <a:t>Throttle -&gt; rate of climb</a:t>
+            </a:r>
+          </a:p>
+          <a:p>
+            <a:pPr lvl="1"/>
+            <a:r>
+              <a:rPr lang="en-US" dirty="0"/>
+              <a:t>Throttle -&gt; altitude</a:t>
+            </a:r>
+          </a:p>
+          <a:p>
+            <a:r>
+              <a:rPr lang="en-US" dirty="0"/>
+              <a:t>Discuss higher-order control</a:t>
+            </a:r>
+          </a:p>
+          <a:p>
+            <a:pPr lvl="1"/>
+            <a:r>
+              <a:rPr lang="en-US" dirty="0"/>
+              <a:t>How to integrate GPS</a:t>
+            </a:r>
+          </a:p>
+          <a:p>
+            <a:pPr lvl="1"/>
+            <a:r>
+              <a:rPr lang="en-US" dirty="0"/>
+              <a:t>How to integrate barometer</a:t>
+            </a:r>
+          </a:p>
+          <a:p>
+            <a:endParaRPr lang="en-US" dirty="0"/>
+          </a:p>
+          <a:p>
+            <a:endParaRPr lang="en-US" dirty="0"/>
+          </a:p>
+        </p:txBody>
+      </p:sp>
+    </p:spTree>
+    <p:extLst>
+      <p:ext uri="{BB962C8B-B14F-4D97-AF65-F5344CB8AC3E}">
+        <p14:creationId xmlns:p14="http://schemas.microsoft.com/office/powerpoint/2010/main" val="2746314964"/>
+      </p:ext>
+    </p:extLst>
+  </p:cSld>
+  <p:clrMapOvr>
+    <a:masterClrMapping/>
+  </p:clrMapOvr>
+</p:sld>
+</file>
+
+<file path=ppt/slides/slide3.xml><?xml version="1.0" encoding="utf-8"?>
+<p:sld xmlns:a="http://schemas.openxmlformats.org/drawingml/2006/main" xmlns:r="http://schemas.openxmlformats.org/officeDocument/2006/relationships" xmlns:p="http://schemas.openxmlformats.org/presentationml/2006/main">
+  <p:cSld>
+    <p:spTree>
+      <p:nvGrpSpPr>
+        <p:cNvPr id="1" name=""/>
+        <p:cNvGrpSpPr/>
+        <p:nvPr/>
+      </p:nvGrpSpPr>
+      <p:grpSpPr>
+        <a:xfrm>
+          <a:off x="0" y="0"/>
+          <a:ext cx="0" cy="0"/>
+          <a:chOff x="0" y="0"/>
+          <a:chExt cx="0" cy="0"/>
+        </a:xfrm>
+      </p:grpSpPr>
+      <p:sp>
+        <p:nvSpPr>
+          <p:cNvPr id="2" name="Title 1"/>
+          <p:cNvSpPr>
+            <a:spLocks noGrp="1"/>
+          </p:cNvSpPr>
+          <p:nvPr>
+            <p:ph type="title"/>
+          </p:nvPr>
+        </p:nvSpPr>
+        <p:spPr/>
+        <p:txBody>
+          <a:bodyPr/>
+          <a:lstStyle/>
+          <a:p>
+            <a:r>
+              <a:rPr lang="en-US" dirty="0"/>
+              <a:t>Maintaining Stability</a:t>
+            </a:r>
+          </a:p>
+        </p:txBody>
+      </p:sp>
+      <p:sp>
+        <p:nvSpPr>
+          <p:cNvPr id="3" name="Content Placeholder 2"/>
+          <p:cNvSpPr>
+            <a:spLocks noGrp="1"/>
+          </p:cNvSpPr>
+          <p:nvPr>
+            <p:ph idx="1"/>
+          </p:nvPr>
+        </p:nvSpPr>
+        <p:spPr/>
+        <p:txBody>
+          <a:bodyPr/>
+          <a:lstStyle/>
+          <a:p>
+            <a:r>
+              <a:rPr lang="en-US" dirty="0"/>
+              <a:t>Multi-rotor aircraft are inherently unstable</a:t>
+            </a:r>
+          </a:p>
+          <a:p>
+            <a:pPr lvl="1"/>
+            <a:r>
+              <a:rPr lang="en-US" dirty="0"/>
+              <a:t>Mismatched motor power (voltage variation, manufacturing variation in motors or props)</a:t>
+            </a:r>
+          </a:p>
+          <a:p>
+            <a:pPr lvl="1"/>
+            <a:r>
+              <a:rPr lang="en-US" dirty="0"/>
+              <a:t>Variation in air currents and density.</a:t>
+            </a:r>
+          </a:p>
+          <a:p>
+            <a:pPr lvl="1"/>
+            <a:r>
+              <a:rPr lang="en-US" dirty="0"/>
+              <a:t>Once perturbed, there’s no force acting on the aircraft to return it to equilibrium (unlike an airplane).</a:t>
+            </a:r>
+          </a:p>
+        </p:txBody>
+      </p:sp>
+    </p:spTree>
+    <p:extLst>
+      <p:ext uri="{BB962C8B-B14F-4D97-AF65-F5344CB8AC3E}">
+        <p14:creationId xmlns:p14="http://schemas.microsoft.com/office/powerpoint/2010/main" val="171781059"/>
+      </p:ext>
+    </p:extLst>
+  </p:cSld>
+  <p:clrMapOvr>
+    <a:masterClrMapping/>
+  </p:clrMapOvr>
+</p:sld>
+</file>
+
+<file path=ppt/slides/slide30.xml><?xml version="1.0" encoding="utf-8"?>
+<p:sld xmlns:a="http://schemas.openxmlformats.org/drawingml/2006/main" xmlns:r="http://schemas.openxmlformats.org/officeDocument/2006/relationships" xmlns:p="http://schemas.openxmlformats.org/presentationml/2006/main" show="0">
+  <p:cSld>
+    <p:spTree>
+      <p:nvGrpSpPr>
+        <p:cNvPr id="1" name=""/>
+        <p:cNvGrpSpPr/>
+        <p:nvPr/>
+      </p:nvGrpSpPr>
+      <p:grpSpPr>
+        <a:xfrm>
+          <a:off x="0" y="0"/>
+          <a:ext cx="0" cy="0"/>
+          <a:chOff x="0" y="0"/>
+          <a:chExt cx="0" cy="0"/>
+        </a:xfrm>
+      </p:grpSpPr>
+      <p:sp>
+        <p:nvSpPr>
           <p:cNvPr id="4" name="Title 3"/>
           <p:cNvSpPr>
             <a:spLocks noGrp="1"/>
@@ -5967,8 +6311,8 @@
 </p:sld>
 </file>
 
-<file path=ppt/slides/slide29.xml><?xml version="1.0" encoding="utf-8"?>
-<p:sld xmlns:a="http://schemas.openxmlformats.org/drawingml/2006/main" xmlns:r="http://schemas.openxmlformats.org/officeDocument/2006/relationships" xmlns:p="http://schemas.openxmlformats.org/presentationml/2006/main">
+<file path=ppt/slides/slide31.xml><?xml version="1.0" encoding="utf-8"?>
+<p:sld xmlns:a="http://schemas.openxmlformats.org/drawingml/2006/main" xmlns:r="http://schemas.openxmlformats.org/officeDocument/2006/relationships" xmlns:p="http://schemas.openxmlformats.org/presentationml/2006/main" show="0">
   <p:cSld>
     <p:spTree>
       <p:nvGrpSpPr>
@@ -6196,103 +6540,8 @@
 </p:sld>
 </file>
 
-<file path=ppt/slides/slide3.xml><?xml version="1.0" encoding="utf-8"?>
-<p:sld xmlns:a="http://schemas.openxmlformats.org/drawingml/2006/main" xmlns:r="http://schemas.openxmlformats.org/officeDocument/2006/relationships" xmlns:p="http://schemas.openxmlformats.org/presentationml/2006/main">
-  <p:cSld>
-    <p:spTree>
-      <p:nvGrpSpPr>
-        <p:cNvPr id="1" name=""/>
-        <p:cNvGrpSpPr/>
-        <p:nvPr/>
-      </p:nvGrpSpPr>
-      <p:grpSpPr>
-        <a:xfrm>
-          <a:off x="0" y="0"/>
-          <a:ext cx="0" cy="0"/>
-          <a:chOff x="0" y="0"/>
-          <a:chExt cx="0" cy="0"/>
-        </a:xfrm>
-      </p:grpSpPr>
-      <p:sp>
-        <p:nvSpPr>
-          <p:cNvPr id="2" name="Title 1"/>
-          <p:cNvSpPr>
-            <a:spLocks noGrp="1"/>
-          </p:cNvSpPr>
-          <p:nvPr>
-            <p:ph type="title"/>
-          </p:nvPr>
-        </p:nvSpPr>
-        <p:spPr/>
-        <p:txBody>
-          <a:bodyPr/>
-          <a:lstStyle/>
-          <a:p>
-            <a:r>
-              <a:rPr lang="en-US" dirty="0"/>
-              <a:t>Maintaining Stability</a:t>
-            </a:r>
-          </a:p>
-        </p:txBody>
-      </p:sp>
-      <p:sp>
-        <p:nvSpPr>
-          <p:cNvPr id="3" name="Content Placeholder 2"/>
-          <p:cNvSpPr>
-            <a:spLocks noGrp="1"/>
-          </p:cNvSpPr>
-          <p:nvPr>
-            <p:ph idx="1"/>
-          </p:nvPr>
-        </p:nvSpPr>
-        <p:spPr/>
-        <p:txBody>
-          <a:bodyPr/>
-          <a:lstStyle/>
-          <a:p>
-            <a:r>
-              <a:rPr lang="en-US" dirty="0"/>
-              <a:t>Multi-rotor aircraft are inherently unstable</a:t>
-            </a:r>
-          </a:p>
-          <a:p>
-            <a:pPr lvl="1"/>
-            <a:r>
-              <a:rPr lang="en-US" dirty="0"/>
-              <a:t>Mismatched motor power (voltage variation, manufacturing variation in motors or props)</a:t>
-            </a:r>
-          </a:p>
-          <a:p>
-            <a:pPr lvl="1"/>
-            <a:r>
-              <a:rPr lang="en-US" dirty="0"/>
-              <a:t>Variation in air currents and density.</a:t>
-            </a:r>
-          </a:p>
-          <a:p>
-            <a:pPr lvl="1"/>
-            <a:r>
-              <a:rPr lang="en-US" dirty="0"/>
-              <a:t>Once perturbed, there’s no force acting on the aircraft to return it to equilibrium (unlike an airplane).</a:t>
-            </a:r>
-          </a:p>
-        </p:txBody>
-      </p:sp>
-    </p:spTree>
-    <p:extLst>
-      <p:ext uri="{BB962C8B-B14F-4D97-AF65-F5344CB8AC3E}">
-        <p14:creationId xmlns:p14="http://schemas.microsoft.com/office/powerpoint/2010/main" val="171781059"/>
-      </p:ext>
-    </p:extLst>
-  </p:cSld>
-  <p:clrMapOvr>
-    <a:masterClrMapping/>
-  </p:clrMapOvr>
-</p:sld>
-</file>
-
-<file path=ppt/slides/slide30.xml><?xml version="1.0" encoding="utf-8"?>
-<p:sld xmlns:a="http://schemas.openxmlformats.org/drawingml/2006/main" xmlns:r="http://schemas.openxmlformats.org/officeDocument/2006/relationships" xmlns:p="http://schemas.openxmlformats.org/presentationml/2006/main">
+<file path=ppt/slides/slide32.xml><?xml version="1.0" encoding="utf-8"?>
+<p:sld xmlns:a="http://schemas.openxmlformats.org/drawingml/2006/main" xmlns:r="http://schemas.openxmlformats.org/officeDocument/2006/relationships" xmlns:p="http://schemas.openxmlformats.org/presentationml/2006/main" show="0">
   <p:cSld>
     <p:spTree>
       <p:nvGrpSpPr>
@@ -6520,8 +6769,8 @@
 </p:sld>
 </file>
 
-<file path=ppt/slides/slide31.xml><?xml version="1.0" encoding="utf-8"?>
-<p:sld xmlns:a="http://schemas.openxmlformats.org/drawingml/2006/main" xmlns:r="http://schemas.openxmlformats.org/officeDocument/2006/relationships" xmlns:p="http://schemas.openxmlformats.org/presentationml/2006/main">
+<file path=ppt/slides/slide33.xml><?xml version="1.0" encoding="utf-8"?>
+<p:sld xmlns:a="http://schemas.openxmlformats.org/drawingml/2006/main" xmlns:r="http://schemas.openxmlformats.org/officeDocument/2006/relationships" xmlns:p="http://schemas.openxmlformats.org/presentationml/2006/main" show="0">
   <p:cSld>
     <p:spTree>
       <p:nvGrpSpPr>
@@ -6710,8 +6959,8 @@
 </p:sld>
 </file>
 
-<file path=ppt/slides/slide32.xml><?xml version="1.0" encoding="utf-8"?>
-<p:sld xmlns:a="http://schemas.openxmlformats.org/drawingml/2006/main" xmlns:r="http://schemas.openxmlformats.org/officeDocument/2006/relationships" xmlns:p="http://schemas.openxmlformats.org/presentationml/2006/main">
+<file path=ppt/slides/slide34.xml><?xml version="1.0" encoding="utf-8"?>
+<p:sld xmlns:a="http://schemas.openxmlformats.org/drawingml/2006/main" xmlns:r="http://schemas.openxmlformats.org/officeDocument/2006/relationships" xmlns:p="http://schemas.openxmlformats.org/presentationml/2006/main" show="0">
   <p:cSld>
     <p:spTree>
       <p:nvGrpSpPr>
@@ -6828,8 +7077,8 @@
 </p:sld>
 </file>
 
-<file path=ppt/slides/slide33.xml><?xml version="1.0" encoding="utf-8"?>
-<p:sld xmlns:a="http://schemas.openxmlformats.org/drawingml/2006/main" xmlns:r="http://schemas.openxmlformats.org/officeDocument/2006/relationships" xmlns:p="http://schemas.openxmlformats.org/presentationml/2006/main">
+<file path=ppt/slides/slide35.xml><?xml version="1.0" encoding="utf-8"?>
+<p:sld xmlns:a="http://schemas.openxmlformats.org/drawingml/2006/main" xmlns:r="http://schemas.openxmlformats.org/officeDocument/2006/relationships" xmlns:p="http://schemas.openxmlformats.org/presentationml/2006/main" show="0">
   <p:cSld>
     <p:spTree>
       <p:nvGrpSpPr>
@@ -6953,8 +7202,8 @@
 </p:sld>
 </file>
 
-<file path=ppt/slides/slide34.xml><?xml version="1.0" encoding="utf-8"?>
-<p:sld xmlns:a="http://schemas.openxmlformats.org/drawingml/2006/main" xmlns:r="http://schemas.openxmlformats.org/officeDocument/2006/relationships" xmlns:p="http://schemas.openxmlformats.org/presentationml/2006/main">
+<file path=ppt/slides/slide36.xml><?xml version="1.0" encoding="utf-8"?>
+<p:sld xmlns:a="http://schemas.openxmlformats.org/drawingml/2006/main" xmlns:r="http://schemas.openxmlformats.org/officeDocument/2006/relationships" xmlns:p="http://schemas.openxmlformats.org/presentationml/2006/main" show="0">
   <p:cSld>
     <p:spTree>
       <p:nvGrpSpPr>
@@ -7215,7 +7464,7 @@
           </a:ln>
           <a:extLst>
             <a:ext uri="{C572A759-6A51-4108-AA02-DFA0A04FC94B}">
-              <ma14:wrappingTextBoxFlag xmlns:ma14="http://schemas.microsoft.com/office/mac/drawingml/2011/main" xmlns="" val="1"/>
+              <ma14:wrappingTextBoxFlag xmlns="" xmlns:ma14="http://schemas.microsoft.com/office/mac/drawingml/2011/main" val="1"/>
             </a:ext>
           </a:extLst>
         </p:spPr>
@@ -7258,7 +7507,7 @@
           </a:ln>
           <a:extLst>
             <a:ext uri="{C572A759-6A51-4108-AA02-DFA0A04FC94B}">
-              <ma14:wrappingTextBoxFlag xmlns:ma14="http://schemas.microsoft.com/office/mac/drawingml/2011/main" xmlns="" val="1"/>
+              <ma14:wrappingTextBoxFlag xmlns="" xmlns:ma14="http://schemas.microsoft.com/office/mac/drawingml/2011/main" val="1"/>
             </a:ext>
           </a:extLst>
         </p:spPr>
@@ -7301,7 +7550,7 @@
           </a:ln>
           <a:extLst>
             <a:ext uri="{C572A759-6A51-4108-AA02-DFA0A04FC94B}">
-              <ma14:wrappingTextBoxFlag xmlns:ma14="http://schemas.microsoft.com/office/mac/drawingml/2011/main" xmlns="" val="1"/>
+              <ma14:wrappingTextBoxFlag xmlns="" xmlns:ma14="http://schemas.microsoft.com/office/mac/drawingml/2011/main" val="1"/>
             </a:ext>
           </a:extLst>
         </p:spPr>
@@ -7386,7 +7635,7 @@
 </p:sld>
 </file>
 
-<file path=ppt/slides/slide35.xml><?xml version="1.0" encoding="utf-8"?>
+<file path=ppt/slides/slide37.xml><?xml version="1.0" encoding="utf-8"?>
 <p:sld xmlns:a="http://schemas.openxmlformats.org/drawingml/2006/main" xmlns:r="http://schemas.openxmlformats.org/officeDocument/2006/relationships" xmlns:p="http://schemas.openxmlformats.org/presentationml/2006/main" show="0">
   <p:cSld>
     <p:spTree>
@@ -7511,8 +7760,8 @@
 </p:sld>
 </file>
 
-<file path=ppt/slides/slide36.xml><?xml version="1.0" encoding="utf-8"?>
-<p:sld xmlns:a="http://schemas.openxmlformats.org/drawingml/2006/main" xmlns:r="http://schemas.openxmlformats.org/officeDocument/2006/relationships" xmlns:p="http://schemas.openxmlformats.org/presentationml/2006/main">
+<file path=ppt/slides/slide38.xml><?xml version="1.0" encoding="utf-8"?>
+<p:sld xmlns:a="http://schemas.openxmlformats.org/drawingml/2006/main" xmlns:r="http://schemas.openxmlformats.org/officeDocument/2006/relationships" xmlns:p="http://schemas.openxmlformats.org/presentationml/2006/main" show="0">
   <p:cSld>
     <p:spTree>
       <p:nvGrpSpPr>
@@ -7988,7 +8237,159 @@
 </p:sld>
 </file>
 
-<file path=ppt/slides/slide37.xml><?xml version="1.0" encoding="utf-8"?>
+<file path=ppt/slides/slide39.xml><?xml version="1.0" encoding="utf-8"?>
+<p:sld xmlns:a="http://schemas.openxmlformats.org/drawingml/2006/main" xmlns:r="http://schemas.openxmlformats.org/officeDocument/2006/relationships" xmlns:p="http://schemas.openxmlformats.org/presentationml/2006/main" show="0">
+  <p:cSld>
+    <p:spTree>
+      <p:nvGrpSpPr>
+        <p:cNvPr id="1" name=""/>
+        <p:cNvGrpSpPr/>
+        <p:nvPr/>
+      </p:nvGrpSpPr>
+      <p:grpSpPr>
+        <a:xfrm>
+          <a:off x="0" y="0"/>
+          <a:ext cx="0" cy="0"/>
+          <a:chOff x="0" y="0"/>
+          <a:chExt cx="0" cy="0"/>
+        </a:xfrm>
+      </p:grpSpPr>
+      <p:sp>
+        <p:nvSpPr>
+          <p:cNvPr id="2" name="Title 1"/>
+          <p:cNvSpPr>
+            <a:spLocks noGrp="1"/>
+          </p:cNvSpPr>
+          <p:nvPr>
+            <p:ph type="title"/>
+          </p:nvPr>
+        </p:nvSpPr>
+        <p:spPr/>
+        <p:txBody>
+          <a:bodyPr/>
+          <a:lstStyle/>
+          <a:p>
+            <a:r>
+              <a:rPr lang="en-US" dirty="0"/>
+              <a:t>Maintaining Stability</a:t>
+            </a:r>
+          </a:p>
+        </p:txBody>
+      </p:sp>
+      <p:sp>
+        <p:nvSpPr>
+          <p:cNvPr id="3" name="Content Placeholder 2"/>
+          <p:cNvSpPr>
+            <a:spLocks noGrp="1"/>
+          </p:cNvSpPr>
+          <p:nvPr>
+            <p:ph idx="1"/>
+          </p:nvPr>
+        </p:nvSpPr>
+        <p:spPr/>
+        <p:txBody>
+          <a:bodyPr>
+            <a:normAutofit fontScale="92500" lnSpcReduction="10000"/>
+          </a:bodyPr>
+          <a:lstStyle/>
+          <a:p>
+            <a:r>
+              <a:rPr lang="en-US" dirty="0"/>
+              <a:t>Multi-rotor aircraft require a closed loop controller</a:t>
+            </a:r>
+          </a:p>
+          <a:p>
+            <a:pPr lvl="1"/>
+            <a:r>
+              <a:rPr lang="en-US" dirty="0"/>
+              <a:t>Sensors detect aircraft movement and orientation</a:t>
+            </a:r>
+          </a:p>
+          <a:p>
+            <a:pPr lvl="1"/>
+            <a:r>
+              <a:rPr lang="en-US" dirty="0"/>
+              <a:t>Controller adjusts the power to motors to maintain desired location and orientation</a:t>
+            </a:r>
+          </a:p>
+          <a:p>
+            <a:r>
+              <a:rPr lang="en-US" dirty="0"/>
+              <a:t>Multi-rotor aircraft use a few sensors to maintain stability</a:t>
+            </a:r>
+          </a:p>
+          <a:p>
+            <a:pPr lvl="1"/>
+            <a:r>
+              <a:rPr lang="en-US" dirty="0"/>
+              <a:t>Accelerometers (absolute pitch and roll)</a:t>
+            </a:r>
+          </a:p>
+          <a:p>
+            <a:pPr lvl="1"/>
+            <a:r>
+              <a:rPr lang="en-US" dirty="0"/>
+              <a:t>Gyroscopes (changes in pitch, roll, and yaw)</a:t>
+            </a:r>
+          </a:p>
+          <a:p>
+            <a:r>
+              <a:rPr lang="en-US" dirty="0"/>
+              <a:t>The flight computer implements the control algorithm</a:t>
+            </a:r>
+          </a:p>
+          <a:p>
+            <a:pPr lvl="1"/>
+            <a:r>
+              <a:rPr lang="en-US" dirty="0"/>
+              <a:t>Usually a </a:t>
+            </a:r>
+            <a:r>
+              <a:rPr lang="en-US" i="1" dirty="0"/>
+              <a:t>proportional, integral, derivative (PID)</a:t>
+            </a:r>
+            <a:r>
+              <a:rPr lang="en-US" dirty="0"/>
+              <a:t> controller implemented in software.</a:t>
+            </a:r>
+          </a:p>
+          <a:p>
+            <a:pPr lvl="1"/>
+            <a:r>
+              <a:rPr lang="en-US" dirty="0"/>
+              <a:t>We will talk more about this later.</a:t>
+            </a:r>
+          </a:p>
+          <a:p>
+            <a:r>
+              <a:rPr lang="en-US" dirty="0"/>
+              <a:t>With PID controllers for pitch, yaw, and roll </a:t>
+            </a:r>
+            <a:r>
+              <a:rPr lang="en-US" dirty="0" err="1"/>
+              <a:t>multirotor</a:t>
+            </a:r>
+            <a:r>
+              <a:rPr lang="en-US" dirty="0"/>
+              <a:t> aircraft can achieve stable flight.</a:t>
+            </a:r>
+          </a:p>
+        </p:txBody>
+      </p:sp>
+    </p:spTree>
+    <p:extLst>
+      <p:ext uri="{BB962C8B-B14F-4D97-AF65-F5344CB8AC3E}">
+        <p14:creationId xmlns:p14="http://schemas.microsoft.com/office/powerpoint/2010/main" val="3885401016"/>
+      </p:ext>
+    </p:extLst>
+  </p:cSld>
+  <p:clrMapOvr>
+    <a:masterClrMapping/>
+  </p:clrMapOvr>
+</p:sld>
+</file>
+
+<file path=ppt/slides/slide4.xml><?xml version="1.0" encoding="utf-8"?>
 <p:sld xmlns:a="http://schemas.openxmlformats.org/drawingml/2006/main" xmlns:r="http://schemas.openxmlformats.org/officeDocument/2006/relationships" xmlns:p="http://schemas.openxmlformats.org/presentationml/2006/main">
   <p:cSld>
     <p:spTree>
@@ -8007,7 +8408,7 @@
       </p:grpSpPr>
       <p:sp>
         <p:nvSpPr>
-          <p:cNvPr id="2" name="Title 1"/>
+          <p:cNvPr id="4" name="Title 3"/>
           <p:cNvSpPr>
             <a:spLocks noGrp="1"/>
           </p:cNvSpPr>
@@ -8022,14 +8423,14 @@
           <a:p>
             <a:r>
               <a:rPr lang="en-US" dirty="0"/>
-              <a:t>Maintaining Stability</a:t>
-            </a:r>
-          </a:p>
-        </p:txBody>
-      </p:sp>
-      <p:sp>
-        <p:nvSpPr>
-          <p:cNvPr id="3" name="Content Placeholder 2"/>
+              <a:t>Lab Tasks</a:t>
+            </a:r>
+          </a:p>
+        </p:txBody>
+      </p:sp>
+      <p:sp>
+        <p:nvSpPr>
+          <p:cNvPr id="6" name="Content Placeholder 5"/>
           <p:cNvSpPr>
             <a:spLocks noGrp="1"/>
           </p:cNvSpPr>
@@ -8039,90 +8440,44 @@
         </p:nvSpPr>
         <p:spPr/>
         <p:txBody>
-          <a:bodyPr>
-            <a:normAutofit fontScale="92500" lnSpcReduction="10000"/>
-          </a:bodyPr>
-          <a:lstStyle/>
-          <a:p>
-            <a:r>
-              <a:rPr lang="en-US" dirty="0"/>
-              <a:t>Multi-rotor aircraft require a closed loop controller</a:t>
+          <a:bodyPr/>
+          <a:lstStyle/>
+          <a:p>
+            <a:r>
+              <a:rPr lang="en-US" dirty="0"/>
+              <a:t>Read values from IMU.</a:t>
+            </a:r>
+          </a:p>
+          <a:p>
+            <a:r>
+              <a:rPr lang="en-US" dirty="0"/>
+              <a:t>Use Arduino’s plotting tool</a:t>
+            </a:r>
+          </a:p>
+          <a:p>
+            <a:r>
+              <a:rPr lang="en-US" dirty="0"/>
+              <a:t>Run your serial port at max speed!!! </a:t>
+            </a:r>
+          </a:p>
+          <a:p>
+            <a:r>
+              <a:rPr lang="en-US" dirty="0"/>
+              <a:t>Read the pitch of your test stand with the motors on</a:t>
             </a:r>
           </a:p>
           <a:p>
             <a:pPr lvl="1"/>
             <a:r>
               <a:rPr lang="en-US" dirty="0"/>
-              <a:t>Sensors detect aircraft movement and orientation</a:t>
+              <a:t>Configure the filters on the IMU</a:t>
             </a:r>
           </a:p>
           <a:p>
             <a:pPr lvl="1"/>
             <a:r>
               <a:rPr lang="en-US" dirty="0"/>
-              <a:t>Controller adjusts the power to motors to maintain desired location and orientation</a:t>
-            </a:r>
-          </a:p>
-          <a:p>
-            <a:r>
-              <a:rPr lang="en-US" dirty="0"/>
-              <a:t>Multi-rotor aircraft use a few sensors to maintain stability</a:t>
-            </a:r>
-          </a:p>
-          <a:p>
-            <a:pPr lvl="1"/>
-            <a:r>
-              <a:rPr lang="en-US" dirty="0"/>
-              <a:t>Accelerometers (absolute pitch and roll)</a:t>
-            </a:r>
-          </a:p>
-          <a:p>
-            <a:pPr lvl="1"/>
-            <a:r>
-              <a:rPr lang="en-US" dirty="0"/>
-              <a:t>Gyroscopes (changes in pitch, roll, and yaw)</a:t>
-            </a:r>
-          </a:p>
-          <a:p>
-            <a:r>
-              <a:rPr lang="en-US" dirty="0"/>
-              <a:t>The flight computer implements the control algorithm</a:t>
-            </a:r>
-          </a:p>
-          <a:p>
-            <a:pPr lvl="1"/>
-            <a:r>
-              <a:rPr lang="en-US" dirty="0"/>
-              <a:t>Usually a </a:t>
-            </a:r>
-            <a:r>
-              <a:rPr lang="en-US" i="1" dirty="0"/>
-              <a:t>proportional, integral, derivative (PID)</a:t>
-            </a:r>
-            <a:r>
-              <a:rPr lang="en-US" dirty="0"/>
-              <a:t> controller implemented in software.</a:t>
-            </a:r>
-          </a:p>
-          <a:p>
-            <a:pPr lvl="1"/>
-            <a:r>
-              <a:rPr lang="en-US" dirty="0"/>
-              <a:t>We will talk more about this later.</a:t>
-            </a:r>
-          </a:p>
-          <a:p>
-            <a:r>
-              <a:rPr lang="en-US" dirty="0"/>
-              <a:t>With PID controllers for pitch, yaw, and roll </a:t>
-            </a:r>
-            <a:r>
-              <a:rPr lang="en-US" dirty="0" err="1"/>
-              <a:t>multirotor</a:t>
-            </a:r>
-            <a:r>
-              <a:rPr lang="en-US" dirty="0"/>
-              <a:t> aircraft can achieve stable flight.</a:t>
+              <a:t>Implement a complimentary filter in software.</a:t>
             </a:r>
           </a:p>
         </p:txBody>
@@ -8130,7 +8485,7 @@
     </p:spTree>
     <p:extLst>
       <p:ext uri="{BB962C8B-B14F-4D97-AF65-F5344CB8AC3E}">
-        <p14:creationId xmlns:p14="http://schemas.microsoft.com/office/powerpoint/2010/main" val="3885401016"/>
+        <p14:creationId xmlns:p14="http://schemas.microsoft.com/office/powerpoint/2010/main" val="2059893488"/>
       </p:ext>
     </p:extLst>
   </p:cSld>
@@ -8140,8 +8495,8 @@
 </p:sld>
 </file>
 
-<file path=ppt/slides/slide38.xml><?xml version="1.0" encoding="utf-8"?>
-<p:sld xmlns:a="http://schemas.openxmlformats.org/drawingml/2006/main" xmlns:r="http://schemas.openxmlformats.org/officeDocument/2006/relationships" xmlns:p="http://schemas.openxmlformats.org/presentationml/2006/main">
+<file path=ppt/slides/slide40.xml><?xml version="1.0" encoding="utf-8"?>
+<p:sld xmlns:a="http://schemas.openxmlformats.org/drawingml/2006/main" xmlns:r="http://schemas.openxmlformats.org/officeDocument/2006/relationships" xmlns:p="http://schemas.openxmlformats.org/presentationml/2006/main" show="0">
   <p:cSld>
     <p:spTree>
       <p:nvGrpSpPr>
@@ -8284,8 +8639,8 @@
 </p:sld>
 </file>
 
-<file path=ppt/slides/slide39.xml><?xml version="1.0" encoding="utf-8"?>
-<p:sld xmlns:a="http://schemas.openxmlformats.org/drawingml/2006/main" xmlns:r="http://schemas.openxmlformats.org/officeDocument/2006/relationships" xmlns:p="http://schemas.openxmlformats.org/presentationml/2006/main">
+<file path=ppt/slides/slide41.xml><?xml version="1.0" encoding="utf-8"?>
+<p:sld xmlns:a="http://schemas.openxmlformats.org/drawingml/2006/main" xmlns:r="http://schemas.openxmlformats.org/officeDocument/2006/relationships" xmlns:p="http://schemas.openxmlformats.org/presentationml/2006/main" show="0">
   <p:cSld>
     <p:spTree>
       <p:nvGrpSpPr>
@@ -8434,8 +8789,8 @@
 </p:sld>
 </file>
 
-<file path=ppt/slides/slide4.xml><?xml version="1.0" encoding="utf-8"?>
-<p:sld xmlns:a="http://schemas.openxmlformats.org/drawingml/2006/main" xmlns:r="http://schemas.openxmlformats.org/officeDocument/2006/relationships" xmlns:p="http://schemas.openxmlformats.org/presentationml/2006/main">
+<file path=ppt/slides/slide42.xml><?xml version="1.0" encoding="utf-8"?>
+<p:sld xmlns:a="http://schemas.openxmlformats.org/drawingml/2006/main" xmlns:r="http://schemas.openxmlformats.org/officeDocument/2006/relationships" xmlns:p="http://schemas.openxmlformats.org/presentationml/2006/main" show="0">
   <p:cSld>
     <p:spTree>
       <p:nvGrpSpPr>
@@ -8453,7 +8808,7 @@
       </p:grpSpPr>
       <p:sp>
         <p:nvSpPr>
-          <p:cNvPr id="4" name="Title 3"/>
+          <p:cNvPr id="2" name="Title 1"/>
           <p:cNvSpPr>
             <a:spLocks noGrp="1"/>
           </p:cNvSpPr>
@@ -8468,14 +8823,14 @@
           <a:p>
             <a:r>
               <a:rPr lang="en-US" dirty="0"/>
-              <a:t>Lab Tasks</a:t>
-            </a:r>
-          </a:p>
-        </p:txBody>
-      </p:sp>
-      <p:sp>
-        <p:nvSpPr>
-          <p:cNvPr id="6" name="Content Placeholder 5"/>
+              <a:t>Slides on Sensors</a:t>
+            </a:r>
+          </a:p>
+        </p:txBody>
+      </p:sp>
+      <p:sp>
+        <p:nvSpPr>
+          <p:cNvPr id="3" name="Content Placeholder 2"/>
           <p:cNvSpPr>
             <a:spLocks noGrp="1"/>
           </p:cNvSpPr>
@@ -8485,44 +8840,112 @@
         </p:nvSpPr>
         <p:spPr/>
         <p:txBody>
-          <a:bodyPr/>
-          <a:lstStyle/>
-          <a:p>
-            <a:r>
-              <a:rPr lang="en-US" dirty="0"/>
-              <a:t>Read values from IMU.</a:t>
-            </a:r>
-          </a:p>
-          <a:p>
-            <a:r>
-              <a:rPr lang="en-US" dirty="0"/>
-              <a:t>Use Arduino’s plotting tool</a:t>
-            </a:r>
-          </a:p>
-          <a:p>
-            <a:r>
-              <a:rPr lang="en-US" dirty="0"/>
-              <a:t>Run your serial port at max speed!!! </a:t>
-            </a:r>
-          </a:p>
-          <a:p>
-            <a:r>
-              <a:rPr lang="en-US" dirty="0"/>
-              <a:t>Read the pitch of your test stand with the motors on</a:t>
+          <a:bodyPr>
+            <a:normAutofit fontScale="92500" lnSpcReduction="20000"/>
+          </a:bodyPr>
+          <a:lstStyle/>
+          <a:p>
+            <a:r>
+              <a:rPr lang="en-US" dirty="0"/>
+              <a:t>Accelerometer</a:t>
             </a:r>
           </a:p>
           <a:p>
             <a:pPr lvl="1"/>
             <a:r>
               <a:rPr lang="en-US" dirty="0"/>
-              <a:t>Configure the filters on the IMU</a:t>
+              <a:t>Demo the data we get (3-axis accelerations)</a:t>
             </a:r>
           </a:p>
           <a:p>
             <a:pPr lvl="1"/>
             <a:r>
               <a:rPr lang="en-US" dirty="0"/>
-              <a:t>Implement a complimentary filter in software.</a:t>
+              <a:t>Conversion to Euler angles.  Show math.</a:t>
+            </a:r>
+          </a:p>
+          <a:p>
+            <a:pPr lvl="1"/>
+            <a:r>
+              <a:rPr lang="en-US" dirty="0"/>
+              <a:t>Conversion to acceleration along </a:t>
+            </a:r>
+            <a:r>
+              <a:rPr lang="en-US" dirty="0" err="1"/>
+              <a:t>x,y,z</a:t>
+            </a:r>
+            <a:r>
+              <a:rPr lang="en-US" dirty="0"/>
+              <a:t>?</a:t>
+            </a:r>
+          </a:p>
+          <a:p>
+            <a:pPr lvl="1"/>
+            <a:r>
+              <a:rPr lang="en-US" dirty="0"/>
+              <a:t>Maybe talk about coordinate systems?</a:t>
+            </a:r>
+          </a:p>
+          <a:p>
+            <a:r>
+              <a:rPr lang="en-US" dirty="0"/>
+              <a:t>Gyroscope</a:t>
+            </a:r>
+          </a:p>
+          <a:p>
+            <a:pPr lvl="1"/>
+            <a:r>
+              <a:rPr lang="en-US" dirty="0"/>
+              <a:t>Demo the data we get</a:t>
+            </a:r>
+          </a:p>
+          <a:p>
+            <a:r>
+              <a:rPr lang="en-US" dirty="0"/>
+              <a:t>Other sensors</a:t>
+            </a:r>
+          </a:p>
+          <a:p>
+            <a:pPr lvl="1"/>
+            <a:r>
+              <a:rPr lang="en-US" dirty="0"/>
+              <a:t>GPS</a:t>
+            </a:r>
+          </a:p>
+          <a:p>
+            <a:pPr lvl="1"/>
+            <a:r>
+              <a:rPr lang="en-US" dirty="0"/>
+              <a:t>Barometer</a:t>
+            </a:r>
+          </a:p>
+          <a:p>
+            <a:pPr lvl="1"/>
+            <a:r>
+              <a:rPr lang="en-US" dirty="0"/>
+              <a:t>Magnetometer</a:t>
+            </a:r>
+          </a:p>
+          <a:p>
+            <a:pPr lvl="1"/>
+            <a:r>
+              <a:rPr lang="en-US" dirty="0"/>
+              <a:t>Temperature (for correcting measurements)</a:t>
+            </a:r>
+          </a:p>
+          <a:p>
+            <a:pPr lvl="2"/>
+            <a:r>
+              <a:rPr lang="en-US" dirty="0"/>
+              <a:t>https://</a:t>
+            </a:r>
+            <a:r>
+              <a:rPr lang="en-US" dirty="0" err="1"/>
+              <a:t>wiki.dronecode.org</a:t>
+            </a:r>
+            <a:r>
+              <a:rPr lang="en-US" dirty="0"/>
+              <a:t>/_media/u01.imu_temperature_compensation_-_hessel_van_der_molen.pdf</a:t>
             </a:r>
           </a:p>
         </p:txBody>
@@ -8530,7 +8953,7 @@
     </p:spTree>
     <p:extLst>
       <p:ext uri="{BB962C8B-B14F-4D97-AF65-F5344CB8AC3E}">
-        <p14:creationId xmlns:p14="http://schemas.microsoft.com/office/powerpoint/2010/main" val="2059893488"/>
+        <p14:creationId xmlns:p14="http://schemas.microsoft.com/office/powerpoint/2010/main" val="3342077452"/>
       </p:ext>
     </p:extLst>
   </p:cSld>
@@ -8540,8 +8963,8 @@
 </p:sld>
 </file>
 
-<file path=ppt/slides/slide40.xml><?xml version="1.0" encoding="utf-8"?>
-<p:sld xmlns:a="http://schemas.openxmlformats.org/drawingml/2006/main" xmlns:r="http://schemas.openxmlformats.org/officeDocument/2006/relationships" xmlns:p="http://schemas.openxmlformats.org/presentationml/2006/main">
+<file path=ppt/slides/slide43.xml><?xml version="1.0" encoding="utf-8"?>
+<p:sld xmlns:a="http://schemas.openxmlformats.org/drawingml/2006/main" xmlns:r="http://schemas.openxmlformats.org/officeDocument/2006/relationships" xmlns:p="http://schemas.openxmlformats.org/presentationml/2006/main" show="0">
   <p:cSld>
     <p:spTree>
       <p:nvGrpSpPr>
@@ -8574,7 +8997,7 @@
           <a:p>
             <a:r>
               <a:rPr lang="en-US" dirty="0"/>
-              <a:t>Slides on Sensors</a:t>
+              <a:t>New Slides on Filters</a:t>
             </a:r>
           </a:p>
         </p:txBody>
@@ -8592,119 +9015,130 @@
         <p:spPr/>
         <p:txBody>
           <a:bodyPr>
-            <a:normAutofit fontScale="92500" lnSpcReduction="20000"/>
+            <a:normAutofit fontScale="77500" lnSpcReduction="20000"/>
           </a:bodyPr>
           <a:lstStyle/>
           <a:p>
             <a:r>
               <a:rPr lang="en-US" dirty="0"/>
-              <a:t>Accelerometer</a:t>
+              <a:t>Noise</a:t>
+            </a:r>
+          </a:p>
+          <a:p>
+            <a:r>
+              <a:rPr lang="en-US" dirty="0"/>
+              <a:t>Calibration</a:t>
+            </a:r>
+          </a:p>
+          <a:p>
+            <a:r>
+              <a:rPr lang="en-US" dirty="0"/>
+              <a:t>Demo of noisy measurements</a:t>
+            </a:r>
+          </a:p>
+          <a:p>
+            <a:r>
+              <a:rPr lang="en-US" dirty="0"/>
+              <a:t>Demo of progressive improvements</a:t>
             </a:r>
           </a:p>
           <a:p>
             <a:pPr lvl="1"/>
             <a:r>
               <a:rPr lang="en-US" dirty="0"/>
-              <a:t>Demo the data we get (3-axis accelerations)</a:t>
+              <a:t>Calibration</a:t>
             </a:r>
           </a:p>
           <a:p>
             <a:pPr lvl="1"/>
             <a:r>
               <a:rPr lang="en-US" dirty="0"/>
-              <a:t>Conversion to Euler angles.  Show math.</a:t>
-            </a:r>
+              <a:t>Tuning filters in the </a:t>
+            </a:r>
+            <a:r>
+              <a:rPr lang="en-US" dirty="0" err="1"/>
+              <a:t>quadcopter</a:t>
+            </a:r>
+            <a:endParaRPr lang="en-US" dirty="0"/>
           </a:p>
           <a:p>
             <a:pPr lvl="1"/>
             <a:r>
               <a:rPr lang="en-US" dirty="0"/>
-              <a:t>Conversion to acceleration along </a:t>
+              <a:t>Tuning complimentary filter</a:t>
+            </a:r>
+          </a:p>
+          <a:p>
+            <a:pPr lvl="2"/>
+            <a:r>
+              <a:rPr lang="en-US" dirty="0"/>
+              <a:t>Demo Drift from integrating gyroscope</a:t>
+            </a:r>
+          </a:p>
+          <a:p>
+            <a:pPr lvl="1"/>
+            <a:r>
+              <a:rPr lang="en-US" dirty="0"/>
+              <a:t>Tuning moving average on </a:t>
             </a:r>
             <a:r>
               <a:rPr lang="en-US" dirty="0" err="1"/>
-              <a:t>x,y,z</a:t>
-            </a:r>
-            <a:r>
-              <a:rPr lang="en-US" dirty="0"/>
-              <a:t>?</a:t>
+              <a:t>euler</a:t>
+            </a:r>
+            <a:r>
+              <a:rPr lang="en-US" dirty="0"/>
+              <a:t> angles</a:t>
+            </a:r>
+          </a:p>
+          <a:p>
+            <a:r>
+              <a:rPr lang="en-US" dirty="0"/>
+              <a:t>Demo of “good” pitch/roll angle measurements</a:t>
+            </a:r>
+          </a:p>
+          <a:p>
+            <a:r>
+              <a:rPr lang="en-US" dirty="0"/>
+              <a:t>Discuss magnetometer?</a:t>
             </a:r>
           </a:p>
           <a:p>
             <a:pPr lvl="1"/>
             <a:r>
               <a:rPr lang="en-US" dirty="0"/>
-              <a:t>Maybe talk about coordinate systems?</a:t>
-            </a:r>
-          </a:p>
-          <a:p>
-            <a:r>
-              <a:rPr lang="en-US" dirty="0"/>
-              <a:t>Gyroscope</a:t>
-            </a:r>
+              <a:t>Calibration: </a:t>
+            </a:r>
+            <a:r>
+              <a:rPr lang="en-US" dirty="0">
+                <a:hlinkClick r:id="rId2"/>
+              </a:rPr>
+              <a:t>https://github.com/kriswiner/MPU-6050/wiki/Simple-and-Effective-Magnetometer-Calibration</a:t>
+            </a:r>
+            <a:endParaRPr lang="en-US" dirty="0"/>
           </a:p>
           <a:p>
             <a:pPr lvl="1"/>
             <a:r>
               <a:rPr lang="en-US" dirty="0"/>
-              <a:t>Demo the data we get</a:t>
-            </a:r>
-          </a:p>
-          <a:p>
-            <a:r>
-              <a:rPr lang="en-US" dirty="0"/>
-              <a:t>Other sensors</a:t>
+              <a:t>Heading calculations</a:t>
             </a:r>
           </a:p>
           <a:p>
             <a:pPr lvl="1"/>
-            <a:r>
-              <a:rPr lang="en-US" dirty="0"/>
-              <a:t>GPS</a:t>
-            </a:r>
-          </a:p>
-          <a:p>
-            <a:pPr lvl="1"/>
-            <a:r>
-              <a:rPr lang="en-US" dirty="0"/>
-              <a:t>Barometer</a:t>
-            </a:r>
-          </a:p>
-          <a:p>
-            <a:pPr lvl="1"/>
-            <a:r>
-              <a:rPr lang="en-US" dirty="0"/>
-              <a:t>Magnetometer</a:t>
-            </a:r>
-          </a:p>
-          <a:p>
-            <a:pPr lvl="1"/>
-            <a:r>
-              <a:rPr lang="en-US" dirty="0"/>
-              <a:t>Temperature (for correcting measurements)</a:t>
-            </a:r>
-          </a:p>
-          <a:p>
-            <a:pPr lvl="2"/>
-            <a:r>
-              <a:rPr lang="en-US" dirty="0"/>
-              <a:t>https://</a:t>
-            </a:r>
-            <a:r>
-              <a:rPr lang="en-US" dirty="0" err="1"/>
-              <a:t>wiki.dronecode.org</a:t>
-            </a:r>
-            <a:r>
-              <a:rPr lang="en-US" dirty="0"/>
-              <a:t>/_media/u01.imu_temperature_compensation_-_hessel_van_der_molen.pdf</a:t>
-            </a:r>
+            <a:endParaRPr lang="en-US" dirty="0"/>
+          </a:p>
+          <a:p>
+            <a:pPr marL="0" indent="0">
+              <a:buNone/>
+            </a:pPr>
+            <a:endParaRPr lang="en-US" dirty="0"/>
           </a:p>
         </p:txBody>
       </p:sp>
     </p:spTree>
     <p:extLst>
       <p:ext uri="{BB962C8B-B14F-4D97-AF65-F5344CB8AC3E}">
-        <p14:creationId xmlns:p14="http://schemas.microsoft.com/office/powerpoint/2010/main" val="3342077452"/>
+        <p14:creationId xmlns:p14="http://schemas.microsoft.com/office/powerpoint/2010/main" val="2814360818"/>
       </p:ext>
     </p:extLst>
   </p:cSld>
@@ -8714,8 +9148,8 @@
 </p:sld>
 </file>
 
-<file path=ppt/slides/slide41.xml><?xml version="1.0" encoding="utf-8"?>
-<p:sld xmlns:a="http://schemas.openxmlformats.org/drawingml/2006/main" xmlns:r="http://schemas.openxmlformats.org/officeDocument/2006/relationships" xmlns:p="http://schemas.openxmlformats.org/presentationml/2006/main">
+<file path=ppt/slides/slide44.xml><?xml version="1.0" encoding="utf-8"?>
+<p:sld xmlns:a="http://schemas.openxmlformats.org/drawingml/2006/main" xmlns:r="http://schemas.openxmlformats.org/officeDocument/2006/relationships" xmlns:p="http://schemas.openxmlformats.org/presentationml/2006/main" show="0">
   <p:cSld>
     <p:spTree>
       <p:nvGrpSpPr>
@@ -8748,191 +9182,6 @@
           <a:p>
             <a:r>
               <a:rPr lang="en-US" dirty="0"/>
-              <a:t>New Slides on Filters</a:t>
-            </a:r>
-          </a:p>
-        </p:txBody>
-      </p:sp>
-      <p:sp>
-        <p:nvSpPr>
-          <p:cNvPr id="3" name="Content Placeholder 2"/>
-          <p:cNvSpPr>
-            <a:spLocks noGrp="1"/>
-          </p:cNvSpPr>
-          <p:nvPr>
-            <p:ph idx="1"/>
-          </p:nvPr>
-        </p:nvSpPr>
-        <p:spPr/>
-        <p:txBody>
-          <a:bodyPr>
-            <a:normAutofit fontScale="77500" lnSpcReduction="20000"/>
-          </a:bodyPr>
-          <a:lstStyle/>
-          <a:p>
-            <a:r>
-              <a:rPr lang="en-US" dirty="0"/>
-              <a:t>Noise</a:t>
-            </a:r>
-          </a:p>
-          <a:p>
-            <a:r>
-              <a:rPr lang="en-US" dirty="0"/>
-              <a:t>Calibration</a:t>
-            </a:r>
-          </a:p>
-          <a:p>
-            <a:r>
-              <a:rPr lang="en-US" dirty="0"/>
-              <a:t>Demo of noisy measurements</a:t>
-            </a:r>
-          </a:p>
-          <a:p>
-            <a:r>
-              <a:rPr lang="en-US" dirty="0"/>
-              <a:t>Demo of progressive improvements</a:t>
-            </a:r>
-          </a:p>
-          <a:p>
-            <a:pPr lvl="1"/>
-            <a:r>
-              <a:rPr lang="en-US" dirty="0"/>
-              <a:t>Calibration</a:t>
-            </a:r>
-          </a:p>
-          <a:p>
-            <a:pPr lvl="1"/>
-            <a:r>
-              <a:rPr lang="en-US" dirty="0"/>
-              <a:t>Tuning filters in the </a:t>
-            </a:r>
-            <a:r>
-              <a:rPr lang="en-US" dirty="0" err="1"/>
-              <a:t>quadcopter</a:t>
-            </a:r>
-            <a:endParaRPr lang="en-US" dirty="0"/>
-          </a:p>
-          <a:p>
-            <a:pPr lvl="1"/>
-            <a:r>
-              <a:rPr lang="en-US" dirty="0"/>
-              <a:t>Tuning complimentary filter</a:t>
-            </a:r>
-          </a:p>
-          <a:p>
-            <a:pPr lvl="2"/>
-            <a:r>
-              <a:rPr lang="en-US" dirty="0"/>
-              <a:t>Demo Drift from integrating gyroscope</a:t>
-            </a:r>
-          </a:p>
-          <a:p>
-            <a:pPr lvl="1"/>
-            <a:r>
-              <a:rPr lang="en-US" dirty="0"/>
-              <a:t>Tuning moving average on </a:t>
-            </a:r>
-            <a:r>
-              <a:rPr lang="en-US" dirty="0" err="1"/>
-              <a:t>euler</a:t>
-            </a:r>
-            <a:r>
-              <a:rPr lang="en-US" dirty="0"/>
-              <a:t> angles</a:t>
-            </a:r>
-          </a:p>
-          <a:p>
-            <a:r>
-              <a:rPr lang="en-US" dirty="0"/>
-              <a:t>Demo of “good” pitch/roll angle measurements</a:t>
-            </a:r>
-          </a:p>
-          <a:p>
-            <a:r>
-              <a:rPr lang="en-US" dirty="0"/>
-              <a:t>Discuss magnetometer?</a:t>
-            </a:r>
-          </a:p>
-          <a:p>
-            <a:pPr lvl="1"/>
-            <a:r>
-              <a:rPr lang="en-US" dirty="0"/>
-              <a:t>Calibration: </a:t>
-            </a:r>
-            <a:r>
-              <a:rPr lang="en-US" dirty="0">
-                <a:hlinkClick r:id="rId2"/>
-              </a:rPr>
-              <a:t>https://github.com/kriswiner/MPU-6050/wiki/Simple-and-Effective-Magnetometer-Calibration</a:t>
-            </a:r>
-            <a:endParaRPr lang="en-US" dirty="0"/>
-          </a:p>
-          <a:p>
-            <a:pPr lvl="1"/>
-            <a:r>
-              <a:rPr lang="en-US" dirty="0"/>
-              <a:t>Heading calculations</a:t>
-            </a:r>
-          </a:p>
-          <a:p>
-            <a:pPr lvl="1"/>
-            <a:endParaRPr lang="en-US" dirty="0"/>
-          </a:p>
-          <a:p>
-            <a:pPr marL="0" indent="0">
-              <a:buNone/>
-            </a:pPr>
-            <a:endParaRPr lang="en-US" dirty="0"/>
-          </a:p>
-        </p:txBody>
-      </p:sp>
-    </p:spTree>
-    <p:extLst>
-      <p:ext uri="{BB962C8B-B14F-4D97-AF65-F5344CB8AC3E}">
-        <p14:creationId xmlns:p14="http://schemas.microsoft.com/office/powerpoint/2010/main" val="2814360818"/>
-      </p:ext>
-    </p:extLst>
-  </p:cSld>
-  <p:clrMapOvr>
-    <a:masterClrMapping/>
-  </p:clrMapOvr>
-</p:sld>
-</file>
-
-<file path=ppt/slides/slide42.xml><?xml version="1.0" encoding="utf-8"?>
-<p:sld xmlns:a="http://schemas.openxmlformats.org/drawingml/2006/main" xmlns:r="http://schemas.openxmlformats.org/officeDocument/2006/relationships" xmlns:p="http://schemas.openxmlformats.org/presentationml/2006/main">
-  <p:cSld>
-    <p:spTree>
-      <p:nvGrpSpPr>
-        <p:cNvPr id="1" name=""/>
-        <p:cNvGrpSpPr/>
-        <p:nvPr/>
-      </p:nvGrpSpPr>
-      <p:grpSpPr>
-        <a:xfrm>
-          <a:off x="0" y="0"/>
-          <a:ext cx="0" cy="0"/>
-          <a:chOff x="0" y="0"/>
-          <a:chExt cx="0" cy="0"/>
-        </a:xfrm>
-      </p:grpSpPr>
-      <p:sp>
-        <p:nvSpPr>
-          <p:cNvPr id="2" name="Title 1"/>
-          <p:cNvSpPr>
-            <a:spLocks noGrp="1"/>
-          </p:cNvSpPr>
-          <p:nvPr>
-            <p:ph type="title"/>
-          </p:nvPr>
-        </p:nvSpPr>
-        <p:spPr/>
-        <p:txBody>
-          <a:bodyPr/>
-          <a:lstStyle/>
-          <a:p>
-            <a:r>
-              <a:rPr lang="en-US" dirty="0"/>
               <a:t>Higher-order Navigation</a:t>
             </a:r>
           </a:p>
@@ -9024,8 +9273,8 @@
 </p:sld>
 </file>
 
-<file path=ppt/slides/slide43.xml><?xml version="1.0" encoding="utf-8"?>
-<p:sld xmlns:a="http://schemas.openxmlformats.org/drawingml/2006/main" xmlns:r="http://schemas.openxmlformats.org/officeDocument/2006/relationships" xmlns:p="http://schemas.openxmlformats.org/presentationml/2006/main">
+<file path=ppt/slides/slide45.xml><?xml version="1.0" encoding="utf-8"?>
+<p:sld xmlns:a="http://schemas.openxmlformats.org/drawingml/2006/main" xmlns:r="http://schemas.openxmlformats.org/officeDocument/2006/relationships" xmlns:p="http://schemas.openxmlformats.org/presentationml/2006/main" show="0">
   <p:cSld>
     <p:spTree>
       <p:nvGrpSpPr>
@@ -9156,8 +9405,8 @@
 </p:sld>
 </file>
 
-<file path=ppt/slides/slide44.xml><?xml version="1.0" encoding="utf-8"?>
-<p:sld xmlns:a="http://schemas.openxmlformats.org/drawingml/2006/main" xmlns:r="http://schemas.openxmlformats.org/officeDocument/2006/relationships" xmlns:p="http://schemas.openxmlformats.org/presentationml/2006/main">
+<file path=ppt/slides/slide46.xml><?xml version="1.0" encoding="utf-8"?>
+<p:sld xmlns:a="http://schemas.openxmlformats.org/drawingml/2006/main" xmlns:r="http://schemas.openxmlformats.org/officeDocument/2006/relationships" xmlns:p="http://schemas.openxmlformats.org/presentationml/2006/main" show="0">
   <p:cSld>
     <p:spTree>
       <p:nvGrpSpPr>
@@ -9299,8 +9548,8 @@
 </p:sld>
 </file>
 
-<file path=ppt/slides/slide45.xml><?xml version="1.0" encoding="utf-8"?>
-<p:sld xmlns:a="http://schemas.openxmlformats.org/drawingml/2006/main" xmlns:r="http://schemas.openxmlformats.org/officeDocument/2006/relationships" xmlns:p="http://schemas.openxmlformats.org/presentationml/2006/main">
+<file path=ppt/slides/slide47.xml><?xml version="1.0" encoding="utf-8"?>
+<p:sld xmlns:a="http://schemas.openxmlformats.org/drawingml/2006/main" xmlns:r="http://schemas.openxmlformats.org/officeDocument/2006/relationships" xmlns:p="http://schemas.openxmlformats.org/presentationml/2006/main" show="0">
   <p:cSld>
     <p:spTree>
       <p:nvGrpSpPr>
@@ -9442,8 +9691,8 @@
 </p:sld>
 </file>
 
-<file path=ppt/slides/slide46.xml><?xml version="1.0" encoding="utf-8"?>
-<p:sld xmlns:a="http://schemas.openxmlformats.org/drawingml/2006/main" xmlns:r="http://schemas.openxmlformats.org/officeDocument/2006/relationships" xmlns:p="http://schemas.openxmlformats.org/presentationml/2006/main">
+<file path=ppt/slides/slide48.xml><?xml version="1.0" encoding="utf-8"?>
+<p:sld xmlns:a="http://schemas.openxmlformats.org/drawingml/2006/main" xmlns:r="http://schemas.openxmlformats.org/officeDocument/2006/relationships" xmlns:p="http://schemas.openxmlformats.org/presentationml/2006/main" show="0">
   <p:cSld>
     <p:spTree>
       <p:nvGrpSpPr>
@@ -10241,7 +10490,7 @@
 </file>
 
 <file path=ppt/slides/slide7.xml><?xml version="1.0" encoding="utf-8"?>
-<p:sld xmlns:a="http://schemas.openxmlformats.org/drawingml/2006/main" xmlns:r="http://schemas.openxmlformats.org/officeDocument/2006/relationships" xmlns:p="http://schemas.openxmlformats.org/presentationml/2006/main">
+<p:sld xmlns:a="http://schemas.openxmlformats.org/drawingml/2006/main" xmlns:r="http://schemas.openxmlformats.org/officeDocument/2006/relationships" xmlns:p="http://schemas.openxmlformats.org/presentationml/2006/main" show="0">
   <p:cSld>
     <p:spTree>
       <p:nvGrpSpPr>

</xml_diff>